<commit_message>
update train.py : model + bt params
</commit_message>
<xml_diff>
--- a/result/diagram.pptx
+++ b/result/diagram.pptx
@@ -6,6 +6,9 @@
   </p:sldMasterIdLst>
   <p:sldIdLst>
     <p:sldId id="256" r:id="rId2"/>
+    <p:sldId id="257" r:id="rId3"/>
+    <p:sldId id="258" r:id="rId4"/>
+    <p:sldId id="259" r:id="rId5"/>
   </p:sldIdLst>
   <p:sldSz cx="12192000" cy="6858000"/>
   <p:notesSz cx="6858000" cy="9144000"/>
@@ -104,6 +107,11 @@
       </a:defRPr>
     </a:lvl9pPr>
   </p:defaultTextStyle>
+  <p:extLst>
+    <p:ext uri="{EFAFB233-063F-42B5-8137-9DF3F51BA10A}">
+      <p15:sldGuideLst xmlns:p15="http://schemas.microsoft.com/office/powerpoint/2012/main"/>
+    </p:ext>
+  </p:extLst>
 </p:presentation>
 </file>
 
@@ -3336,14 +3344,14 @@
           <p:nvPr>
             <p:extLst>
               <p:ext uri="{D42A27DB-BD31-4B8C-83A1-F6EECF244321}">
-                <p14:modId xmlns:p14="http://schemas.microsoft.com/office/powerpoint/2010/main" val="3563132699"/>
+                <p14:modId xmlns:p14="http://schemas.microsoft.com/office/powerpoint/2010/main" val="2126972609"/>
               </p:ext>
             </p:extLst>
           </p:nvPr>
         </p:nvGraphicFramePr>
         <p:xfrm>
-          <a:off x="899486" y="1105560"/>
-          <a:ext cx="5418668" cy="2966720"/>
+          <a:off x="1026084" y="1857575"/>
+          <a:ext cx="5418668" cy="4053840"/>
         </p:xfrm>
         <a:graphic>
           <a:graphicData uri="http://schemas.openxmlformats.org/drawingml/2006/table">
@@ -3493,21 +3501,48 @@
                     <a:lstStyle/>
                     <a:p>
                       <a:pPr algn="ctr" latinLnBrk="1"/>
-                      <a:endParaRPr lang="ko-KR" altLang="en-US" dirty="0">
-                        <a:latin typeface="Times New Roman" panose="02020603050405020304" pitchFamily="18" charset="0"/>
-                        <a:cs typeface="Times New Roman" panose="02020603050405020304" pitchFamily="18" charset="0"/>
-                      </a:endParaRPr>
-                    </a:p>
-                  </a:txBody>
-                  <a:tcPr/>
-                </a:tc>
-                <a:tc>
-                  <a:txBody>
-                    <a:bodyPr/>
-                    <a:lstStyle/>
-                    <a:p>
-                      <a:pPr algn="ctr" latinLnBrk="1"/>
-                      <a:endParaRPr lang="ko-KR" altLang="en-US">
+                      <a:r>
+                        <a:rPr lang="en-US" altLang="ko-KR" dirty="0">
+                          <a:latin typeface="Times New Roman" panose="02020603050405020304" pitchFamily="18" charset="0"/>
+                          <a:cs typeface="Times New Roman" panose="02020603050405020304" pitchFamily="18" charset="0"/>
+                        </a:rPr>
+                        <a:t>0.998246 /</a:t>
+                      </a:r>
+                    </a:p>
+                    <a:p>
+                      <a:pPr algn="ctr" latinLnBrk="1"/>
+                      <a:r>
+                        <a:rPr lang="en-US" altLang="ko-KR" dirty="0">
+                          <a:latin typeface="Times New Roman" panose="02020603050405020304" pitchFamily="18" charset="0"/>
+                          <a:cs typeface="Times New Roman" panose="02020603050405020304" pitchFamily="18" charset="0"/>
+                        </a:rPr>
+                        <a:t>0.952128 /</a:t>
+                      </a:r>
+                    </a:p>
+                    <a:p>
+                      <a:pPr algn="ctr" latinLnBrk="1"/>
+                      <a:r>
+                        <a:rPr lang="en-US" altLang="ko-KR" dirty="0">
+                          <a:latin typeface="Times New Roman" panose="02020603050405020304" pitchFamily="18" charset="0"/>
+                          <a:cs typeface="Times New Roman" panose="02020603050405020304" pitchFamily="18" charset="0"/>
+                        </a:rPr>
+                        <a:t>0.</a:t>
+                      </a:r>
+                      <a:endParaRPr lang="ko-KR" altLang="en-US" dirty="0">
+                        <a:latin typeface="Times New Roman" panose="02020603050405020304" pitchFamily="18" charset="0"/>
+                        <a:cs typeface="Times New Roman" panose="02020603050405020304" pitchFamily="18" charset="0"/>
+                      </a:endParaRPr>
+                    </a:p>
+                  </a:txBody>
+                  <a:tcPr/>
+                </a:tc>
+                <a:tc>
+                  <a:txBody>
+                    <a:bodyPr/>
+                    <a:lstStyle/>
+                    <a:p>
+                      <a:pPr algn="ctr" latinLnBrk="1"/>
+                      <a:endParaRPr lang="ko-KR" altLang="en-US" dirty="0">
                         <a:latin typeface="Times New Roman" panose="02020603050405020304" pitchFamily="18" charset="0"/>
                         <a:cs typeface="Times New Roman" panose="02020603050405020304" pitchFamily="18" charset="0"/>
                       </a:endParaRPr>
@@ -3577,21 +3612,48 @@
                     <a:lstStyle/>
                     <a:p>
                       <a:pPr algn="ctr" latinLnBrk="1"/>
-                      <a:endParaRPr lang="ko-KR" altLang="en-US">
-                        <a:latin typeface="Times New Roman" panose="02020603050405020304" pitchFamily="18" charset="0"/>
-                        <a:cs typeface="Times New Roman" panose="02020603050405020304" pitchFamily="18" charset="0"/>
-                      </a:endParaRPr>
-                    </a:p>
-                  </a:txBody>
-                  <a:tcPr/>
-                </a:tc>
-                <a:tc>
-                  <a:txBody>
-                    <a:bodyPr/>
-                    <a:lstStyle/>
-                    <a:p>
-                      <a:pPr algn="ctr" latinLnBrk="1"/>
-                      <a:endParaRPr lang="ko-KR" altLang="en-US">
+                      <a:r>
+                        <a:rPr lang="en-US" altLang="ko-KR" dirty="0">
+                          <a:latin typeface="Times New Roman" panose="02020603050405020304" pitchFamily="18" charset="0"/>
+                          <a:cs typeface="Times New Roman" panose="02020603050405020304" pitchFamily="18" charset="0"/>
+                        </a:rPr>
+                        <a:t>0.99857 /</a:t>
+                      </a:r>
+                    </a:p>
+                    <a:p>
+                      <a:pPr algn="ctr" latinLnBrk="1"/>
+                      <a:r>
+                        <a:rPr lang="en-US" altLang="ko-KR" dirty="0">
+                          <a:latin typeface="Times New Roman" panose="02020603050405020304" pitchFamily="18" charset="0"/>
+                          <a:cs typeface="Times New Roman" panose="02020603050405020304" pitchFamily="18" charset="0"/>
+                        </a:rPr>
+                        <a:t>0.96294 /</a:t>
+                      </a:r>
+                    </a:p>
+                    <a:p>
+                      <a:pPr algn="ctr" latinLnBrk="1"/>
+                      <a:r>
+                        <a:rPr lang="en-US" altLang="ko-KR" dirty="0">
+                          <a:latin typeface="Times New Roman" panose="02020603050405020304" pitchFamily="18" charset="0"/>
+                          <a:cs typeface="Times New Roman" panose="02020603050405020304" pitchFamily="18" charset="0"/>
+                        </a:rPr>
+                        <a:t>0.</a:t>
+                      </a:r>
+                      <a:endParaRPr lang="ko-KR" altLang="en-US" dirty="0">
+                        <a:latin typeface="Times New Roman" panose="02020603050405020304" pitchFamily="18" charset="0"/>
+                        <a:cs typeface="Times New Roman" panose="02020603050405020304" pitchFamily="18" charset="0"/>
+                      </a:endParaRPr>
+                    </a:p>
+                  </a:txBody>
+                  <a:tcPr/>
+                </a:tc>
+                <a:tc>
+                  <a:txBody>
+                    <a:bodyPr/>
+                    <a:lstStyle/>
+                    <a:p>
+                      <a:pPr algn="ctr" latinLnBrk="1"/>
+                      <a:endParaRPr lang="ko-KR" altLang="en-US" dirty="0">
                         <a:latin typeface="Times New Roman" panose="02020603050405020304" pitchFamily="18" charset="0"/>
                         <a:cs typeface="Times New Roman" panose="02020603050405020304" pitchFamily="18" charset="0"/>
                       </a:endParaRPr>
@@ -3731,21 +3793,21 @@
                     <a:lstStyle/>
                     <a:p>
                       <a:pPr algn="ctr" latinLnBrk="1"/>
-                      <a:endParaRPr lang="ko-KR" altLang="en-US">
-                        <a:latin typeface="Times New Roman" panose="02020603050405020304" pitchFamily="18" charset="0"/>
-                        <a:cs typeface="Times New Roman" panose="02020603050405020304" pitchFamily="18" charset="0"/>
-                      </a:endParaRPr>
-                    </a:p>
-                  </a:txBody>
-                  <a:tcPr/>
-                </a:tc>
-                <a:tc>
-                  <a:txBody>
-                    <a:bodyPr/>
-                    <a:lstStyle/>
-                    <a:p>
-                      <a:pPr algn="ctr" latinLnBrk="1"/>
-                      <a:endParaRPr lang="ko-KR" altLang="en-US">
+                      <a:endParaRPr lang="ko-KR" altLang="en-US" dirty="0">
+                        <a:latin typeface="Times New Roman" panose="02020603050405020304" pitchFamily="18" charset="0"/>
+                        <a:cs typeface="Times New Roman" panose="02020603050405020304" pitchFamily="18" charset="0"/>
+                      </a:endParaRPr>
+                    </a:p>
+                  </a:txBody>
+                  <a:tcPr/>
+                </a:tc>
+                <a:tc>
+                  <a:txBody>
+                    <a:bodyPr/>
+                    <a:lstStyle/>
+                    <a:p>
+                      <a:pPr algn="ctr" latinLnBrk="1"/>
+                      <a:endParaRPr lang="ko-KR" altLang="en-US" dirty="0">
                         <a:latin typeface="Times New Roman" panose="02020603050405020304" pitchFamily="18" charset="0"/>
                         <a:cs typeface="Times New Roman" panose="02020603050405020304" pitchFamily="18" charset="0"/>
                       </a:endParaRPr>
@@ -3815,7 +3877,7 @@
                     <a:lstStyle/>
                     <a:p>
                       <a:pPr algn="ctr" latinLnBrk="1"/>
-                      <a:endParaRPr lang="ko-KR" altLang="en-US">
+                      <a:endParaRPr lang="ko-KR" altLang="en-US" dirty="0">
                         <a:latin typeface="Times New Roman" panose="02020603050405020304" pitchFamily="18" charset="0"/>
                         <a:cs typeface="Times New Roman" panose="02020603050405020304" pitchFamily="18" charset="0"/>
                       </a:endParaRPr>
@@ -3885,7 +3947,7 @@
                     <a:lstStyle/>
                     <a:p>
                       <a:pPr algn="ctr" latinLnBrk="1"/>
-                      <a:endParaRPr lang="ko-KR" altLang="en-US">
+                      <a:endParaRPr lang="ko-KR" altLang="en-US" dirty="0">
                         <a:latin typeface="Times New Roman" panose="02020603050405020304" pitchFamily="18" charset="0"/>
                         <a:cs typeface="Times New Roman" panose="02020603050405020304" pitchFamily="18" charset="0"/>
                       </a:endParaRPr>
@@ -3987,36 +4049,6 @@
           </a:graphicData>
         </a:graphic>
       </p:graphicFrame>
-      <p:pic>
-        <p:nvPicPr>
-          <p:cNvPr id="7" name="그림 6">
-            <a:extLst>
-              <a:ext uri="{FF2B5EF4-FFF2-40B4-BE49-F238E27FC236}">
-                <a16:creationId xmlns:a16="http://schemas.microsoft.com/office/drawing/2014/main" id="{2323B6EE-6675-1F02-681F-A7431F986C3D}"/>
-              </a:ext>
-            </a:extLst>
-          </p:cNvPr>
-          <p:cNvPicPr>
-            <a:picLocks noChangeAspect="1"/>
-          </p:cNvPicPr>
-          <p:nvPr/>
-        </p:nvPicPr>
-        <p:blipFill>
-          <a:blip r:embed="rId2"/>
-          <a:stretch>
-            <a:fillRect/>
-          </a:stretch>
-        </p:blipFill>
-        <p:spPr>
-          <a:xfrm>
-            <a:off x="7600903" y="4105836"/>
-            <a:ext cx="3945147" cy="2127834"/>
-          </a:xfrm>
-          <a:prstGeom prst="rect">
-            <a:avLst/>
-          </a:prstGeom>
-        </p:spPr>
-      </p:pic>
       <p:sp>
         <p:nvSpPr>
           <p:cNvPr id="8" name="TextBox 7">
@@ -4031,8 +4063,8 @@
         </p:nvSpPr>
         <p:spPr>
           <a:xfrm>
-            <a:off x="1373272" y="4105836"/>
-            <a:ext cx="4471096" cy="369332"/>
+            <a:off x="1374836" y="5893635"/>
+            <a:ext cx="4721164" cy="369332"/>
           </a:xfrm>
           <a:prstGeom prst="rect">
             <a:avLst/>
@@ -4050,7 +4082,7 @@
                 <a:latin typeface="Times New Roman" panose="02020603050405020304" pitchFamily="18" charset="0"/>
                 <a:cs typeface="Times New Roman" panose="02020603050405020304" pitchFamily="18" charset="0"/>
               </a:rPr>
-              <a:t>Table1. Easy Data Augmentation Performance</a:t>
+              <a:t>Table1. Performance of Easy Data Augmentation</a:t>
             </a:r>
             <a:endParaRPr lang="ko-KR" altLang="en-US" dirty="0">
               <a:latin typeface="Times New Roman" panose="02020603050405020304" pitchFamily="18" charset="0"/>
@@ -4059,12 +4091,105 @@
           </a:p>
         </p:txBody>
       </p:sp>
+      <p:grpSp>
+        <p:nvGrpSpPr>
+          <p:cNvPr id="3" name="그룹 2">
+            <a:extLst>
+              <a:ext uri="{FF2B5EF4-FFF2-40B4-BE49-F238E27FC236}">
+                <a16:creationId xmlns:a16="http://schemas.microsoft.com/office/drawing/2014/main" id="{D337F329-E2F2-2C73-F379-302E7B567F33}"/>
+              </a:ext>
+            </a:extLst>
+          </p:cNvPr>
+          <p:cNvGrpSpPr/>
+          <p:nvPr/>
+        </p:nvGrpSpPr>
+        <p:grpSpPr>
+          <a:xfrm>
+            <a:off x="7676404" y="3604036"/>
+            <a:ext cx="3945147" cy="2396390"/>
+            <a:chOff x="7600903" y="4105836"/>
+            <a:chExt cx="3945147" cy="2396390"/>
+          </a:xfrm>
+        </p:grpSpPr>
+        <p:pic>
+          <p:nvPicPr>
+            <p:cNvPr id="7" name="그림 6">
+              <a:extLst>
+                <a:ext uri="{FF2B5EF4-FFF2-40B4-BE49-F238E27FC236}">
+                  <a16:creationId xmlns:a16="http://schemas.microsoft.com/office/drawing/2014/main" id="{2323B6EE-6675-1F02-681F-A7431F986C3D}"/>
+                </a:ext>
+              </a:extLst>
+            </p:cNvPr>
+            <p:cNvPicPr>
+              <a:picLocks noChangeAspect="1"/>
+            </p:cNvPicPr>
+            <p:nvPr/>
+          </p:nvPicPr>
+          <p:blipFill>
+            <a:blip r:embed="rId2"/>
+            <a:stretch>
+              <a:fillRect/>
+            </a:stretch>
+          </p:blipFill>
+          <p:spPr>
+            <a:xfrm>
+              <a:off x="7600903" y="4105836"/>
+              <a:ext cx="3945147" cy="2127834"/>
+            </a:xfrm>
+            <a:prstGeom prst="rect">
+              <a:avLst/>
+            </a:prstGeom>
+          </p:spPr>
+        </p:pic>
+        <p:sp>
+          <p:nvSpPr>
+            <p:cNvPr id="9" name="TextBox 8">
+              <a:extLst>
+                <a:ext uri="{FF2B5EF4-FFF2-40B4-BE49-F238E27FC236}">
+                  <a16:creationId xmlns:a16="http://schemas.microsoft.com/office/drawing/2014/main" id="{893C20A5-C889-3A17-3CD1-9DD47560C114}"/>
+                </a:ext>
+              </a:extLst>
+            </p:cNvPr>
+            <p:cNvSpPr txBox="1"/>
+            <p:nvPr/>
+          </p:nvSpPr>
+          <p:spPr>
+            <a:xfrm>
+              <a:off x="7894138" y="6132894"/>
+              <a:ext cx="3358676" cy="369332"/>
+            </a:xfrm>
+            <a:prstGeom prst="rect">
+              <a:avLst/>
+            </a:prstGeom>
+            <a:noFill/>
+          </p:spPr>
+          <p:txBody>
+            <a:bodyPr wrap="none" rtlCol="0">
+              <a:spAutoFit/>
+            </a:bodyPr>
+            <a:lstStyle/>
+            <a:p>
+              <a:r>
+                <a:rPr lang="en-US" altLang="ko-KR" dirty="0">
+                  <a:latin typeface="Times New Roman" panose="02020603050405020304" pitchFamily="18" charset="0"/>
+                  <a:cs typeface="Times New Roman" panose="02020603050405020304" pitchFamily="18" charset="0"/>
+                </a:rPr>
+                <a:t>Easy Data Augmentation Methods</a:t>
+              </a:r>
+              <a:endParaRPr lang="ko-KR" altLang="en-US" dirty="0">
+                <a:latin typeface="Times New Roman" panose="02020603050405020304" pitchFamily="18" charset="0"/>
+                <a:cs typeface="Times New Roman" panose="02020603050405020304" pitchFamily="18" charset="0"/>
+              </a:endParaRPr>
+            </a:p>
+          </p:txBody>
+        </p:sp>
+      </p:grpSp>
       <p:sp>
         <p:nvSpPr>
-          <p:cNvPr id="9" name="TextBox 8">
+          <p:cNvPr id="2" name="TextBox 1">
             <a:extLst>
               <a:ext uri="{FF2B5EF4-FFF2-40B4-BE49-F238E27FC236}">
-                <a16:creationId xmlns:a16="http://schemas.microsoft.com/office/drawing/2014/main" id="{893C20A5-C889-3A17-3CD1-9DD47560C114}"/>
+                <a16:creationId xmlns:a16="http://schemas.microsoft.com/office/drawing/2014/main" id="{CC4EA1D4-1B4A-3D25-FAEA-EC0EF4DB2C32}"/>
               </a:ext>
             </a:extLst>
           </p:cNvPr>
@@ -4073,8 +4198,76 @@
         </p:nvSpPr>
         <p:spPr>
           <a:xfrm>
-            <a:off x="7894138" y="6132894"/>
-            <a:ext cx="3358676" cy="369332"/>
+            <a:off x="422956" y="398901"/>
+            <a:ext cx="5911976" cy="477054"/>
+          </a:xfrm>
+          <a:prstGeom prst="rect">
+            <a:avLst/>
+          </a:prstGeom>
+          <a:noFill/>
+        </p:spPr>
+        <p:txBody>
+          <a:bodyPr wrap="square" rtlCol="0">
+            <a:spAutoFit/>
+          </a:bodyPr>
+          <a:lstStyle/>
+          <a:p>
+            <a:r>
+              <a:rPr lang="en-US" altLang="ko-KR" sz="2500" dirty="0">
+                <a:latin typeface="Times New Roman" panose="02020603050405020304" pitchFamily="18" charset="0"/>
+                <a:cs typeface="Times New Roman" panose="02020603050405020304" pitchFamily="18" charset="0"/>
+              </a:rPr>
+              <a:t>Performance of Easy Data Augmentation</a:t>
+            </a:r>
+          </a:p>
+        </p:txBody>
+      </p:sp>
+    </p:spTree>
+    <p:extLst>
+      <p:ext uri="{BB962C8B-B14F-4D97-AF65-F5344CB8AC3E}">
+        <p14:creationId xmlns:p14="http://schemas.microsoft.com/office/powerpoint/2010/main" val="1770305403"/>
+      </p:ext>
+    </p:extLst>
+  </p:cSld>
+  <p:clrMapOvr>
+    <a:masterClrMapping/>
+  </p:clrMapOvr>
+</p:sld>
+</file>
+
+<file path=ppt/slides/slide2.xml><?xml version="1.0" encoding="utf-8"?>
+<p:sld xmlns:a="http://schemas.openxmlformats.org/drawingml/2006/main" xmlns:r="http://schemas.openxmlformats.org/officeDocument/2006/relationships" xmlns:p="http://schemas.openxmlformats.org/presentationml/2006/main">
+  <p:cSld>
+    <p:spTree>
+      <p:nvGrpSpPr>
+        <p:cNvPr id="1" name=""/>
+        <p:cNvGrpSpPr/>
+        <p:nvPr/>
+      </p:nvGrpSpPr>
+      <p:grpSpPr>
+        <a:xfrm>
+          <a:off x="0" y="0"/>
+          <a:ext cx="0" cy="0"/>
+          <a:chOff x="0" y="0"/>
+          <a:chExt cx="0" cy="0"/>
+        </a:xfrm>
+      </p:grpSpPr>
+      <p:sp>
+        <p:nvSpPr>
+          <p:cNvPr id="3" name="TextBox 2">
+            <a:extLst>
+              <a:ext uri="{FF2B5EF4-FFF2-40B4-BE49-F238E27FC236}">
+                <a16:creationId xmlns:a16="http://schemas.microsoft.com/office/drawing/2014/main" id="{86E514A6-105C-253C-7B68-685B9C26EDBA}"/>
+              </a:ext>
+            </a:extLst>
+          </p:cNvPr>
+          <p:cNvSpPr txBox="1"/>
+          <p:nvPr/>
+        </p:nvSpPr>
+        <p:spPr>
+          <a:xfrm>
+            <a:off x="2297624" y="5714969"/>
+            <a:ext cx="7055138" cy="369332"/>
           </a:xfrm>
           <a:prstGeom prst="rect">
             <a:avLst/>
@@ -4087,24 +4280,4278 @@
           </a:bodyPr>
           <a:lstStyle/>
           <a:p>
+            <a:pPr algn="ctr"/>
             <a:r>
               <a:rPr lang="en-US" altLang="ko-KR" dirty="0">
                 <a:latin typeface="Times New Roman" panose="02020603050405020304" pitchFamily="18" charset="0"/>
                 <a:cs typeface="Times New Roman" panose="02020603050405020304" pitchFamily="18" charset="0"/>
               </a:rPr>
-              <a:t>Easy Data Augmentation Methods</a:t>
+              <a:t>Table2. Performance of Easy Data Augmentation according to each </a:t>
             </a:r>
-            <a:endParaRPr lang="ko-KR" altLang="en-US" dirty="0">
+            <a:r>
+              <a:rPr lang="en-US" altLang="ko-KR" dirty="0" err="1">
+                <a:latin typeface="Times New Roman" panose="02020603050405020304" pitchFamily="18" charset="0"/>
+                <a:cs typeface="Times New Roman" panose="02020603050405020304" pitchFamily="18" charset="0"/>
+              </a:rPr>
+              <a:t>KFold</a:t>
+            </a:r>
+            <a:endParaRPr lang="en-US" altLang="ko-KR" dirty="0">
               <a:latin typeface="Times New Roman" panose="02020603050405020304" pitchFamily="18" charset="0"/>
               <a:cs typeface="Times New Roman" panose="02020603050405020304" pitchFamily="18" charset="0"/>
             </a:endParaRPr>
+          </a:p>
+        </p:txBody>
+      </p:sp>
+      <p:graphicFrame>
+        <p:nvGraphicFramePr>
+          <p:cNvPr id="5" name="표 4">
+            <a:extLst>
+              <a:ext uri="{FF2B5EF4-FFF2-40B4-BE49-F238E27FC236}">
+                <a16:creationId xmlns:a16="http://schemas.microsoft.com/office/drawing/2014/main" id="{4D50DCF4-CF8B-4984-9B92-D4BC7DFBFEA0}"/>
+              </a:ext>
+            </a:extLst>
+          </p:cNvPr>
+          <p:cNvGraphicFramePr>
+            <a:graphicFrameLocks noGrp="1"/>
+          </p:cNvGraphicFramePr>
+          <p:nvPr>
+            <p:extLst>
+              <p:ext uri="{D42A27DB-BD31-4B8C-83A1-F6EECF244321}">
+                <p14:modId xmlns:p14="http://schemas.microsoft.com/office/powerpoint/2010/main" val="4225117129"/>
+              </p:ext>
+            </p:extLst>
+          </p:nvPr>
+        </p:nvGraphicFramePr>
+        <p:xfrm>
+          <a:off x="1155756" y="1553388"/>
+          <a:ext cx="9338875" cy="4150360"/>
+        </p:xfrm>
+        <a:graphic>
+          <a:graphicData uri="http://schemas.openxmlformats.org/drawingml/2006/table">
+            <a:tbl>
+              <a:tblPr firstRow="1" bandRow="1">
+                <a:tableStyleId>{5940675A-B579-460E-94D1-54222C63F5DA}</a:tableStyleId>
+              </a:tblPr>
+              <a:tblGrid>
+                <a:gridCol w="1334125">
+                  <a:extLst>
+                    <a:ext uri="{9D8B030D-6E8A-4147-A177-3AD203B41FA5}">
+                      <a16:colId xmlns:a16="http://schemas.microsoft.com/office/drawing/2014/main" val="3879856640"/>
+                    </a:ext>
+                  </a:extLst>
+                </a:gridCol>
+                <a:gridCol w="1334125">
+                  <a:extLst>
+                    <a:ext uri="{9D8B030D-6E8A-4147-A177-3AD203B41FA5}">
+                      <a16:colId xmlns:a16="http://schemas.microsoft.com/office/drawing/2014/main" val="4094721889"/>
+                    </a:ext>
+                  </a:extLst>
+                </a:gridCol>
+                <a:gridCol w="1334125">
+                  <a:extLst>
+                    <a:ext uri="{9D8B030D-6E8A-4147-A177-3AD203B41FA5}">
+                      <a16:colId xmlns:a16="http://schemas.microsoft.com/office/drawing/2014/main" val="1083152101"/>
+                    </a:ext>
+                  </a:extLst>
+                </a:gridCol>
+                <a:gridCol w="1334125">
+                  <a:extLst>
+                    <a:ext uri="{9D8B030D-6E8A-4147-A177-3AD203B41FA5}">
+                      <a16:colId xmlns:a16="http://schemas.microsoft.com/office/drawing/2014/main" val="1701947921"/>
+                    </a:ext>
+                  </a:extLst>
+                </a:gridCol>
+                <a:gridCol w="1334125">
+                  <a:extLst>
+                    <a:ext uri="{9D8B030D-6E8A-4147-A177-3AD203B41FA5}">
+                      <a16:colId xmlns:a16="http://schemas.microsoft.com/office/drawing/2014/main" val="3766362005"/>
+                    </a:ext>
+                  </a:extLst>
+                </a:gridCol>
+                <a:gridCol w="1334125">
+                  <a:extLst>
+                    <a:ext uri="{9D8B030D-6E8A-4147-A177-3AD203B41FA5}">
+                      <a16:colId xmlns:a16="http://schemas.microsoft.com/office/drawing/2014/main" val="3423723277"/>
+                    </a:ext>
+                  </a:extLst>
+                </a:gridCol>
+                <a:gridCol w="1334125">
+                  <a:extLst>
+                    <a:ext uri="{9D8B030D-6E8A-4147-A177-3AD203B41FA5}">
+                      <a16:colId xmlns:a16="http://schemas.microsoft.com/office/drawing/2014/main" val="3541592749"/>
+                    </a:ext>
+                  </a:extLst>
+                </a:gridCol>
+              </a:tblGrid>
+              <a:tr h="370840">
+                <a:tc>
+                  <a:txBody>
+                    <a:bodyPr/>
+                    <a:lstStyle/>
+                    <a:p>
+                      <a:pPr algn="ctr" latinLnBrk="1"/>
+                      <a:endParaRPr lang="ko-KR" altLang="en-US" dirty="0">
+                        <a:latin typeface="Times New Roman" panose="02020603050405020304" pitchFamily="18" charset="0"/>
+                        <a:cs typeface="Times New Roman" panose="02020603050405020304" pitchFamily="18" charset="0"/>
+                      </a:endParaRPr>
+                    </a:p>
+                  </a:txBody>
+                  <a:tcPr/>
+                </a:tc>
+                <a:tc>
+                  <a:txBody>
+                    <a:bodyPr/>
+                    <a:lstStyle/>
+                    <a:p>
+                      <a:pPr algn="ctr" latinLnBrk="1"/>
+                      <a:r>
+                        <a:rPr lang="en-US" altLang="ko-KR" b="1" i="1" dirty="0">
+                          <a:latin typeface="Times New Roman" panose="02020603050405020304" pitchFamily="18" charset="0"/>
+                          <a:cs typeface="Times New Roman" panose="02020603050405020304" pitchFamily="18" charset="0"/>
+                        </a:rPr>
+                        <a:t>1</a:t>
+                      </a:r>
+                      <a:endParaRPr lang="ko-KR" altLang="en-US" b="1" i="1" dirty="0">
+                        <a:latin typeface="Times New Roman" panose="02020603050405020304" pitchFamily="18" charset="0"/>
+                        <a:cs typeface="Times New Roman" panose="02020603050405020304" pitchFamily="18" charset="0"/>
+                      </a:endParaRPr>
+                    </a:p>
+                  </a:txBody>
+                  <a:tcPr/>
+                </a:tc>
+                <a:tc>
+                  <a:txBody>
+                    <a:bodyPr/>
+                    <a:lstStyle/>
+                    <a:p>
+                      <a:pPr algn="ctr" latinLnBrk="1"/>
+                      <a:r>
+                        <a:rPr lang="en-US" altLang="ko-KR" b="1" i="1" dirty="0">
+                          <a:latin typeface="Times New Roman" panose="02020603050405020304" pitchFamily="18" charset="0"/>
+                          <a:cs typeface="Times New Roman" panose="02020603050405020304" pitchFamily="18" charset="0"/>
+                        </a:rPr>
+                        <a:t>2</a:t>
+                      </a:r>
+                      <a:endParaRPr lang="ko-KR" altLang="en-US" b="1" i="1" dirty="0">
+                        <a:latin typeface="Times New Roman" panose="02020603050405020304" pitchFamily="18" charset="0"/>
+                        <a:cs typeface="Times New Roman" panose="02020603050405020304" pitchFamily="18" charset="0"/>
+                      </a:endParaRPr>
+                    </a:p>
+                  </a:txBody>
+                  <a:tcPr/>
+                </a:tc>
+                <a:tc>
+                  <a:txBody>
+                    <a:bodyPr/>
+                    <a:lstStyle/>
+                    <a:p>
+                      <a:pPr algn="ctr" latinLnBrk="1"/>
+                      <a:r>
+                        <a:rPr lang="en-US" altLang="ko-KR" b="1" i="1" dirty="0">
+                          <a:latin typeface="Times New Roman" panose="02020603050405020304" pitchFamily="18" charset="0"/>
+                          <a:cs typeface="Times New Roman" panose="02020603050405020304" pitchFamily="18" charset="0"/>
+                        </a:rPr>
+                        <a:t>3</a:t>
+                      </a:r>
+                      <a:endParaRPr lang="ko-KR" altLang="en-US" b="1" i="1" dirty="0">
+                        <a:latin typeface="Times New Roman" panose="02020603050405020304" pitchFamily="18" charset="0"/>
+                        <a:cs typeface="Times New Roman" panose="02020603050405020304" pitchFamily="18" charset="0"/>
+                      </a:endParaRPr>
+                    </a:p>
+                  </a:txBody>
+                  <a:tcPr/>
+                </a:tc>
+                <a:tc>
+                  <a:txBody>
+                    <a:bodyPr/>
+                    <a:lstStyle/>
+                    <a:p>
+                      <a:pPr algn="ctr" latinLnBrk="1"/>
+                      <a:r>
+                        <a:rPr lang="en-US" altLang="ko-KR" b="1" i="1" dirty="0">
+                          <a:latin typeface="Times New Roman" panose="02020603050405020304" pitchFamily="18" charset="0"/>
+                          <a:cs typeface="Times New Roman" panose="02020603050405020304" pitchFamily="18" charset="0"/>
+                        </a:rPr>
+                        <a:t>4</a:t>
+                      </a:r>
+                      <a:endParaRPr lang="ko-KR" altLang="en-US" b="1" i="1" dirty="0">
+                        <a:latin typeface="Times New Roman" panose="02020603050405020304" pitchFamily="18" charset="0"/>
+                        <a:cs typeface="Times New Roman" panose="02020603050405020304" pitchFamily="18" charset="0"/>
+                      </a:endParaRPr>
+                    </a:p>
+                  </a:txBody>
+                  <a:tcPr/>
+                </a:tc>
+                <a:tc>
+                  <a:txBody>
+                    <a:bodyPr/>
+                    <a:lstStyle/>
+                    <a:p>
+                      <a:pPr algn="ctr" latinLnBrk="1"/>
+                      <a:r>
+                        <a:rPr lang="en-US" altLang="ko-KR" b="1" i="1" dirty="0">
+                          <a:latin typeface="Times New Roman" panose="02020603050405020304" pitchFamily="18" charset="0"/>
+                          <a:cs typeface="Times New Roman" panose="02020603050405020304" pitchFamily="18" charset="0"/>
+                        </a:rPr>
+                        <a:t>5</a:t>
+                      </a:r>
+                      <a:endParaRPr lang="ko-KR" altLang="en-US" b="1" i="1" dirty="0">
+                        <a:latin typeface="Times New Roman" panose="02020603050405020304" pitchFamily="18" charset="0"/>
+                        <a:cs typeface="Times New Roman" panose="02020603050405020304" pitchFamily="18" charset="0"/>
+                      </a:endParaRPr>
+                    </a:p>
+                  </a:txBody>
+                  <a:tcPr/>
+                </a:tc>
+                <a:tc>
+                  <a:txBody>
+                    <a:bodyPr/>
+                    <a:lstStyle/>
+                    <a:p>
+                      <a:pPr algn="ctr" latinLnBrk="1"/>
+                      <a:r>
+                        <a:rPr lang="en-US" altLang="ko-KR" b="1" i="1" dirty="0">
+                          <a:latin typeface="Times New Roman" panose="02020603050405020304" pitchFamily="18" charset="0"/>
+                          <a:cs typeface="Times New Roman" panose="02020603050405020304" pitchFamily="18" charset="0"/>
+                        </a:rPr>
+                        <a:t>AVG</a:t>
+                      </a:r>
+                      <a:endParaRPr lang="ko-KR" altLang="en-US" b="1" i="1" dirty="0">
+                        <a:latin typeface="Times New Roman" panose="02020603050405020304" pitchFamily="18" charset="0"/>
+                        <a:cs typeface="Times New Roman" panose="02020603050405020304" pitchFamily="18" charset="0"/>
+                      </a:endParaRPr>
+                    </a:p>
+                  </a:txBody>
+                  <a:tcPr/>
+                </a:tc>
+                <a:extLst>
+                  <a:ext uri="{0D108BD9-81ED-4DB2-BD59-A6C34878D82A}">
+                    <a16:rowId xmlns:a16="http://schemas.microsoft.com/office/drawing/2014/main" val="1668803168"/>
+                  </a:ext>
+                </a:extLst>
+              </a:tr>
+              <a:tr h="370840">
+                <a:tc>
+                  <a:txBody>
+                    <a:bodyPr/>
+                    <a:lstStyle/>
+                    <a:p>
+                      <a:pPr algn="ctr" latinLnBrk="1"/>
+                      <a:r>
+                        <a:rPr lang="en-US" altLang="ko-KR" b="1" i="1" dirty="0">
+                          <a:latin typeface="Times New Roman" panose="02020603050405020304" pitchFamily="18" charset="0"/>
+                          <a:cs typeface="Times New Roman" panose="02020603050405020304" pitchFamily="18" charset="0"/>
+                        </a:rPr>
+                        <a:t>None</a:t>
+                      </a:r>
+                      <a:endParaRPr lang="ko-KR" altLang="en-US" b="1" i="1" dirty="0">
+                        <a:latin typeface="Times New Roman" panose="02020603050405020304" pitchFamily="18" charset="0"/>
+                        <a:cs typeface="Times New Roman" panose="02020603050405020304" pitchFamily="18" charset="0"/>
+                      </a:endParaRPr>
+                    </a:p>
+                  </a:txBody>
+                  <a:tcPr/>
+                </a:tc>
+                <a:tc>
+                  <a:txBody>
+                    <a:bodyPr/>
+                    <a:lstStyle/>
+                    <a:p>
+                      <a:pPr algn="ctr" latinLnBrk="1"/>
+                      <a:r>
+                        <a:rPr lang="en-US" altLang="ko-KR" dirty="0">
+                          <a:latin typeface="Times New Roman" panose="02020603050405020304" pitchFamily="18" charset="0"/>
+                          <a:cs typeface="Times New Roman" panose="02020603050405020304" pitchFamily="18" charset="0"/>
+                        </a:rPr>
+                        <a:t>0.99821 /</a:t>
+                      </a:r>
+                    </a:p>
+                    <a:p>
+                      <a:pPr algn="ctr" latinLnBrk="1"/>
+                      <a:r>
+                        <a:rPr lang="en-US" altLang="ko-KR" dirty="0">
+                          <a:latin typeface="Times New Roman" panose="02020603050405020304" pitchFamily="18" charset="0"/>
+                          <a:cs typeface="Times New Roman" panose="02020603050405020304" pitchFamily="18" charset="0"/>
+                        </a:rPr>
+                        <a:t>0.95147 /</a:t>
+                      </a:r>
+                    </a:p>
+                    <a:p>
+                      <a:pPr algn="ctr" latinLnBrk="1"/>
+                      <a:r>
+                        <a:rPr lang="en-US" altLang="ko-KR" dirty="0">
+                          <a:latin typeface="Times New Roman" panose="02020603050405020304" pitchFamily="18" charset="0"/>
+                          <a:cs typeface="Times New Roman" panose="02020603050405020304" pitchFamily="18" charset="0"/>
+                        </a:rPr>
+                        <a:t>0.83186</a:t>
+                      </a:r>
+                      <a:endParaRPr lang="ko-KR" altLang="en-US" dirty="0">
+                        <a:latin typeface="Times New Roman" panose="02020603050405020304" pitchFamily="18" charset="0"/>
+                        <a:cs typeface="Times New Roman" panose="02020603050405020304" pitchFamily="18" charset="0"/>
+                      </a:endParaRPr>
+                    </a:p>
+                  </a:txBody>
+                  <a:tcPr/>
+                </a:tc>
+                <a:tc>
+                  <a:txBody>
+                    <a:bodyPr/>
+                    <a:lstStyle/>
+                    <a:p>
+                      <a:pPr algn="ctr" latinLnBrk="1"/>
+                      <a:r>
+                        <a:rPr lang="en-US" altLang="ko-KR" dirty="0">
+                          <a:latin typeface="Times New Roman" panose="02020603050405020304" pitchFamily="18" charset="0"/>
+                          <a:cs typeface="Times New Roman" panose="02020603050405020304" pitchFamily="18" charset="0"/>
+                        </a:rPr>
+                        <a:t>0.99812 /</a:t>
+                      </a:r>
+                    </a:p>
+                    <a:p>
+                      <a:pPr algn="ctr" latinLnBrk="1"/>
+                      <a:r>
+                        <a:rPr lang="en-US" altLang="ko-KR" dirty="0">
+                          <a:latin typeface="Times New Roman" panose="02020603050405020304" pitchFamily="18" charset="0"/>
+                          <a:cs typeface="Times New Roman" panose="02020603050405020304" pitchFamily="18" charset="0"/>
+                        </a:rPr>
+                        <a:t>0.9488</a:t>
+                      </a:r>
+                      <a:endParaRPr lang="ko-KR" altLang="en-US" dirty="0">
+                        <a:latin typeface="Times New Roman" panose="02020603050405020304" pitchFamily="18" charset="0"/>
+                        <a:cs typeface="Times New Roman" panose="02020603050405020304" pitchFamily="18" charset="0"/>
+                      </a:endParaRPr>
+                    </a:p>
+                  </a:txBody>
+                  <a:tcPr/>
+                </a:tc>
+                <a:tc>
+                  <a:txBody>
+                    <a:bodyPr/>
+                    <a:lstStyle/>
+                    <a:p>
+                      <a:pPr algn="ctr" latinLnBrk="1"/>
+                      <a:r>
+                        <a:rPr lang="en-US" altLang="ko-KR" dirty="0">
+                          <a:latin typeface="Times New Roman" panose="02020603050405020304" pitchFamily="18" charset="0"/>
+                          <a:cs typeface="Times New Roman" panose="02020603050405020304" pitchFamily="18" charset="0"/>
+                        </a:rPr>
+                        <a:t>0.99884 /</a:t>
+                      </a:r>
+                    </a:p>
+                    <a:p>
+                      <a:pPr algn="ctr" latinLnBrk="1"/>
+                      <a:r>
+                        <a:rPr lang="en-US" altLang="ko-KR" dirty="0">
+                          <a:latin typeface="Times New Roman" panose="02020603050405020304" pitchFamily="18" charset="0"/>
+                          <a:cs typeface="Times New Roman" panose="02020603050405020304" pitchFamily="18" charset="0"/>
+                        </a:rPr>
+                        <a:t>0.96919</a:t>
+                      </a:r>
+                      <a:endParaRPr lang="ko-KR" altLang="en-US" dirty="0">
+                        <a:latin typeface="Times New Roman" panose="02020603050405020304" pitchFamily="18" charset="0"/>
+                        <a:cs typeface="Times New Roman" panose="02020603050405020304" pitchFamily="18" charset="0"/>
+                      </a:endParaRPr>
+                    </a:p>
+                  </a:txBody>
+                  <a:tcPr/>
+                </a:tc>
+                <a:tc>
+                  <a:txBody>
+                    <a:bodyPr/>
+                    <a:lstStyle/>
+                    <a:p>
+                      <a:pPr algn="ctr" latinLnBrk="1"/>
+                      <a:r>
+                        <a:rPr lang="en-US" altLang="ko-KR" dirty="0">
+                          <a:latin typeface="Times New Roman" panose="02020603050405020304" pitchFamily="18" charset="0"/>
+                          <a:cs typeface="Times New Roman" panose="02020603050405020304" pitchFamily="18" charset="0"/>
+                        </a:rPr>
+                        <a:t>0.99758 /</a:t>
+                      </a:r>
+                    </a:p>
+                    <a:p>
+                      <a:pPr algn="ctr" latinLnBrk="1"/>
+                      <a:r>
+                        <a:rPr lang="en-US" altLang="ko-KR" dirty="0">
+                          <a:latin typeface="Times New Roman" panose="02020603050405020304" pitchFamily="18" charset="0"/>
+                          <a:cs typeface="Times New Roman" panose="02020603050405020304" pitchFamily="18" charset="0"/>
+                        </a:rPr>
+                        <a:t>0.93223</a:t>
+                      </a:r>
+                      <a:endParaRPr lang="ko-KR" altLang="en-US" dirty="0">
+                        <a:latin typeface="Times New Roman" panose="02020603050405020304" pitchFamily="18" charset="0"/>
+                        <a:cs typeface="Times New Roman" panose="02020603050405020304" pitchFamily="18" charset="0"/>
+                      </a:endParaRPr>
+                    </a:p>
+                  </a:txBody>
+                  <a:tcPr/>
+                </a:tc>
+                <a:tc>
+                  <a:txBody>
+                    <a:bodyPr/>
+                    <a:lstStyle/>
+                    <a:p>
+                      <a:pPr algn="ctr" latinLnBrk="1"/>
+                      <a:r>
+                        <a:rPr lang="en-US" altLang="ko-KR" dirty="0">
+                          <a:latin typeface="Times New Roman" panose="02020603050405020304" pitchFamily="18" charset="0"/>
+                          <a:cs typeface="Times New Roman" panose="02020603050405020304" pitchFamily="18" charset="0"/>
+                        </a:rPr>
+                        <a:t>0.99848 /</a:t>
+                      </a:r>
+                    </a:p>
+                    <a:p>
+                      <a:pPr algn="ctr" latinLnBrk="1"/>
+                      <a:r>
+                        <a:rPr lang="en-US" altLang="ko-KR" dirty="0">
+                          <a:latin typeface="Times New Roman" panose="02020603050405020304" pitchFamily="18" charset="0"/>
+                          <a:cs typeface="Times New Roman" panose="02020603050405020304" pitchFamily="18" charset="0"/>
+                        </a:rPr>
+                        <a:t>0.95895</a:t>
+                      </a:r>
+                      <a:endParaRPr lang="ko-KR" altLang="en-US" dirty="0">
+                        <a:latin typeface="Times New Roman" panose="02020603050405020304" pitchFamily="18" charset="0"/>
+                        <a:cs typeface="Times New Roman" panose="02020603050405020304" pitchFamily="18" charset="0"/>
+                      </a:endParaRPr>
+                    </a:p>
+                  </a:txBody>
+                  <a:tcPr/>
+                </a:tc>
+                <a:tc>
+                  <a:txBody>
+                    <a:bodyPr/>
+                    <a:lstStyle/>
+                    <a:p>
+                      <a:pPr algn="ctr" latinLnBrk="1"/>
+                      <a:r>
+                        <a:rPr lang="en-US" altLang="ko-KR" dirty="0">
+                          <a:latin typeface="Times New Roman" panose="02020603050405020304" pitchFamily="18" charset="0"/>
+                          <a:cs typeface="Times New Roman" panose="02020603050405020304" pitchFamily="18" charset="0"/>
+                        </a:rPr>
+                        <a:t>0.998246 /</a:t>
+                      </a:r>
+                    </a:p>
+                    <a:p>
+                      <a:pPr algn="ctr" latinLnBrk="1"/>
+                      <a:r>
+                        <a:rPr lang="en-US" altLang="ko-KR" dirty="0">
+                          <a:latin typeface="Times New Roman" panose="02020603050405020304" pitchFamily="18" charset="0"/>
+                          <a:cs typeface="Times New Roman" panose="02020603050405020304" pitchFamily="18" charset="0"/>
+                        </a:rPr>
+                        <a:t>0.952128</a:t>
+                      </a:r>
+                      <a:endParaRPr lang="ko-KR" altLang="en-US" dirty="0">
+                        <a:latin typeface="Times New Roman" panose="02020603050405020304" pitchFamily="18" charset="0"/>
+                        <a:cs typeface="Times New Roman" panose="02020603050405020304" pitchFamily="18" charset="0"/>
+                      </a:endParaRPr>
+                    </a:p>
+                  </a:txBody>
+                  <a:tcPr/>
+                </a:tc>
+                <a:extLst>
+                  <a:ext uri="{0D108BD9-81ED-4DB2-BD59-A6C34878D82A}">
+                    <a16:rowId xmlns:a16="http://schemas.microsoft.com/office/drawing/2014/main" val="633390355"/>
+                  </a:ext>
+                </a:extLst>
+              </a:tr>
+              <a:tr h="370840">
+                <a:tc>
+                  <a:txBody>
+                    <a:bodyPr/>
+                    <a:lstStyle/>
+                    <a:p>
+                      <a:pPr algn="ctr" latinLnBrk="1"/>
+                      <a:r>
+                        <a:rPr lang="en-US" altLang="ko-KR" b="1" i="1" dirty="0">
+                          <a:latin typeface="Times New Roman" panose="02020603050405020304" pitchFamily="18" charset="0"/>
+                          <a:cs typeface="Times New Roman" panose="02020603050405020304" pitchFamily="18" charset="0"/>
+                        </a:rPr>
+                        <a:t>BT (</a:t>
+                      </a:r>
+                      <a:r>
+                        <a:rPr lang="en-US" altLang="ko-KR" b="1" i="1" dirty="0" err="1">
+                          <a:latin typeface="Times New Roman" panose="02020603050405020304" pitchFamily="18" charset="0"/>
+                          <a:cs typeface="Times New Roman" panose="02020603050405020304" pitchFamily="18" charset="0"/>
+                        </a:rPr>
+                        <a:t>en</a:t>
+                      </a:r>
+                      <a:r>
+                        <a:rPr lang="en-US" altLang="ko-KR" b="1" i="1" dirty="0">
+                          <a:latin typeface="Times New Roman" panose="02020603050405020304" pitchFamily="18" charset="0"/>
+                          <a:cs typeface="Times New Roman" panose="02020603050405020304" pitchFamily="18" charset="0"/>
+                        </a:rPr>
+                        <a:t>)</a:t>
+                      </a:r>
+                      <a:endParaRPr lang="ko-KR" altLang="en-US" b="1" i="1" dirty="0">
+                        <a:latin typeface="Times New Roman" panose="02020603050405020304" pitchFamily="18" charset="0"/>
+                        <a:cs typeface="Times New Roman" panose="02020603050405020304" pitchFamily="18" charset="0"/>
+                      </a:endParaRPr>
+                    </a:p>
+                  </a:txBody>
+                  <a:tcPr/>
+                </a:tc>
+                <a:tc>
+                  <a:txBody>
+                    <a:bodyPr/>
+                    <a:lstStyle/>
+                    <a:p>
+                      <a:pPr marL="0" marR="0" lvl="0" indent="0" algn="ctr" defTabSz="914400" rtl="0" eaLnBrk="1" fontAlgn="auto" latinLnBrk="1" hangingPunct="1">
+                        <a:lnSpc>
+                          <a:spcPct val="100000"/>
+                        </a:lnSpc>
+                        <a:spcBef>
+                          <a:spcPts val="0"/>
+                        </a:spcBef>
+                        <a:spcAft>
+                          <a:spcPts val="0"/>
+                        </a:spcAft>
+                        <a:buClrTx/>
+                        <a:buSzTx/>
+                        <a:buFontTx/>
+                        <a:buNone/>
+                        <a:tabLst/>
+                        <a:defRPr/>
+                      </a:pPr>
+                      <a:r>
+                        <a:rPr lang="en-US" altLang="ko-KR" dirty="0">
+                          <a:latin typeface="Times New Roman" panose="02020603050405020304" pitchFamily="18" charset="0"/>
+                          <a:cs typeface="Times New Roman" panose="02020603050405020304" pitchFamily="18" charset="0"/>
+                        </a:rPr>
+                        <a:t>0.99821 / 0.9545</a:t>
+                      </a:r>
+                      <a:endParaRPr lang="ko-KR" altLang="en-US" dirty="0">
+                        <a:latin typeface="Times New Roman" panose="02020603050405020304" pitchFamily="18" charset="0"/>
+                        <a:cs typeface="Times New Roman" panose="02020603050405020304" pitchFamily="18" charset="0"/>
+                      </a:endParaRPr>
+                    </a:p>
+                  </a:txBody>
+                  <a:tcPr/>
+                </a:tc>
+                <a:tc>
+                  <a:txBody>
+                    <a:bodyPr/>
+                    <a:lstStyle/>
+                    <a:p>
+                      <a:pPr algn="ctr" latinLnBrk="1"/>
+                      <a:r>
+                        <a:rPr lang="en-US" altLang="ko-KR" dirty="0">
+                          <a:latin typeface="Times New Roman" panose="02020603050405020304" pitchFamily="18" charset="0"/>
+                          <a:cs typeface="Times New Roman" panose="02020603050405020304" pitchFamily="18" charset="0"/>
+                        </a:rPr>
+                        <a:t>0.9983 /</a:t>
+                      </a:r>
+                    </a:p>
+                    <a:p>
+                      <a:pPr algn="ctr" latinLnBrk="1"/>
+                      <a:r>
+                        <a:rPr lang="en-US" altLang="ko-KR" dirty="0">
+                          <a:latin typeface="Times New Roman" panose="02020603050405020304" pitchFamily="18" charset="0"/>
+                          <a:cs typeface="Times New Roman" panose="02020603050405020304" pitchFamily="18" charset="0"/>
+                        </a:rPr>
+                        <a:t>0.95497</a:t>
+                      </a:r>
+                      <a:endParaRPr lang="ko-KR" altLang="en-US" dirty="0">
+                        <a:latin typeface="Times New Roman" panose="02020603050405020304" pitchFamily="18" charset="0"/>
+                        <a:cs typeface="Times New Roman" panose="02020603050405020304" pitchFamily="18" charset="0"/>
+                      </a:endParaRPr>
+                    </a:p>
+                  </a:txBody>
+                  <a:tcPr/>
+                </a:tc>
+                <a:tc>
+                  <a:txBody>
+                    <a:bodyPr/>
+                    <a:lstStyle/>
+                    <a:p>
+                      <a:pPr algn="ctr" latinLnBrk="1"/>
+                      <a:r>
+                        <a:rPr lang="en-US" altLang="ko-KR" dirty="0">
+                          <a:latin typeface="Times New Roman" panose="02020603050405020304" pitchFamily="18" charset="0"/>
+                          <a:cs typeface="Times New Roman" panose="02020603050405020304" pitchFamily="18" charset="0"/>
+                        </a:rPr>
+                        <a:t>0.9983 /</a:t>
+                      </a:r>
+                    </a:p>
+                    <a:p>
+                      <a:pPr algn="ctr" latinLnBrk="1"/>
+                      <a:r>
+                        <a:rPr lang="en-US" altLang="ko-KR" dirty="0">
+                          <a:latin typeface="Times New Roman" panose="02020603050405020304" pitchFamily="18" charset="0"/>
+                          <a:cs typeface="Times New Roman" panose="02020603050405020304" pitchFamily="18" charset="0"/>
+                        </a:rPr>
+                        <a:t>0.95538</a:t>
+                      </a:r>
+                      <a:endParaRPr lang="ko-KR" altLang="en-US" dirty="0">
+                        <a:latin typeface="Times New Roman" panose="02020603050405020304" pitchFamily="18" charset="0"/>
+                        <a:cs typeface="Times New Roman" panose="02020603050405020304" pitchFamily="18" charset="0"/>
+                      </a:endParaRPr>
+                    </a:p>
+                  </a:txBody>
+                  <a:tcPr/>
+                </a:tc>
+                <a:tc>
+                  <a:txBody>
+                    <a:bodyPr/>
+                    <a:lstStyle/>
+                    <a:p>
+                      <a:pPr algn="ctr" latinLnBrk="1"/>
+                      <a:r>
+                        <a:rPr lang="en-US" altLang="ko-KR" dirty="0">
+                          <a:latin typeface="Times New Roman" panose="02020603050405020304" pitchFamily="18" charset="0"/>
+                          <a:cs typeface="Times New Roman" panose="02020603050405020304" pitchFamily="18" charset="0"/>
+                        </a:rPr>
+                        <a:t>0.99785 /</a:t>
+                      </a:r>
+                    </a:p>
+                    <a:p>
+                      <a:pPr algn="ctr" latinLnBrk="1"/>
+                      <a:r>
+                        <a:rPr lang="en-US" altLang="ko-KR" dirty="0">
+                          <a:latin typeface="Times New Roman" panose="02020603050405020304" pitchFamily="18" charset="0"/>
+                          <a:cs typeface="Times New Roman" panose="02020603050405020304" pitchFamily="18" charset="0"/>
+                        </a:rPr>
+                        <a:t>0.94232</a:t>
+                      </a:r>
+                      <a:endParaRPr lang="ko-KR" altLang="en-US" dirty="0">
+                        <a:latin typeface="Times New Roman" panose="02020603050405020304" pitchFamily="18" charset="0"/>
+                        <a:cs typeface="Times New Roman" panose="02020603050405020304" pitchFamily="18" charset="0"/>
+                      </a:endParaRPr>
+                    </a:p>
+                  </a:txBody>
+                  <a:tcPr/>
+                </a:tc>
+                <a:tc>
+                  <a:txBody>
+                    <a:bodyPr/>
+                    <a:lstStyle/>
+                    <a:p>
+                      <a:pPr algn="ctr" latinLnBrk="1"/>
+                      <a:r>
+                        <a:rPr lang="en-US" altLang="ko-KR" dirty="0">
+                          <a:latin typeface="Times New Roman" panose="02020603050405020304" pitchFamily="18" charset="0"/>
+                          <a:cs typeface="Times New Roman" panose="02020603050405020304" pitchFamily="18" charset="0"/>
+                        </a:rPr>
+                        <a:t>0.99857 /</a:t>
+                      </a:r>
+                    </a:p>
+                    <a:p>
+                      <a:pPr algn="ctr" latinLnBrk="1"/>
+                      <a:r>
+                        <a:rPr lang="en-US" altLang="ko-KR" dirty="0">
+                          <a:latin typeface="Times New Roman" panose="02020603050405020304" pitchFamily="18" charset="0"/>
+                          <a:cs typeface="Times New Roman" panose="02020603050405020304" pitchFamily="18" charset="0"/>
+                        </a:rPr>
+                        <a:t>0.96294</a:t>
+                      </a:r>
+                      <a:endParaRPr lang="ko-KR" altLang="en-US" dirty="0">
+                        <a:latin typeface="Times New Roman" panose="02020603050405020304" pitchFamily="18" charset="0"/>
+                        <a:cs typeface="Times New Roman" panose="02020603050405020304" pitchFamily="18" charset="0"/>
+                      </a:endParaRPr>
+                    </a:p>
+                  </a:txBody>
+                  <a:tcPr/>
+                </a:tc>
+                <a:tc>
+                  <a:txBody>
+                    <a:bodyPr/>
+                    <a:lstStyle/>
+                    <a:p>
+                      <a:pPr algn="ctr" latinLnBrk="1"/>
+                      <a:r>
+                        <a:rPr lang="en-US" altLang="ko-KR" dirty="0">
+                          <a:latin typeface="Times New Roman" panose="02020603050405020304" pitchFamily="18" charset="0"/>
+                          <a:cs typeface="Times New Roman" panose="02020603050405020304" pitchFamily="18" charset="0"/>
+                        </a:rPr>
+                        <a:t>0.99857 /</a:t>
+                      </a:r>
+                    </a:p>
+                    <a:p>
+                      <a:pPr algn="ctr" latinLnBrk="1"/>
+                      <a:r>
+                        <a:rPr lang="en-US" altLang="ko-KR" dirty="0">
+                          <a:latin typeface="Times New Roman" panose="02020603050405020304" pitchFamily="18" charset="0"/>
+                          <a:cs typeface="Times New Roman" panose="02020603050405020304" pitchFamily="18" charset="0"/>
+                        </a:rPr>
+                        <a:t>0.96294</a:t>
+                      </a:r>
+                      <a:endParaRPr lang="ko-KR" altLang="en-US" dirty="0">
+                        <a:latin typeface="Times New Roman" panose="02020603050405020304" pitchFamily="18" charset="0"/>
+                        <a:cs typeface="Times New Roman" panose="02020603050405020304" pitchFamily="18" charset="0"/>
+                      </a:endParaRPr>
+                    </a:p>
+                  </a:txBody>
+                  <a:tcPr/>
+                </a:tc>
+                <a:extLst>
+                  <a:ext uri="{0D108BD9-81ED-4DB2-BD59-A6C34878D82A}">
+                    <a16:rowId xmlns:a16="http://schemas.microsoft.com/office/drawing/2014/main" val="419997669"/>
+                  </a:ext>
+                </a:extLst>
+              </a:tr>
+              <a:tr h="370840">
+                <a:tc>
+                  <a:txBody>
+                    <a:bodyPr/>
+                    <a:lstStyle/>
+                    <a:p>
+                      <a:pPr algn="ctr" latinLnBrk="1"/>
+                      <a:r>
+                        <a:rPr lang="en-US" altLang="ko-KR" b="1" i="1" dirty="0">
+                          <a:latin typeface="Times New Roman" panose="02020603050405020304" pitchFamily="18" charset="0"/>
+                          <a:cs typeface="Times New Roman" panose="02020603050405020304" pitchFamily="18" charset="0"/>
+                        </a:rPr>
+                        <a:t>BT (</a:t>
+                      </a:r>
+                      <a:r>
+                        <a:rPr lang="en-US" altLang="ko-KR" b="1" i="1" dirty="0" err="1">
+                          <a:latin typeface="Times New Roman" panose="02020603050405020304" pitchFamily="18" charset="0"/>
+                          <a:cs typeface="Times New Roman" panose="02020603050405020304" pitchFamily="18" charset="0"/>
+                        </a:rPr>
+                        <a:t>jp</a:t>
+                      </a:r>
+                      <a:r>
+                        <a:rPr lang="en-US" altLang="ko-KR" b="1" i="1" dirty="0">
+                          <a:latin typeface="Times New Roman" panose="02020603050405020304" pitchFamily="18" charset="0"/>
+                          <a:cs typeface="Times New Roman" panose="02020603050405020304" pitchFamily="18" charset="0"/>
+                        </a:rPr>
+                        <a:t>)</a:t>
+                      </a:r>
+                      <a:endParaRPr lang="ko-KR" altLang="en-US" b="1" i="1" dirty="0">
+                        <a:latin typeface="Times New Roman" panose="02020603050405020304" pitchFamily="18" charset="0"/>
+                        <a:cs typeface="Times New Roman" panose="02020603050405020304" pitchFamily="18" charset="0"/>
+                      </a:endParaRPr>
+                    </a:p>
+                  </a:txBody>
+                  <a:tcPr/>
+                </a:tc>
+                <a:tc>
+                  <a:txBody>
+                    <a:bodyPr/>
+                    <a:lstStyle/>
+                    <a:p>
+                      <a:pPr algn="ctr" latinLnBrk="1"/>
+                      <a:endParaRPr lang="ko-KR" altLang="en-US" dirty="0">
+                        <a:latin typeface="Times New Roman" panose="02020603050405020304" pitchFamily="18" charset="0"/>
+                        <a:cs typeface="Times New Roman" panose="02020603050405020304" pitchFamily="18" charset="0"/>
+                      </a:endParaRPr>
+                    </a:p>
+                  </a:txBody>
+                  <a:tcPr/>
+                </a:tc>
+                <a:tc>
+                  <a:txBody>
+                    <a:bodyPr/>
+                    <a:lstStyle/>
+                    <a:p>
+                      <a:pPr algn="ctr" latinLnBrk="1"/>
+                      <a:endParaRPr lang="ko-KR" altLang="en-US" dirty="0">
+                        <a:latin typeface="Times New Roman" panose="02020603050405020304" pitchFamily="18" charset="0"/>
+                        <a:cs typeface="Times New Roman" panose="02020603050405020304" pitchFamily="18" charset="0"/>
+                      </a:endParaRPr>
+                    </a:p>
+                  </a:txBody>
+                  <a:tcPr/>
+                </a:tc>
+                <a:tc>
+                  <a:txBody>
+                    <a:bodyPr/>
+                    <a:lstStyle/>
+                    <a:p>
+                      <a:pPr algn="ctr" latinLnBrk="1"/>
+                      <a:endParaRPr lang="ko-KR" altLang="en-US" dirty="0">
+                        <a:latin typeface="Times New Roman" panose="02020603050405020304" pitchFamily="18" charset="0"/>
+                        <a:cs typeface="Times New Roman" panose="02020603050405020304" pitchFamily="18" charset="0"/>
+                      </a:endParaRPr>
+                    </a:p>
+                  </a:txBody>
+                  <a:tcPr/>
+                </a:tc>
+                <a:tc>
+                  <a:txBody>
+                    <a:bodyPr/>
+                    <a:lstStyle/>
+                    <a:p>
+                      <a:pPr algn="ctr" latinLnBrk="1"/>
+                      <a:endParaRPr lang="ko-KR" altLang="en-US">
+                        <a:latin typeface="Times New Roman" panose="02020603050405020304" pitchFamily="18" charset="0"/>
+                        <a:cs typeface="Times New Roman" panose="02020603050405020304" pitchFamily="18" charset="0"/>
+                      </a:endParaRPr>
+                    </a:p>
+                  </a:txBody>
+                  <a:tcPr/>
+                </a:tc>
+                <a:tc>
+                  <a:txBody>
+                    <a:bodyPr/>
+                    <a:lstStyle/>
+                    <a:p>
+                      <a:pPr algn="ctr" latinLnBrk="1"/>
+                      <a:endParaRPr lang="ko-KR" altLang="en-US">
+                        <a:latin typeface="Times New Roman" panose="02020603050405020304" pitchFamily="18" charset="0"/>
+                        <a:cs typeface="Times New Roman" panose="02020603050405020304" pitchFamily="18" charset="0"/>
+                      </a:endParaRPr>
+                    </a:p>
+                  </a:txBody>
+                  <a:tcPr/>
+                </a:tc>
+                <a:tc>
+                  <a:txBody>
+                    <a:bodyPr/>
+                    <a:lstStyle/>
+                    <a:p>
+                      <a:pPr algn="ctr" latinLnBrk="1"/>
+                      <a:endParaRPr lang="ko-KR" altLang="en-US" dirty="0">
+                        <a:latin typeface="Times New Roman" panose="02020603050405020304" pitchFamily="18" charset="0"/>
+                        <a:cs typeface="Times New Roman" panose="02020603050405020304" pitchFamily="18" charset="0"/>
+                      </a:endParaRPr>
+                    </a:p>
+                  </a:txBody>
+                  <a:tcPr/>
+                </a:tc>
+                <a:extLst>
+                  <a:ext uri="{0D108BD9-81ED-4DB2-BD59-A6C34878D82A}">
+                    <a16:rowId xmlns:a16="http://schemas.microsoft.com/office/drawing/2014/main" val="3574362841"/>
+                  </a:ext>
+                </a:extLst>
+              </a:tr>
+              <a:tr h="370840">
+                <a:tc>
+                  <a:txBody>
+                    <a:bodyPr/>
+                    <a:lstStyle/>
+                    <a:p>
+                      <a:pPr algn="ctr" latinLnBrk="1"/>
+                      <a:r>
+                        <a:rPr lang="en-US" altLang="ko-KR" b="1" i="1" dirty="0">
+                          <a:latin typeface="Times New Roman" panose="02020603050405020304" pitchFamily="18" charset="0"/>
+                          <a:cs typeface="Times New Roman" panose="02020603050405020304" pitchFamily="18" charset="0"/>
+                        </a:rPr>
+                        <a:t>BT (</a:t>
+                      </a:r>
+                      <a:r>
+                        <a:rPr lang="en-US" altLang="ko-KR" b="1" i="1" dirty="0" err="1">
+                          <a:latin typeface="Times New Roman" panose="02020603050405020304" pitchFamily="18" charset="0"/>
+                          <a:cs typeface="Times New Roman" panose="02020603050405020304" pitchFamily="18" charset="0"/>
+                        </a:rPr>
+                        <a:t>en</a:t>
+                      </a:r>
+                      <a:r>
+                        <a:rPr lang="en-US" altLang="ko-KR" b="1" i="1" dirty="0">
+                          <a:latin typeface="Times New Roman" panose="02020603050405020304" pitchFamily="18" charset="0"/>
+                          <a:cs typeface="Times New Roman" panose="02020603050405020304" pitchFamily="18" charset="0"/>
+                        </a:rPr>
+                        <a:t>, </a:t>
+                      </a:r>
+                      <a:r>
+                        <a:rPr lang="en-US" altLang="ko-KR" b="1" i="1" dirty="0" err="1">
+                          <a:latin typeface="Times New Roman" panose="02020603050405020304" pitchFamily="18" charset="0"/>
+                          <a:cs typeface="Times New Roman" panose="02020603050405020304" pitchFamily="18" charset="0"/>
+                        </a:rPr>
+                        <a:t>jp</a:t>
+                      </a:r>
+                      <a:r>
+                        <a:rPr lang="en-US" altLang="ko-KR" b="1" i="1" dirty="0">
+                          <a:latin typeface="Times New Roman" panose="02020603050405020304" pitchFamily="18" charset="0"/>
+                          <a:cs typeface="Times New Roman" panose="02020603050405020304" pitchFamily="18" charset="0"/>
+                        </a:rPr>
+                        <a:t>)</a:t>
+                      </a:r>
+                      <a:endParaRPr lang="ko-KR" altLang="en-US" b="1" i="1" dirty="0">
+                        <a:latin typeface="Times New Roman" panose="02020603050405020304" pitchFamily="18" charset="0"/>
+                        <a:cs typeface="Times New Roman" panose="02020603050405020304" pitchFamily="18" charset="0"/>
+                      </a:endParaRPr>
+                    </a:p>
+                  </a:txBody>
+                  <a:tcPr/>
+                </a:tc>
+                <a:tc>
+                  <a:txBody>
+                    <a:bodyPr/>
+                    <a:lstStyle/>
+                    <a:p>
+                      <a:pPr algn="ctr" latinLnBrk="1"/>
+                      <a:endParaRPr lang="ko-KR" altLang="en-US" dirty="0">
+                        <a:latin typeface="Times New Roman" panose="02020603050405020304" pitchFamily="18" charset="0"/>
+                        <a:cs typeface="Times New Roman" panose="02020603050405020304" pitchFamily="18" charset="0"/>
+                      </a:endParaRPr>
+                    </a:p>
+                  </a:txBody>
+                  <a:tcPr/>
+                </a:tc>
+                <a:tc>
+                  <a:txBody>
+                    <a:bodyPr/>
+                    <a:lstStyle/>
+                    <a:p>
+                      <a:pPr algn="ctr" latinLnBrk="1"/>
+                      <a:endParaRPr lang="ko-KR" altLang="en-US" dirty="0">
+                        <a:latin typeface="Times New Roman" panose="02020603050405020304" pitchFamily="18" charset="0"/>
+                        <a:cs typeface="Times New Roman" panose="02020603050405020304" pitchFamily="18" charset="0"/>
+                      </a:endParaRPr>
+                    </a:p>
+                  </a:txBody>
+                  <a:tcPr/>
+                </a:tc>
+                <a:tc>
+                  <a:txBody>
+                    <a:bodyPr/>
+                    <a:lstStyle/>
+                    <a:p>
+                      <a:pPr algn="ctr" latinLnBrk="1"/>
+                      <a:endParaRPr lang="ko-KR" altLang="en-US" dirty="0">
+                        <a:latin typeface="Times New Roman" panose="02020603050405020304" pitchFamily="18" charset="0"/>
+                        <a:cs typeface="Times New Roman" panose="02020603050405020304" pitchFamily="18" charset="0"/>
+                      </a:endParaRPr>
+                    </a:p>
+                  </a:txBody>
+                  <a:tcPr/>
+                </a:tc>
+                <a:tc>
+                  <a:txBody>
+                    <a:bodyPr/>
+                    <a:lstStyle/>
+                    <a:p>
+                      <a:pPr algn="ctr" latinLnBrk="1"/>
+                      <a:endParaRPr lang="ko-KR" altLang="en-US">
+                        <a:latin typeface="Times New Roman" panose="02020603050405020304" pitchFamily="18" charset="0"/>
+                        <a:cs typeface="Times New Roman" panose="02020603050405020304" pitchFamily="18" charset="0"/>
+                      </a:endParaRPr>
+                    </a:p>
+                  </a:txBody>
+                  <a:tcPr/>
+                </a:tc>
+                <a:tc>
+                  <a:txBody>
+                    <a:bodyPr/>
+                    <a:lstStyle/>
+                    <a:p>
+                      <a:pPr algn="ctr" latinLnBrk="1"/>
+                      <a:endParaRPr lang="ko-KR" altLang="en-US" dirty="0">
+                        <a:latin typeface="Times New Roman" panose="02020603050405020304" pitchFamily="18" charset="0"/>
+                        <a:cs typeface="Times New Roman" panose="02020603050405020304" pitchFamily="18" charset="0"/>
+                      </a:endParaRPr>
+                    </a:p>
+                  </a:txBody>
+                  <a:tcPr/>
+                </a:tc>
+                <a:tc>
+                  <a:txBody>
+                    <a:bodyPr/>
+                    <a:lstStyle/>
+                    <a:p>
+                      <a:pPr algn="ctr" latinLnBrk="1"/>
+                      <a:endParaRPr lang="ko-KR" altLang="en-US" dirty="0">
+                        <a:latin typeface="Times New Roman" panose="02020603050405020304" pitchFamily="18" charset="0"/>
+                        <a:cs typeface="Times New Roman" panose="02020603050405020304" pitchFamily="18" charset="0"/>
+                      </a:endParaRPr>
+                    </a:p>
+                  </a:txBody>
+                  <a:tcPr/>
+                </a:tc>
+                <a:extLst>
+                  <a:ext uri="{0D108BD9-81ED-4DB2-BD59-A6C34878D82A}">
+                    <a16:rowId xmlns:a16="http://schemas.microsoft.com/office/drawing/2014/main" val="915100308"/>
+                  </a:ext>
+                </a:extLst>
+              </a:tr>
+              <a:tr h="370840">
+                <a:tc>
+                  <a:txBody>
+                    <a:bodyPr/>
+                    <a:lstStyle/>
+                    <a:p>
+                      <a:pPr algn="ctr" latinLnBrk="1"/>
+                      <a:r>
+                        <a:rPr lang="en-US" altLang="ko-KR" b="1" i="1" dirty="0">
+                          <a:latin typeface="Times New Roman" panose="02020603050405020304" pitchFamily="18" charset="0"/>
+                          <a:cs typeface="Times New Roman" panose="02020603050405020304" pitchFamily="18" charset="0"/>
+                        </a:rPr>
+                        <a:t>SR</a:t>
+                      </a:r>
+                      <a:endParaRPr lang="ko-KR" altLang="en-US" b="1" i="1" dirty="0">
+                        <a:latin typeface="Times New Roman" panose="02020603050405020304" pitchFamily="18" charset="0"/>
+                        <a:cs typeface="Times New Roman" panose="02020603050405020304" pitchFamily="18" charset="0"/>
+                      </a:endParaRPr>
+                    </a:p>
+                  </a:txBody>
+                  <a:tcPr/>
+                </a:tc>
+                <a:tc>
+                  <a:txBody>
+                    <a:bodyPr/>
+                    <a:lstStyle/>
+                    <a:p>
+                      <a:pPr algn="ctr" latinLnBrk="1"/>
+                      <a:endParaRPr lang="ko-KR" altLang="en-US" dirty="0">
+                        <a:latin typeface="Times New Roman" panose="02020603050405020304" pitchFamily="18" charset="0"/>
+                        <a:cs typeface="Times New Roman" panose="02020603050405020304" pitchFamily="18" charset="0"/>
+                      </a:endParaRPr>
+                    </a:p>
+                  </a:txBody>
+                  <a:tcPr/>
+                </a:tc>
+                <a:tc>
+                  <a:txBody>
+                    <a:bodyPr/>
+                    <a:lstStyle/>
+                    <a:p>
+                      <a:pPr algn="ctr" latinLnBrk="1"/>
+                      <a:endParaRPr lang="ko-KR" altLang="en-US" dirty="0">
+                        <a:latin typeface="Times New Roman" panose="02020603050405020304" pitchFamily="18" charset="0"/>
+                        <a:cs typeface="Times New Roman" panose="02020603050405020304" pitchFamily="18" charset="0"/>
+                      </a:endParaRPr>
+                    </a:p>
+                  </a:txBody>
+                  <a:tcPr/>
+                </a:tc>
+                <a:tc>
+                  <a:txBody>
+                    <a:bodyPr/>
+                    <a:lstStyle/>
+                    <a:p>
+                      <a:pPr algn="ctr" latinLnBrk="1"/>
+                      <a:endParaRPr lang="ko-KR" altLang="en-US" dirty="0">
+                        <a:latin typeface="Times New Roman" panose="02020603050405020304" pitchFamily="18" charset="0"/>
+                        <a:cs typeface="Times New Roman" panose="02020603050405020304" pitchFamily="18" charset="0"/>
+                      </a:endParaRPr>
+                    </a:p>
+                  </a:txBody>
+                  <a:tcPr/>
+                </a:tc>
+                <a:tc>
+                  <a:txBody>
+                    <a:bodyPr/>
+                    <a:lstStyle/>
+                    <a:p>
+                      <a:pPr algn="ctr" latinLnBrk="1"/>
+                      <a:endParaRPr lang="ko-KR" altLang="en-US" dirty="0">
+                        <a:latin typeface="Times New Roman" panose="02020603050405020304" pitchFamily="18" charset="0"/>
+                        <a:cs typeface="Times New Roman" panose="02020603050405020304" pitchFamily="18" charset="0"/>
+                      </a:endParaRPr>
+                    </a:p>
+                  </a:txBody>
+                  <a:tcPr/>
+                </a:tc>
+                <a:tc>
+                  <a:txBody>
+                    <a:bodyPr/>
+                    <a:lstStyle/>
+                    <a:p>
+                      <a:pPr algn="ctr" latinLnBrk="1"/>
+                      <a:endParaRPr lang="ko-KR" altLang="en-US" dirty="0">
+                        <a:latin typeface="Times New Roman" panose="02020603050405020304" pitchFamily="18" charset="0"/>
+                        <a:cs typeface="Times New Roman" panose="02020603050405020304" pitchFamily="18" charset="0"/>
+                      </a:endParaRPr>
+                    </a:p>
+                  </a:txBody>
+                  <a:tcPr/>
+                </a:tc>
+                <a:tc>
+                  <a:txBody>
+                    <a:bodyPr/>
+                    <a:lstStyle/>
+                    <a:p>
+                      <a:pPr algn="ctr" latinLnBrk="1"/>
+                      <a:endParaRPr lang="ko-KR" altLang="en-US" dirty="0">
+                        <a:latin typeface="Times New Roman" panose="02020603050405020304" pitchFamily="18" charset="0"/>
+                        <a:cs typeface="Times New Roman" panose="02020603050405020304" pitchFamily="18" charset="0"/>
+                      </a:endParaRPr>
+                    </a:p>
+                  </a:txBody>
+                  <a:tcPr/>
+                </a:tc>
+                <a:extLst>
+                  <a:ext uri="{0D108BD9-81ED-4DB2-BD59-A6C34878D82A}">
+                    <a16:rowId xmlns:a16="http://schemas.microsoft.com/office/drawing/2014/main" val="3338720211"/>
+                  </a:ext>
+                </a:extLst>
+              </a:tr>
+              <a:tr h="370840">
+                <a:tc>
+                  <a:txBody>
+                    <a:bodyPr/>
+                    <a:lstStyle/>
+                    <a:p>
+                      <a:pPr algn="ctr" latinLnBrk="1"/>
+                      <a:r>
+                        <a:rPr lang="en-US" altLang="ko-KR" b="1" i="1" dirty="0">
+                          <a:latin typeface="Times New Roman" panose="02020603050405020304" pitchFamily="18" charset="0"/>
+                          <a:cs typeface="Times New Roman" panose="02020603050405020304" pitchFamily="18" charset="0"/>
+                        </a:rPr>
+                        <a:t>RI</a:t>
+                      </a:r>
+                      <a:endParaRPr lang="ko-KR" altLang="en-US" b="1" i="1" dirty="0">
+                        <a:latin typeface="Times New Roman" panose="02020603050405020304" pitchFamily="18" charset="0"/>
+                        <a:cs typeface="Times New Roman" panose="02020603050405020304" pitchFamily="18" charset="0"/>
+                      </a:endParaRPr>
+                    </a:p>
+                  </a:txBody>
+                  <a:tcPr/>
+                </a:tc>
+                <a:tc>
+                  <a:txBody>
+                    <a:bodyPr/>
+                    <a:lstStyle/>
+                    <a:p>
+                      <a:pPr algn="ctr" latinLnBrk="1"/>
+                      <a:endParaRPr lang="ko-KR" altLang="en-US">
+                        <a:latin typeface="Times New Roman" panose="02020603050405020304" pitchFamily="18" charset="0"/>
+                        <a:cs typeface="Times New Roman" panose="02020603050405020304" pitchFamily="18" charset="0"/>
+                      </a:endParaRPr>
+                    </a:p>
+                  </a:txBody>
+                  <a:tcPr/>
+                </a:tc>
+                <a:tc>
+                  <a:txBody>
+                    <a:bodyPr/>
+                    <a:lstStyle/>
+                    <a:p>
+                      <a:pPr algn="ctr" latinLnBrk="1"/>
+                      <a:endParaRPr lang="ko-KR" altLang="en-US" dirty="0">
+                        <a:latin typeface="Times New Roman" panose="02020603050405020304" pitchFamily="18" charset="0"/>
+                        <a:cs typeface="Times New Roman" panose="02020603050405020304" pitchFamily="18" charset="0"/>
+                      </a:endParaRPr>
+                    </a:p>
+                  </a:txBody>
+                  <a:tcPr/>
+                </a:tc>
+                <a:tc>
+                  <a:txBody>
+                    <a:bodyPr/>
+                    <a:lstStyle/>
+                    <a:p>
+                      <a:pPr algn="ctr" latinLnBrk="1"/>
+                      <a:endParaRPr lang="ko-KR" altLang="en-US">
+                        <a:latin typeface="Times New Roman" panose="02020603050405020304" pitchFamily="18" charset="0"/>
+                        <a:cs typeface="Times New Roman" panose="02020603050405020304" pitchFamily="18" charset="0"/>
+                      </a:endParaRPr>
+                    </a:p>
+                  </a:txBody>
+                  <a:tcPr/>
+                </a:tc>
+                <a:tc>
+                  <a:txBody>
+                    <a:bodyPr/>
+                    <a:lstStyle/>
+                    <a:p>
+                      <a:pPr algn="ctr" latinLnBrk="1"/>
+                      <a:endParaRPr lang="ko-KR" altLang="en-US">
+                        <a:latin typeface="Times New Roman" panose="02020603050405020304" pitchFamily="18" charset="0"/>
+                        <a:cs typeface="Times New Roman" panose="02020603050405020304" pitchFamily="18" charset="0"/>
+                      </a:endParaRPr>
+                    </a:p>
+                  </a:txBody>
+                  <a:tcPr/>
+                </a:tc>
+                <a:tc>
+                  <a:txBody>
+                    <a:bodyPr/>
+                    <a:lstStyle/>
+                    <a:p>
+                      <a:pPr algn="ctr" latinLnBrk="1"/>
+                      <a:endParaRPr lang="ko-KR" altLang="en-US" dirty="0">
+                        <a:latin typeface="Times New Roman" panose="02020603050405020304" pitchFamily="18" charset="0"/>
+                        <a:cs typeface="Times New Roman" panose="02020603050405020304" pitchFamily="18" charset="0"/>
+                      </a:endParaRPr>
+                    </a:p>
+                  </a:txBody>
+                  <a:tcPr/>
+                </a:tc>
+                <a:tc>
+                  <a:txBody>
+                    <a:bodyPr/>
+                    <a:lstStyle/>
+                    <a:p>
+                      <a:pPr algn="ctr" latinLnBrk="1"/>
+                      <a:endParaRPr lang="ko-KR" altLang="en-US" dirty="0">
+                        <a:latin typeface="Times New Roman" panose="02020603050405020304" pitchFamily="18" charset="0"/>
+                        <a:cs typeface="Times New Roman" panose="02020603050405020304" pitchFamily="18" charset="0"/>
+                      </a:endParaRPr>
+                    </a:p>
+                  </a:txBody>
+                  <a:tcPr/>
+                </a:tc>
+                <a:extLst>
+                  <a:ext uri="{0D108BD9-81ED-4DB2-BD59-A6C34878D82A}">
+                    <a16:rowId xmlns:a16="http://schemas.microsoft.com/office/drawing/2014/main" val="2301365062"/>
+                  </a:ext>
+                </a:extLst>
+              </a:tr>
+              <a:tr h="370840">
+                <a:tc>
+                  <a:txBody>
+                    <a:bodyPr/>
+                    <a:lstStyle/>
+                    <a:p>
+                      <a:pPr algn="ctr" latinLnBrk="1"/>
+                      <a:r>
+                        <a:rPr lang="en-US" altLang="ko-KR" b="1" i="1" dirty="0">
+                          <a:latin typeface="Times New Roman" panose="02020603050405020304" pitchFamily="18" charset="0"/>
+                          <a:cs typeface="Times New Roman" panose="02020603050405020304" pitchFamily="18" charset="0"/>
+                        </a:rPr>
+                        <a:t>RS</a:t>
+                      </a:r>
+                      <a:endParaRPr lang="ko-KR" altLang="en-US" b="1" i="1" dirty="0">
+                        <a:latin typeface="Times New Roman" panose="02020603050405020304" pitchFamily="18" charset="0"/>
+                        <a:cs typeface="Times New Roman" panose="02020603050405020304" pitchFamily="18" charset="0"/>
+                      </a:endParaRPr>
+                    </a:p>
+                  </a:txBody>
+                  <a:tcPr/>
+                </a:tc>
+                <a:tc>
+                  <a:txBody>
+                    <a:bodyPr/>
+                    <a:lstStyle/>
+                    <a:p>
+                      <a:pPr algn="ctr" latinLnBrk="1"/>
+                      <a:endParaRPr lang="ko-KR" altLang="en-US">
+                        <a:latin typeface="Times New Roman" panose="02020603050405020304" pitchFamily="18" charset="0"/>
+                        <a:cs typeface="Times New Roman" panose="02020603050405020304" pitchFamily="18" charset="0"/>
+                      </a:endParaRPr>
+                    </a:p>
+                  </a:txBody>
+                  <a:tcPr/>
+                </a:tc>
+                <a:tc>
+                  <a:txBody>
+                    <a:bodyPr/>
+                    <a:lstStyle/>
+                    <a:p>
+                      <a:pPr algn="ctr" latinLnBrk="1"/>
+                      <a:endParaRPr lang="ko-KR" altLang="en-US" dirty="0">
+                        <a:latin typeface="Times New Roman" panose="02020603050405020304" pitchFamily="18" charset="0"/>
+                        <a:cs typeface="Times New Roman" panose="02020603050405020304" pitchFamily="18" charset="0"/>
+                      </a:endParaRPr>
+                    </a:p>
+                  </a:txBody>
+                  <a:tcPr/>
+                </a:tc>
+                <a:tc>
+                  <a:txBody>
+                    <a:bodyPr/>
+                    <a:lstStyle/>
+                    <a:p>
+                      <a:pPr algn="ctr" latinLnBrk="1"/>
+                      <a:endParaRPr lang="ko-KR" altLang="en-US" dirty="0">
+                        <a:latin typeface="Times New Roman" panose="02020603050405020304" pitchFamily="18" charset="0"/>
+                        <a:cs typeface="Times New Roman" panose="02020603050405020304" pitchFamily="18" charset="0"/>
+                      </a:endParaRPr>
+                    </a:p>
+                  </a:txBody>
+                  <a:tcPr/>
+                </a:tc>
+                <a:tc>
+                  <a:txBody>
+                    <a:bodyPr/>
+                    <a:lstStyle/>
+                    <a:p>
+                      <a:pPr algn="ctr" latinLnBrk="1"/>
+                      <a:endParaRPr lang="ko-KR" altLang="en-US" dirty="0">
+                        <a:latin typeface="Times New Roman" panose="02020603050405020304" pitchFamily="18" charset="0"/>
+                        <a:cs typeface="Times New Roman" panose="02020603050405020304" pitchFamily="18" charset="0"/>
+                      </a:endParaRPr>
+                    </a:p>
+                  </a:txBody>
+                  <a:tcPr/>
+                </a:tc>
+                <a:tc>
+                  <a:txBody>
+                    <a:bodyPr/>
+                    <a:lstStyle/>
+                    <a:p>
+                      <a:pPr algn="ctr" latinLnBrk="1"/>
+                      <a:endParaRPr lang="ko-KR" altLang="en-US" dirty="0">
+                        <a:latin typeface="Times New Roman" panose="02020603050405020304" pitchFamily="18" charset="0"/>
+                        <a:cs typeface="Times New Roman" panose="02020603050405020304" pitchFamily="18" charset="0"/>
+                      </a:endParaRPr>
+                    </a:p>
+                  </a:txBody>
+                  <a:tcPr/>
+                </a:tc>
+                <a:tc>
+                  <a:txBody>
+                    <a:bodyPr/>
+                    <a:lstStyle/>
+                    <a:p>
+                      <a:pPr algn="ctr" latinLnBrk="1"/>
+                      <a:endParaRPr lang="ko-KR" altLang="en-US" dirty="0">
+                        <a:latin typeface="Times New Roman" panose="02020603050405020304" pitchFamily="18" charset="0"/>
+                        <a:cs typeface="Times New Roman" panose="02020603050405020304" pitchFamily="18" charset="0"/>
+                      </a:endParaRPr>
+                    </a:p>
+                  </a:txBody>
+                  <a:tcPr/>
+                </a:tc>
+                <a:extLst>
+                  <a:ext uri="{0D108BD9-81ED-4DB2-BD59-A6C34878D82A}">
+                    <a16:rowId xmlns:a16="http://schemas.microsoft.com/office/drawing/2014/main" val="124352940"/>
+                  </a:ext>
+                </a:extLst>
+              </a:tr>
+              <a:tr h="370840">
+                <a:tc>
+                  <a:txBody>
+                    <a:bodyPr/>
+                    <a:lstStyle/>
+                    <a:p>
+                      <a:pPr algn="ctr" latinLnBrk="1"/>
+                      <a:r>
+                        <a:rPr lang="en-US" altLang="ko-KR" b="1" i="1" dirty="0">
+                          <a:latin typeface="Times New Roman" panose="02020603050405020304" pitchFamily="18" charset="0"/>
+                          <a:cs typeface="Times New Roman" panose="02020603050405020304" pitchFamily="18" charset="0"/>
+                        </a:rPr>
+                        <a:t>RD</a:t>
+                      </a:r>
+                      <a:endParaRPr lang="ko-KR" altLang="en-US" b="1" i="1" dirty="0">
+                        <a:latin typeface="Times New Roman" panose="02020603050405020304" pitchFamily="18" charset="0"/>
+                        <a:cs typeface="Times New Roman" panose="02020603050405020304" pitchFamily="18" charset="0"/>
+                      </a:endParaRPr>
+                    </a:p>
+                  </a:txBody>
+                  <a:tcPr/>
+                </a:tc>
+                <a:tc>
+                  <a:txBody>
+                    <a:bodyPr/>
+                    <a:lstStyle/>
+                    <a:p>
+                      <a:pPr algn="ctr" latinLnBrk="1"/>
+                      <a:endParaRPr lang="ko-KR" altLang="en-US">
+                        <a:latin typeface="Times New Roman" panose="02020603050405020304" pitchFamily="18" charset="0"/>
+                        <a:cs typeface="Times New Roman" panose="02020603050405020304" pitchFamily="18" charset="0"/>
+                      </a:endParaRPr>
+                    </a:p>
+                  </a:txBody>
+                  <a:tcPr/>
+                </a:tc>
+                <a:tc>
+                  <a:txBody>
+                    <a:bodyPr/>
+                    <a:lstStyle/>
+                    <a:p>
+                      <a:pPr algn="ctr" latinLnBrk="1"/>
+                      <a:endParaRPr lang="ko-KR" altLang="en-US">
+                        <a:latin typeface="Times New Roman" panose="02020603050405020304" pitchFamily="18" charset="0"/>
+                        <a:cs typeface="Times New Roman" panose="02020603050405020304" pitchFamily="18" charset="0"/>
+                      </a:endParaRPr>
+                    </a:p>
+                  </a:txBody>
+                  <a:tcPr/>
+                </a:tc>
+                <a:tc>
+                  <a:txBody>
+                    <a:bodyPr/>
+                    <a:lstStyle/>
+                    <a:p>
+                      <a:pPr algn="ctr" latinLnBrk="1"/>
+                      <a:endParaRPr lang="ko-KR" altLang="en-US" dirty="0">
+                        <a:latin typeface="Times New Roman" panose="02020603050405020304" pitchFamily="18" charset="0"/>
+                        <a:cs typeface="Times New Roman" panose="02020603050405020304" pitchFamily="18" charset="0"/>
+                      </a:endParaRPr>
+                    </a:p>
+                  </a:txBody>
+                  <a:tcPr/>
+                </a:tc>
+                <a:tc>
+                  <a:txBody>
+                    <a:bodyPr/>
+                    <a:lstStyle/>
+                    <a:p>
+                      <a:pPr algn="ctr" latinLnBrk="1"/>
+                      <a:endParaRPr lang="ko-KR" altLang="en-US" dirty="0">
+                        <a:latin typeface="Times New Roman" panose="02020603050405020304" pitchFamily="18" charset="0"/>
+                        <a:cs typeface="Times New Roman" panose="02020603050405020304" pitchFamily="18" charset="0"/>
+                      </a:endParaRPr>
+                    </a:p>
+                  </a:txBody>
+                  <a:tcPr/>
+                </a:tc>
+                <a:tc>
+                  <a:txBody>
+                    <a:bodyPr/>
+                    <a:lstStyle/>
+                    <a:p>
+                      <a:pPr algn="ctr" latinLnBrk="1"/>
+                      <a:endParaRPr lang="ko-KR" altLang="en-US" dirty="0">
+                        <a:latin typeface="Times New Roman" panose="02020603050405020304" pitchFamily="18" charset="0"/>
+                        <a:cs typeface="Times New Roman" panose="02020603050405020304" pitchFamily="18" charset="0"/>
+                      </a:endParaRPr>
+                    </a:p>
+                  </a:txBody>
+                  <a:tcPr/>
+                </a:tc>
+                <a:tc>
+                  <a:txBody>
+                    <a:bodyPr/>
+                    <a:lstStyle/>
+                    <a:p>
+                      <a:pPr algn="ctr" latinLnBrk="1"/>
+                      <a:endParaRPr lang="ko-KR" altLang="en-US" dirty="0">
+                        <a:latin typeface="Times New Roman" panose="02020603050405020304" pitchFamily="18" charset="0"/>
+                        <a:cs typeface="Times New Roman" panose="02020603050405020304" pitchFamily="18" charset="0"/>
+                      </a:endParaRPr>
+                    </a:p>
+                  </a:txBody>
+                  <a:tcPr/>
+                </a:tc>
+                <a:extLst>
+                  <a:ext uri="{0D108BD9-81ED-4DB2-BD59-A6C34878D82A}">
+                    <a16:rowId xmlns:a16="http://schemas.microsoft.com/office/drawing/2014/main" val="1621145085"/>
+                  </a:ext>
+                </a:extLst>
+              </a:tr>
+            </a:tbl>
+          </a:graphicData>
+        </a:graphic>
+      </p:graphicFrame>
+      <p:sp>
+        <p:nvSpPr>
+          <p:cNvPr id="11" name="TextBox 10">
+            <a:extLst>
+              <a:ext uri="{FF2B5EF4-FFF2-40B4-BE49-F238E27FC236}">
+                <a16:creationId xmlns:a16="http://schemas.microsoft.com/office/drawing/2014/main" id="{F597FB5B-C26C-9EF8-B3DC-4E6EF1BD8B67}"/>
+              </a:ext>
+            </a:extLst>
+          </p:cNvPr>
+          <p:cNvSpPr txBox="1"/>
+          <p:nvPr/>
+        </p:nvSpPr>
+        <p:spPr>
+          <a:xfrm>
+            <a:off x="422956" y="398901"/>
+            <a:ext cx="1109599" cy="477054"/>
+          </a:xfrm>
+          <a:prstGeom prst="rect">
+            <a:avLst/>
+          </a:prstGeom>
+          <a:noFill/>
+        </p:spPr>
+        <p:txBody>
+          <a:bodyPr wrap="none" rtlCol="0">
+            <a:spAutoFit/>
+          </a:bodyPr>
+          <a:lstStyle/>
+          <a:p>
+            <a:r>
+              <a:rPr lang="en-US" altLang="ko-KR" sz="2500" dirty="0">
+                <a:latin typeface="Times New Roman" panose="02020603050405020304" pitchFamily="18" charset="0"/>
+                <a:cs typeface="Times New Roman" panose="02020603050405020304" pitchFamily="18" charset="0"/>
+              </a:rPr>
+              <a:t>LGBM</a:t>
+            </a:r>
           </a:p>
         </p:txBody>
       </p:sp>
     </p:spTree>
     <p:extLst>
       <p:ext uri="{BB962C8B-B14F-4D97-AF65-F5344CB8AC3E}">
-        <p14:creationId xmlns:p14="http://schemas.microsoft.com/office/powerpoint/2010/main" val="1770305403"/>
+        <p14:creationId xmlns:p14="http://schemas.microsoft.com/office/powerpoint/2010/main" val="2071727166"/>
+      </p:ext>
+    </p:extLst>
+  </p:cSld>
+  <p:clrMapOvr>
+    <a:masterClrMapping/>
+  </p:clrMapOvr>
+</p:sld>
+</file>
+
+<file path=ppt/slides/slide3.xml><?xml version="1.0" encoding="utf-8"?>
+<p:sld xmlns:a="http://schemas.openxmlformats.org/drawingml/2006/main" xmlns:r="http://schemas.openxmlformats.org/officeDocument/2006/relationships" xmlns:p="http://schemas.openxmlformats.org/presentationml/2006/main">
+  <p:cSld>
+    <p:spTree>
+      <p:nvGrpSpPr>
+        <p:cNvPr id="1" name=""/>
+        <p:cNvGrpSpPr/>
+        <p:nvPr/>
+      </p:nvGrpSpPr>
+      <p:grpSpPr>
+        <a:xfrm>
+          <a:off x="0" y="0"/>
+          <a:ext cx="0" cy="0"/>
+          <a:chOff x="0" y="0"/>
+          <a:chExt cx="0" cy="0"/>
+        </a:xfrm>
+      </p:grpSpPr>
+      <p:sp>
+        <p:nvSpPr>
+          <p:cNvPr id="11" name="TextBox 10">
+            <a:extLst>
+              <a:ext uri="{FF2B5EF4-FFF2-40B4-BE49-F238E27FC236}">
+                <a16:creationId xmlns:a16="http://schemas.microsoft.com/office/drawing/2014/main" id="{F597FB5B-C26C-9EF8-B3DC-4E6EF1BD8B67}"/>
+              </a:ext>
+            </a:extLst>
+          </p:cNvPr>
+          <p:cNvSpPr txBox="1"/>
+          <p:nvPr/>
+        </p:nvSpPr>
+        <p:spPr>
+          <a:xfrm>
+            <a:off x="422956" y="398901"/>
+            <a:ext cx="859531" cy="477054"/>
+          </a:xfrm>
+          <a:prstGeom prst="rect">
+            <a:avLst/>
+          </a:prstGeom>
+          <a:noFill/>
+        </p:spPr>
+        <p:txBody>
+          <a:bodyPr wrap="none" rtlCol="0">
+            <a:spAutoFit/>
+          </a:bodyPr>
+          <a:lstStyle/>
+          <a:p>
+            <a:r>
+              <a:rPr lang="en-US" altLang="ko-KR" sz="2500" dirty="0">
+                <a:latin typeface="Times New Roman" panose="02020603050405020304" pitchFamily="18" charset="0"/>
+                <a:cs typeface="Times New Roman" panose="02020603050405020304" pitchFamily="18" charset="0"/>
+              </a:rPr>
+              <a:t>XGB</a:t>
+            </a:r>
+          </a:p>
+        </p:txBody>
+      </p:sp>
+      <p:sp>
+        <p:nvSpPr>
+          <p:cNvPr id="2" name="TextBox 1">
+            <a:extLst>
+              <a:ext uri="{FF2B5EF4-FFF2-40B4-BE49-F238E27FC236}">
+                <a16:creationId xmlns:a16="http://schemas.microsoft.com/office/drawing/2014/main" id="{06A4BA70-D25D-6FEF-459C-7DFC394A3D96}"/>
+              </a:ext>
+            </a:extLst>
+          </p:cNvPr>
+          <p:cNvSpPr txBox="1"/>
+          <p:nvPr/>
+        </p:nvSpPr>
+        <p:spPr>
+          <a:xfrm>
+            <a:off x="2297624" y="5246339"/>
+            <a:ext cx="7055138" cy="369332"/>
+          </a:xfrm>
+          <a:prstGeom prst="rect">
+            <a:avLst/>
+          </a:prstGeom>
+          <a:noFill/>
+        </p:spPr>
+        <p:txBody>
+          <a:bodyPr wrap="none" rtlCol="0">
+            <a:spAutoFit/>
+          </a:bodyPr>
+          <a:lstStyle/>
+          <a:p>
+            <a:pPr algn="ctr"/>
+            <a:r>
+              <a:rPr lang="en-US" altLang="ko-KR" dirty="0">
+                <a:latin typeface="Times New Roman" panose="02020603050405020304" pitchFamily="18" charset="0"/>
+                <a:cs typeface="Times New Roman" panose="02020603050405020304" pitchFamily="18" charset="0"/>
+              </a:rPr>
+              <a:t>Table2. Performance of Easy Data Augmentation according to each </a:t>
+            </a:r>
+            <a:r>
+              <a:rPr lang="en-US" altLang="ko-KR" dirty="0" err="1">
+                <a:latin typeface="Times New Roman" panose="02020603050405020304" pitchFamily="18" charset="0"/>
+                <a:cs typeface="Times New Roman" panose="02020603050405020304" pitchFamily="18" charset="0"/>
+              </a:rPr>
+              <a:t>KFold</a:t>
+            </a:r>
+            <a:endParaRPr lang="en-US" altLang="ko-KR" dirty="0">
+              <a:latin typeface="Times New Roman" panose="02020603050405020304" pitchFamily="18" charset="0"/>
+              <a:cs typeface="Times New Roman" panose="02020603050405020304" pitchFamily="18" charset="0"/>
+            </a:endParaRPr>
+          </a:p>
+        </p:txBody>
+      </p:sp>
+      <p:graphicFrame>
+        <p:nvGraphicFramePr>
+          <p:cNvPr id="4" name="표 3">
+            <a:extLst>
+              <a:ext uri="{FF2B5EF4-FFF2-40B4-BE49-F238E27FC236}">
+                <a16:creationId xmlns:a16="http://schemas.microsoft.com/office/drawing/2014/main" id="{EABE7AE3-F8DC-D129-F957-3AEE3D9ABEAB}"/>
+              </a:ext>
+            </a:extLst>
+          </p:cNvPr>
+          <p:cNvGraphicFramePr>
+            <a:graphicFrameLocks noGrp="1"/>
+          </p:cNvGraphicFramePr>
+          <p:nvPr>
+            <p:extLst>
+              <p:ext uri="{D42A27DB-BD31-4B8C-83A1-F6EECF244321}">
+                <p14:modId xmlns:p14="http://schemas.microsoft.com/office/powerpoint/2010/main" val="3122908126"/>
+              </p:ext>
+            </p:extLst>
+          </p:nvPr>
+        </p:nvGraphicFramePr>
+        <p:xfrm>
+          <a:off x="1155756" y="1347648"/>
+          <a:ext cx="9338875" cy="3876040"/>
+        </p:xfrm>
+        <a:graphic>
+          <a:graphicData uri="http://schemas.openxmlformats.org/drawingml/2006/table">
+            <a:tbl>
+              <a:tblPr firstRow="1" bandRow="1">
+                <a:tableStyleId>{5940675A-B579-460E-94D1-54222C63F5DA}</a:tableStyleId>
+              </a:tblPr>
+              <a:tblGrid>
+                <a:gridCol w="1334125">
+                  <a:extLst>
+                    <a:ext uri="{9D8B030D-6E8A-4147-A177-3AD203B41FA5}">
+                      <a16:colId xmlns:a16="http://schemas.microsoft.com/office/drawing/2014/main" val="3879856640"/>
+                    </a:ext>
+                  </a:extLst>
+                </a:gridCol>
+                <a:gridCol w="1334125">
+                  <a:extLst>
+                    <a:ext uri="{9D8B030D-6E8A-4147-A177-3AD203B41FA5}">
+                      <a16:colId xmlns:a16="http://schemas.microsoft.com/office/drawing/2014/main" val="4094721889"/>
+                    </a:ext>
+                  </a:extLst>
+                </a:gridCol>
+                <a:gridCol w="1334125">
+                  <a:extLst>
+                    <a:ext uri="{9D8B030D-6E8A-4147-A177-3AD203B41FA5}">
+                      <a16:colId xmlns:a16="http://schemas.microsoft.com/office/drawing/2014/main" val="1083152101"/>
+                    </a:ext>
+                  </a:extLst>
+                </a:gridCol>
+                <a:gridCol w="1334125">
+                  <a:extLst>
+                    <a:ext uri="{9D8B030D-6E8A-4147-A177-3AD203B41FA5}">
+                      <a16:colId xmlns:a16="http://schemas.microsoft.com/office/drawing/2014/main" val="1701947921"/>
+                    </a:ext>
+                  </a:extLst>
+                </a:gridCol>
+                <a:gridCol w="1334125">
+                  <a:extLst>
+                    <a:ext uri="{9D8B030D-6E8A-4147-A177-3AD203B41FA5}">
+                      <a16:colId xmlns:a16="http://schemas.microsoft.com/office/drawing/2014/main" val="3766362005"/>
+                    </a:ext>
+                  </a:extLst>
+                </a:gridCol>
+                <a:gridCol w="1334125">
+                  <a:extLst>
+                    <a:ext uri="{9D8B030D-6E8A-4147-A177-3AD203B41FA5}">
+                      <a16:colId xmlns:a16="http://schemas.microsoft.com/office/drawing/2014/main" val="3423723277"/>
+                    </a:ext>
+                  </a:extLst>
+                </a:gridCol>
+                <a:gridCol w="1334125">
+                  <a:extLst>
+                    <a:ext uri="{9D8B030D-6E8A-4147-A177-3AD203B41FA5}">
+                      <a16:colId xmlns:a16="http://schemas.microsoft.com/office/drawing/2014/main" val="3541592749"/>
+                    </a:ext>
+                  </a:extLst>
+                </a:gridCol>
+              </a:tblGrid>
+              <a:tr h="370840">
+                <a:tc>
+                  <a:txBody>
+                    <a:bodyPr/>
+                    <a:lstStyle/>
+                    <a:p>
+                      <a:pPr algn="ctr" latinLnBrk="1"/>
+                      <a:endParaRPr lang="ko-KR" altLang="en-US" dirty="0">
+                        <a:latin typeface="Times New Roman" panose="02020603050405020304" pitchFamily="18" charset="0"/>
+                        <a:cs typeface="Times New Roman" panose="02020603050405020304" pitchFamily="18" charset="0"/>
+                      </a:endParaRPr>
+                    </a:p>
+                  </a:txBody>
+                  <a:tcPr/>
+                </a:tc>
+                <a:tc>
+                  <a:txBody>
+                    <a:bodyPr/>
+                    <a:lstStyle/>
+                    <a:p>
+                      <a:pPr algn="ctr" latinLnBrk="1"/>
+                      <a:r>
+                        <a:rPr lang="en-US" altLang="ko-KR" b="1" i="1" dirty="0">
+                          <a:latin typeface="Times New Roman" panose="02020603050405020304" pitchFamily="18" charset="0"/>
+                          <a:cs typeface="Times New Roman" panose="02020603050405020304" pitchFamily="18" charset="0"/>
+                        </a:rPr>
+                        <a:t>1</a:t>
+                      </a:r>
+                      <a:endParaRPr lang="ko-KR" altLang="en-US" b="1" i="1" dirty="0">
+                        <a:latin typeface="Times New Roman" panose="02020603050405020304" pitchFamily="18" charset="0"/>
+                        <a:cs typeface="Times New Roman" panose="02020603050405020304" pitchFamily="18" charset="0"/>
+                      </a:endParaRPr>
+                    </a:p>
+                  </a:txBody>
+                  <a:tcPr/>
+                </a:tc>
+                <a:tc>
+                  <a:txBody>
+                    <a:bodyPr/>
+                    <a:lstStyle/>
+                    <a:p>
+                      <a:pPr algn="ctr" latinLnBrk="1"/>
+                      <a:r>
+                        <a:rPr lang="en-US" altLang="ko-KR" b="1" i="1" dirty="0">
+                          <a:latin typeface="Times New Roman" panose="02020603050405020304" pitchFamily="18" charset="0"/>
+                          <a:cs typeface="Times New Roman" panose="02020603050405020304" pitchFamily="18" charset="0"/>
+                        </a:rPr>
+                        <a:t>2</a:t>
+                      </a:r>
+                      <a:endParaRPr lang="ko-KR" altLang="en-US" b="1" i="1" dirty="0">
+                        <a:latin typeface="Times New Roman" panose="02020603050405020304" pitchFamily="18" charset="0"/>
+                        <a:cs typeface="Times New Roman" panose="02020603050405020304" pitchFamily="18" charset="0"/>
+                      </a:endParaRPr>
+                    </a:p>
+                  </a:txBody>
+                  <a:tcPr/>
+                </a:tc>
+                <a:tc>
+                  <a:txBody>
+                    <a:bodyPr/>
+                    <a:lstStyle/>
+                    <a:p>
+                      <a:pPr algn="ctr" latinLnBrk="1"/>
+                      <a:r>
+                        <a:rPr lang="en-US" altLang="ko-KR" b="1" i="1" dirty="0">
+                          <a:latin typeface="Times New Roman" panose="02020603050405020304" pitchFamily="18" charset="0"/>
+                          <a:cs typeface="Times New Roman" panose="02020603050405020304" pitchFamily="18" charset="0"/>
+                        </a:rPr>
+                        <a:t>3</a:t>
+                      </a:r>
+                      <a:endParaRPr lang="ko-KR" altLang="en-US" b="1" i="1" dirty="0">
+                        <a:latin typeface="Times New Roman" panose="02020603050405020304" pitchFamily="18" charset="0"/>
+                        <a:cs typeface="Times New Roman" panose="02020603050405020304" pitchFamily="18" charset="0"/>
+                      </a:endParaRPr>
+                    </a:p>
+                  </a:txBody>
+                  <a:tcPr/>
+                </a:tc>
+                <a:tc>
+                  <a:txBody>
+                    <a:bodyPr/>
+                    <a:lstStyle/>
+                    <a:p>
+                      <a:pPr algn="ctr" latinLnBrk="1"/>
+                      <a:r>
+                        <a:rPr lang="en-US" altLang="ko-KR" b="1" i="1" dirty="0">
+                          <a:latin typeface="Times New Roman" panose="02020603050405020304" pitchFamily="18" charset="0"/>
+                          <a:cs typeface="Times New Roman" panose="02020603050405020304" pitchFamily="18" charset="0"/>
+                        </a:rPr>
+                        <a:t>4</a:t>
+                      </a:r>
+                      <a:endParaRPr lang="ko-KR" altLang="en-US" b="1" i="1" dirty="0">
+                        <a:latin typeface="Times New Roman" panose="02020603050405020304" pitchFamily="18" charset="0"/>
+                        <a:cs typeface="Times New Roman" panose="02020603050405020304" pitchFamily="18" charset="0"/>
+                      </a:endParaRPr>
+                    </a:p>
+                  </a:txBody>
+                  <a:tcPr/>
+                </a:tc>
+                <a:tc>
+                  <a:txBody>
+                    <a:bodyPr/>
+                    <a:lstStyle/>
+                    <a:p>
+                      <a:pPr algn="ctr" latinLnBrk="1"/>
+                      <a:r>
+                        <a:rPr lang="en-US" altLang="ko-KR" b="1" i="1" dirty="0">
+                          <a:latin typeface="Times New Roman" panose="02020603050405020304" pitchFamily="18" charset="0"/>
+                          <a:cs typeface="Times New Roman" panose="02020603050405020304" pitchFamily="18" charset="0"/>
+                        </a:rPr>
+                        <a:t>5</a:t>
+                      </a:r>
+                      <a:endParaRPr lang="ko-KR" altLang="en-US" b="1" i="1" dirty="0">
+                        <a:latin typeface="Times New Roman" panose="02020603050405020304" pitchFamily="18" charset="0"/>
+                        <a:cs typeface="Times New Roman" panose="02020603050405020304" pitchFamily="18" charset="0"/>
+                      </a:endParaRPr>
+                    </a:p>
+                  </a:txBody>
+                  <a:tcPr/>
+                </a:tc>
+                <a:tc>
+                  <a:txBody>
+                    <a:bodyPr/>
+                    <a:lstStyle/>
+                    <a:p>
+                      <a:pPr algn="ctr" latinLnBrk="1"/>
+                      <a:r>
+                        <a:rPr lang="en-US" altLang="ko-KR" b="1" i="1" dirty="0">
+                          <a:latin typeface="Times New Roman" panose="02020603050405020304" pitchFamily="18" charset="0"/>
+                          <a:cs typeface="Times New Roman" panose="02020603050405020304" pitchFamily="18" charset="0"/>
+                        </a:rPr>
+                        <a:t>AVG</a:t>
+                      </a:r>
+                      <a:endParaRPr lang="ko-KR" altLang="en-US" b="1" i="1" dirty="0">
+                        <a:latin typeface="Times New Roman" panose="02020603050405020304" pitchFamily="18" charset="0"/>
+                        <a:cs typeface="Times New Roman" panose="02020603050405020304" pitchFamily="18" charset="0"/>
+                      </a:endParaRPr>
+                    </a:p>
+                  </a:txBody>
+                  <a:tcPr/>
+                </a:tc>
+                <a:extLst>
+                  <a:ext uri="{0D108BD9-81ED-4DB2-BD59-A6C34878D82A}">
+                    <a16:rowId xmlns:a16="http://schemas.microsoft.com/office/drawing/2014/main" val="1668803168"/>
+                  </a:ext>
+                </a:extLst>
+              </a:tr>
+              <a:tr h="370840">
+                <a:tc>
+                  <a:txBody>
+                    <a:bodyPr/>
+                    <a:lstStyle/>
+                    <a:p>
+                      <a:pPr algn="ctr" latinLnBrk="1"/>
+                      <a:r>
+                        <a:rPr lang="en-US" altLang="ko-KR" b="1" i="1" dirty="0">
+                          <a:latin typeface="Times New Roman" panose="02020603050405020304" pitchFamily="18" charset="0"/>
+                          <a:cs typeface="Times New Roman" panose="02020603050405020304" pitchFamily="18" charset="0"/>
+                        </a:rPr>
+                        <a:t>None</a:t>
+                      </a:r>
+                      <a:endParaRPr lang="ko-KR" altLang="en-US" b="1" i="1" dirty="0">
+                        <a:latin typeface="Times New Roman" panose="02020603050405020304" pitchFamily="18" charset="0"/>
+                        <a:cs typeface="Times New Roman" panose="02020603050405020304" pitchFamily="18" charset="0"/>
+                      </a:endParaRPr>
+                    </a:p>
+                  </a:txBody>
+                  <a:tcPr/>
+                </a:tc>
+                <a:tc>
+                  <a:txBody>
+                    <a:bodyPr/>
+                    <a:lstStyle/>
+                    <a:p>
+                      <a:pPr algn="ctr" latinLnBrk="1"/>
+                      <a:r>
+                        <a:rPr lang="en-US" altLang="ko-KR" dirty="0">
+                          <a:latin typeface="Times New Roman" panose="02020603050405020304" pitchFamily="18" charset="0"/>
+                          <a:cs typeface="Times New Roman" panose="02020603050405020304" pitchFamily="18" charset="0"/>
+                        </a:rPr>
+                        <a:t>0. /</a:t>
+                      </a:r>
+                    </a:p>
+                    <a:p>
+                      <a:pPr algn="ctr" latinLnBrk="1"/>
+                      <a:r>
+                        <a:rPr lang="en-US" altLang="ko-KR" dirty="0">
+                          <a:latin typeface="Times New Roman" panose="02020603050405020304" pitchFamily="18" charset="0"/>
+                          <a:cs typeface="Times New Roman" panose="02020603050405020304" pitchFamily="18" charset="0"/>
+                        </a:rPr>
+                        <a:t>0.</a:t>
+                      </a:r>
+                      <a:endParaRPr lang="ko-KR" altLang="en-US" dirty="0">
+                        <a:latin typeface="Times New Roman" panose="02020603050405020304" pitchFamily="18" charset="0"/>
+                        <a:cs typeface="Times New Roman" panose="02020603050405020304" pitchFamily="18" charset="0"/>
+                      </a:endParaRPr>
+                    </a:p>
+                  </a:txBody>
+                  <a:tcPr/>
+                </a:tc>
+                <a:tc>
+                  <a:txBody>
+                    <a:bodyPr/>
+                    <a:lstStyle/>
+                    <a:p>
+                      <a:pPr algn="ctr" latinLnBrk="1"/>
+                      <a:r>
+                        <a:rPr lang="en-US" altLang="ko-KR" dirty="0">
+                          <a:latin typeface="Times New Roman" panose="02020603050405020304" pitchFamily="18" charset="0"/>
+                          <a:cs typeface="Times New Roman" panose="02020603050405020304" pitchFamily="18" charset="0"/>
+                        </a:rPr>
+                        <a:t>0. /</a:t>
+                      </a:r>
+                    </a:p>
+                    <a:p>
+                      <a:pPr algn="ctr" latinLnBrk="1"/>
+                      <a:r>
+                        <a:rPr lang="en-US" altLang="ko-KR" dirty="0">
+                          <a:latin typeface="Times New Roman" panose="02020603050405020304" pitchFamily="18" charset="0"/>
+                          <a:cs typeface="Times New Roman" panose="02020603050405020304" pitchFamily="18" charset="0"/>
+                        </a:rPr>
+                        <a:t>0.</a:t>
+                      </a:r>
+                      <a:endParaRPr lang="ko-KR" altLang="en-US" dirty="0">
+                        <a:latin typeface="Times New Roman" panose="02020603050405020304" pitchFamily="18" charset="0"/>
+                        <a:cs typeface="Times New Roman" panose="02020603050405020304" pitchFamily="18" charset="0"/>
+                      </a:endParaRPr>
+                    </a:p>
+                  </a:txBody>
+                  <a:tcPr/>
+                </a:tc>
+                <a:tc>
+                  <a:txBody>
+                    <a:bodyPr/>
+                    <a:lstStyle/>
+                    <a:p>
+                      <a:pPr algn="ctr" latinLnBrk="1"/>
+                      <a:endParaRPr lang="ko-KR" altLang="en-US" dirty="0">
+                        <a:latin typeface="Times New Roman" panose="02020603050405020304" pitchFamily="18" charset="0"/>
+                        <a:cs typeface="Times New Roman" panose="02020603050405020304" pitchFamily="18" charset="0"/>
+                      </a:endParaRPr>
+                    </a:p>
+                  </a:txBody>
+                  <a:tcPr/>
+                </a:tc>
+                <a:tc>
+                  <a:txBody>
+                    <a:bodyPr/>
+                    <a:lstStyle/>
+                    <a:p>
+                      <a:pPr algn="ctr" latinLnBrk="1"/>
+                      <a:endParaRPr lang="ko-KR" altLang="en-US" dirty="0">
+                        <a:latin typeface="Times New Roman" panose="02020603050405020304" pitchFamily="18" charset="0"/>
+                        <a:cs typeface="Times New Roman" panose="02020603050405020304" pitchFamily="18" charset="0"/>
+                      </a:endParaRPr>
+                    </a:p>
+                  </a:txBody>
+                  <a:tcPr/>
+                </a:tc>
+                <a:tc>
+                  <a:txBody>
+                    <a:bodyPr/>
+                    <a:lstStyle/>
+                    <a:p>
+                      <a:pPr algn="ctr" latinLnBrk="1"/>
+                      <a:endParaRPr lang="ko-KR" altLang="en-US" dirty="0">
+                        <a:latin typeface="Times New Roman" panose="02020603050405020304" pitchFamily="18" charset="0"/>
+                        <a:cs typeface="Times New Roman" panose="02020603050405020304" pitchFamily="18" charset="0"/>
+                      </a:endParaRPr>
+                    </a:p>
+                  </a:txBody>
+                  <a:tcPr/>
+                </a:tc>
+                <a:tc>
+                  <a:txBody>
+                    <a:bodyPr/>
+                    <a:lstStyle/>
+                    <a:p>
+                      <a:pPr algn="ctr" latinLnBrk="1"/>
+                      <a:endParaRPr lang="ko-KR" altLang="en-US" dirty="0">
+                        <a:latin typeface="Times New Roman" panose="02020603050405020304" pitchFamily="18" charset="0"/>
+                        <a:cs typeface="Times New Roman" panose="02020603050405020304" pitchFamily="18" charset="0"/>
+                      </a:endParaRPr>
+                    </a:p>
+                  </a:txBody>
+                  <a:tcPr/>
+                </a:tc>
+                <a:extLst>
+                  <a:ext uri="{0D108BD9-81ED-4DB2-BD59-A6C34878D82A}">
+                    <a16:rowId xmlns:a16="http://schemas.microsoft.com/office/drawing/2014/main" val="633390355"/>
+                  </a:ext>
+                </a:extLst>
+              </a:tr>
+              <a:tr h="370840">
+                <a:tc>
+                  <a:txBody>
+                    <a:bodyPr/>
+                    <a:lstStyle/>
+                    <a:p>
+                      <a:pPr algn="ctr" latinLnBrk="1"/>
+                      <a:r>
+                        <a:rPr lang="en-US" altLang="ko-KR" b="1" i="1" dirty="0">
+                          <a:latin typeface="Times New Roman" panose="02020603050405020304" pitchFamily="18" charset="0"/>
+                          <a:cs typeface="Times New Roman" panose="02020603050405020304" pitchFamily="18" charset="0"/>
+                        </a:rPr>
+                        <a:t>BT (</a:t>
+                      </a:r>
+                      <a:r>
+                        <a:rPr lang="en-US" altLang="ko-KR" b="1" i="1" dirty="0" err="1">
+                          <a:latin typeface="Times New Roman" panose="02020603050405020304" pitchFamily="18" charset="0"/>
+                          <a:cs typeface="Times New Roman" panose="02020603050405020304" pitchFamily="18" charset="0"/>
+                        </a:rPr>
+                        <a:t>en</a:t>
+                      </a:r>
+                      <a:r>
+                        <a:rPr lang="en-US" altLang="ko-KR" b="1" i="1" dirty="0">
+                          <a:latin typeface="Times New Roman" panose="02020603050405020304" pitchFamily="18" charset="0"/>
+                          <a:cs typeface="Times New Roman" panose="02020603050405020304" pitchFamily="18" charset="0"/>
+                        </a:rPr>
+                        <a:t>)</a:t>
+                      </a:r>
+                      <a:endParaRPr lang="ko-KR" altLang="en-US" b="1" i="1" dirty="0">
+                        <a:latin typeface="Times New Roman" panose="02020603050405020304" pitchFamily="18" charset="0"/>
+                        <a:cs typeface="Times New Roman" panose="02020603050405020304" pitchFamily="18" charset="0"/>
+                      </a:endParaRPr>
+                    </a:p>
+                  </a:txBody>
+                  <a:tcPr/>
+                </a:tc>
+                <a:tc>
+                  <a:txBody>
+                    <a:bodyPr/>
+                    <a:lstStyle/>
+                    <a:p>
+                      <a:pPr marL="0" marR="0" lvl="0" indent="0" algn="ctr" defTabSz="914400" rtl="0" eaLnBrk="1" fontAlgn="auto" latinLnBrk="1" hangingPunct="1">
+                        <a:lnSpc>
+                          <a:spcPct val="100000"/>
+                        </a:lnSpc>
+                        <a:spcBef>
+                          <a:spcPts val="0"/>
+                        </a:spcBef>
+                        <a:spcAft>
+                          <a:spcPts val="0"/>
+                        </a:spcAft>
+                        <a:buClrTx/>
+                        <a:buSzTx/>
+                        <a:buFontTx/>
+                        <a:buNone/>
+                        <a:tabLst/>
+                        <a:defRPr/>
+                      </a:pPr>
+                      <a:r>
+                        <a:rPr lang="en-US" altLang="ko-KR" dirty="0">
+                          <a:latin typeface="Times New Roman" panose="02020603050405020304" pitchFamily="18" charset="0"/>
+                          <a:cs typeface="Times New Roman" panose="02020603050405020304" pitchFamily="18" charset="0"/>
+                        </a:rPr>
+                        <a:t>0. /</a:t>
+                      </a:r>
+                    </a:p>
+                    <a:p>
+                      <a:pPr marL="0" marR="0" lvl="0" indent="0" algn="ctr" defTabSz="914400" rtl="0" eaLnBrk="1" fontAlgn="auto" latinLnBrk="1" hangingPunct="1">
+                        <a:lnSpc>
+                          <a:spcPct val="100000"/>
+                        </a:lnSpc>
+                        <a:spcBef>
+                          <a:spcPts val="0"/>
+                        </a:spcBef>
+                        <a:spcAft>
+                          <a:spcPts val="0"/>
+                        </a:spcAft>
+                        <a:buClrTx/>
+                        <a:buSzTx/>
+                        <a:buFontTx/>
+                        <a:buNone/>
+                        <a:tabLst/>
+                        <a:defRPr/>
+                      </a:pPr>
+                      <a:r>
+                        <a:rPr lang="en-US" altLang="ko-KR" dirty="0">
+                          <a:latin typeface="Times New Roman" panose="02020603050405020304" pitchFamily="18" charset="0"/>
+                          <a:cs typeface="Times New Roman" panose="02020603050405020304" pitchFamily="18" charset="0"/>
+                        </a:rPr>
+                        <a:t>0.</a:t>
+                      </a:r>
+                      <a:endParaRPr lang="ko-KR" altLang="en-US" dirty="0">
+                        <a:latin typeface="Times New Roman" panose="02020603050405020304" pitchFamily="18" charset="0"/>
+                        <a:cs typeface="Times New Roman" panose="02020603050405020304" pitchFamily="18" charset="0"/>
+                      </a:endParaRPr>
+                    </a:p>
+                  </a:txBody>
+                  <a:tcPr/>
+                </a:tc>
+                <a:tc>
+                  <a:txBody>
+                    <a:bodyPr/>
+                    <a:lstStyle/>
+                    <a:p>
+                      <a:pPr algn="ctr" latinLnBrk="1"/>
+                      <a:r>
+                        <a:rPr lang="en-US" altLang="ko-KR" dirty="0">
+                          <a:latin typeface="Times New Roman" panose="02020603050405020304" pitchFamily="18" charset="0"/>
+                          <a:cs typeface="Times New Roman" panose="02020603050405020304" pitchFamily="18" charset="0"/>
+                        </a:rPr>
+                        <a:t>0. /</a:t>
+                      </a:r>
+                    </a:p>
+                    <a:p>
+                      <a:pPr algn="ctr" latinLnBrk="1"/>
+                      <a:r>
+                        <a:rPr lang="en-US" altLang="ko-KR" dirty="0">
+                          <a:latin typeface="Times New Roman" panose="02020603050405020304" pitchFamily="18" charset="0"/>
+                          <a:cs typeface="Times New Roman" panose="02020603050405020304" pitchFamily="18" charset="0"/>
+                        </a:rPr>
+                        <a:t>0.</a:t>
+                      </a:r>
+                      <a:endParaRPr lang="ko-KR" altLang="en-US" dirty="0">
+                        <a:latin typeface="Times New Roman" panose="02020603050405020304" pitchFamily="18" charset="0"/>
+                        <a:cs typeface="Times New Roman" panose="02020603050405020304" pitchFamily="18" charset="0"/>
+                      </a:endParaRPr>
+                    </a:p>
+                  </a:txBody>
+                  <a:tcPr/>
+                </a:tc>
+                <a:tc>
+                  <a:txBody>
+                    <a:bodyPr/>
+                    <a:lstStyle/>
+                    <a:p>
+                      <a:pPr algn="ctr" latinLnBrk="1"/>
+                      <a:endParaRPr lang="ko-KR" altLang="en-US" dirty="0">
+                        <a:latin typeface="Times New Roman" panose="02020603050405020304" pitchFamily="18" charset="0"/>
+                        <a:cs typeface="Times New Roman" panose="02020603050405020304" pitchFamily="18" charset="0"/>
+                      </a:endParaRPr>
+                    </a:p>
+                  </a:txBody>
+                  <a:tcPr/>
+                </a:tc>
+                <a:tc>
+                  <a:txBody>
+                    <a:bodyPr/>
+                    <a:lstStyle/>
+                    <a:p>
+                      <a:pPr algn="ctr" latinLnBrk="1"/>
+                      <a:endParaRPr lang="ko-KR" altLang="en-US" dirty="0">
+                        <a:latin typeface="Times New Roman" panose="02020603050405020304" pitchFamily="18" charset="0"/>
+                        <a:cs typeface="Times New Roman" panose="02020603050405020304" pitchFamily="18" charset="0"/>
+                      </a:endParaRPr>
+                    </a:p>
+                  </a:txBody>
+                  <a:tcPr/>
+                </a:tc>
+                <a:tc>
+                  <a:txBody>
+                    <a:bodyPr/>
+                    <a:lstStyle/>
+                    <a:p>
+                      <a:pPr algn="ctr" latinLnBrk="1"/>
+                      <a:endParaRPr lang="ko-KR" altLang="en-US" dirty="0">
+                        <a:latin typeface="Times New Roman" panose="02020603050405020304" pitchFamily="18" charset="0"/>
+                        <a:cs typeface="Times New Roman" panose="02020603050405020304" pitchFamily="18" charset="0"/>
+                      </a:endParaRPr>
+                    </a:p>
+                  </a:txBody>
+                  <a:tcPr/>
+                </a:tc>
+                <a:tc>
+                  <a:txBody>
+                    <a:bodyPr/>
+                    <a:lstStyle/>
+                    <a:p>
+                      <a:pPr algn="ctr" latinLnBrk="1"/>
+                      <a:endParaRPr lang="ko-KR" altLang="en-US" dirty="0">
+                        <a:latin typeface="Times New Roman" panose="02020603050405020304" pitchFamily="18" charset="0"/>
+                        <a:cs typeface="Times New Roman" panose="02020603050405020304" pitchFamily="18" charset="0"/>
+                      </a:endParaRPr>
+                    </a:p>
+                  </a:txBody>
+                  <a:tcPr/>
+                </a:tc>
+                <a:extLst>
+                  <a:ext uri="{0D108BD9-81ED-4DB2-BD59-A6C34878D82A}">
+                    <a16:rowId xmlns:a16="http://schemas.microsoft.com/office/drawing/2014/main" val="419997669"/>
+                  </a:ext>
+                </a:extLst>
+              </a:tr>
+              <a:tr h="370840">
+                <a:tc>
+                  <a:txBody>
+                    <a:bodyPr/>
+                    <a:lstStyle/>
+                    <a:p>
+                      <a:pPr algn="ctr" latinLnBrk="1"/>
+                      <a:r>
+                        <a:rPr lang="en-US" altLang="ko-KR" b="1" i="1" dirty="0">
+                          <a:latin typeface="Times New Roman" panose="02020603050405020304" pitchFamily="18" charset="0"/>
+                          <a:cs typeface="Times New Roman" panose="02020603050405020304" pitchFamily="18" charset="0"/>
+                        </a:rPr>
+                        <a:t>BT (</a:t>
+                      </a:r>
+                      <a:r>
+                        <a:rPr lang="en-US" altLang="ko-KR" b="1" i="1" dirty="0" err="1">
+                          <a:latin typeface="Times New Roman" panose="02020603050405020304" pitchFamily="18" charset="0"/>
+                          <a:cs typeface="Times New Roman" panose="02020603050405020304" pitchFamily="18" charset="0"/>
+                        </a:rPr>
+                        <a:t>jp</a:t>
+                      </a:r>
+                      <a:r>
+                        <a:rPr lang="en-US" altLang="ko-KR" b="1" i="1" dirty="0">
+                          <a:latin typeface="Times New Roman" panose="02020603050405020304" pitchFamily="18" charset="0"/>
+                          <a:cs typeface="Times New Roman" panose="02020603050405020304" pitchFamily="18" charset="0"/>
+                        </a:rPr>
+                        <a:t>)</a:t>
+                      </a:r>
+                      <a:endParaRPr lang="ko-KR" altLang="en-US" b="1" i="1" dirty="0">
+                        <a:latin typeface="Times New Roman" panose="02020603050405020304" pitchFamily="18" charset="0"/>
+                        <a:cs typeface="Times New Roman" panose="02020603050405020304" pitchFamily="18" charset="0"/>
+                      </a:endParaRPr>
+                    </a:p>
+                  </a:txBody>
+                  <a:tcPr/>
+                </a:tc>
+                <a:tc>
+                  <a:txBody>
+                    <a:bodyPr/>
+                    <a:lstStyle/>
+                    <a:p>
+                      <a:pPr algn="ctr" latinLnBrk="1"/>
+                      <a:endParaRPr lang="ko-KR" altLang="en-US" dirty="0">
+                        <a:latin typeface="Times New Roman" panose="02020603050405020304" pitchFamily="18" charset="0"/>
+                        <a:cs typeface="Times New Roman" panose="02020603050405020304" pitchFamily="18" charset="0"/>
+                      </a:endParaRPr>
+                    </a:p>
+                  </a:txBody>
+                  <a:tcPr/>
+                </a:tc>
+                <a:tc>
+                  <a:txBody>
+                    <a:bodyPr/>
+                    <a:lstStyle/>
+                    <a:p>
+                      <a:pPr algn="ctr" latinLnBrk="1"/>
+                      <a:endParaRPr lang="ko-KR" altLang="en-US" dirty="0">
+                        <a:latin typeface="Times New Roman" panose="02020603050405020304" pitchFamily="18" charset="0"/>
+                        <a:cs typeface="Times New Roman" panose="02020603050405020304" pitchFamily="18" charset="0"/>
+                      </a:endParaRPr>
+                    </a:p>
+                  </a:txBody>
+                  <a:tcPr/>
+                </a:tc>
+                <a:tc>
+                  <a:txBody>
+                    <a:bodyPr/>
+                    <a:lstStyle/>
+                    <a:p>
+                      <a:pPr algn="ctr" latinLnBrk="1"/>
+                      <a:endParaRPr lang="ko-KR" altLang="en-US" dirty="0">
+                        <a:latin typeface="Times New Roman" panose="02020603050405020304" pitchFamily="18" charset="0"/>
+                        <a:cs typeface="Times New Roman" panose="02020603050405020304" pitchFamily="18" charset="0"/>
+                      </a:endParaRPr>
+                    </a:p>
+                  </a:txBody>
+                  <a:tcPr/>
+                </a:tc>
+                <a:tc>
+                  <a:txBody>
+                    <a:bodyPr/>
+                    <a:lstStyle/>
+                    <a:p>
+                      <a:pPr algn="ctr" latinLnBrk="1"/>
+                      <a:endParaRPr lang="ko-KR" altLang="en-US">
+                        <a:latin typeface="Times New Roman" panose="02020603050405020304" pitchFamily="18" charset="0"/>
+                        <a:cs typeface="Times New Roman" panose="02020603050405020304" pitchFamily="18" charset="0"/>
+                      </a:endParaRPr>
+                    </a:p>
+                  </a:txBody>
+                  <a:tcPr/>
+                </a:tc>
+                <a:tc>
+                  <a:txBody>
+                    <a:bodyPr/>
+                    <a:lstStyle/>
+                    <a:p>
+                      <a:pPr algn="ctr" latinLnBrk="1"/>
+                      <a:endParaRPr lang="ko-KR" altLang="en-US">
+                        <a:latin typeface="Times New Roman" panose="02020603050405020304" pitchFamily="18" charset="0"/>
+                        <a:cs typeface="Times New Roman" panose="02020603050405020304" pitchFamily="18" charset="0"/>
+                      </a:endParaRPr>
+                    </a:p>
+                  </a:txBody>
+                  <a:tcPr/>
+                </a:tc>
+                <a:tc>
+                  <a:txBody>
+                    <a:bodyPr/>
+                    <a:lstStyle/>
+                    <a:p>
+                      <a:pPr algn="ctr" latinLnBrk="1"/>
+                      <a:endParaRPr lang="ko-KR" altLang="en-US">
+                        <a:latin typeface="Times New Roman" panose="02020603050405020304" pitchFamily="18" charset="0"/>
+                        <a:cs typeface="Times New Roman" panose="02020603050405020304" pitchFamily="18" charset="0"/>
+                      </a:endParaRPr>
+                    </a:p>
+                  </a:txBody>
+                  <a:tcPr/>
+                </a:tc>
+                <a:extLst>
+                  <a:ext uri="{0D108BD9-81ED-4DB2-BD59-A6C34878D82A}">
+                    <a16:rowId xmlns:a16="http://schemas.microsoft.com/office/drawing/2014/main" val="3574362841"/>
+                  </a:ext>
+                </a:extLst>
+              </a:tr>
+              <a:tr h="370840">
+                <a:tc>
+                  <a:txBody>
+                    <a:bodyPr/>
+                    <a:lstStyle/>
+                    <a:p>
+                      <a:pPr algn="ctr" latinLnBrk="1"/>
+                      <a:r>
+                        <a:rPr lang="en-US" altLang="ko-KR" b="1" i="1" dirty="0">
+                          <a:latin typeface="Times New Roman" panose="02020603050405020304" pitchFamily="18" charset="0"/>
+                          <a:cs typeface="Times New Roman" panose="02020603050405020304" pitchFamily="18" charset="0"/>
+                        </a:rPr>
+                        <a:t>BT (</a:t>
+                      </a:r>
+                      <a:r>
+                        <a:rPr lang="en-US" altLang="ko-KR" b="1" i="1" dirty="0" err="1">
+                          <a:latin typeface="Times New Roman" panose="02020603050405020304" pitchFamily="18" charset="0"/>
+                          <a:cs typeface="Times New Roman" panose="02020603050405020304" pitchFamily="18" charset="0"/>
+                        </a:rPr>
+                        <a:t>en</a:t>
+                      </a:r>
+                      <a:r>
+                        <a:rPr lang="en-US" altLang="ko-KR" b="1" i="1" dirty="0">
+                          <a:latin typeface="Times New Roman" panose="02020603050405020304" pitchFamily="18" charset="0"/>
+                          <a:cs typeface="Times New Roman" panose="02020603050405020304" pitchFamily="18" charset="0"/>
+                        </a:rPr>
+                        <a:t>, </a:t>
+                      </a:r>
+                      <a:r>
+                        <a:rPr lang="en-US" altLang="ko-KR" b="1" i="1" dirty="0" err="1">
+                          <a:latin typeface="Times New Roman" panose="02020603050405020304" pitchFamily="18" charset="0"/>
+                          <a:cs typeface="Times New Roman" panose="02020603050405020304" pitchFamily="18" charset="0"/>
+                        </a:rPr>
+                        <a:t>jp</a:t>
+                      </a:r>
+                      <a:r>
+                        <a:rPr lang="en-US" altLang="ko-KR" b="1" i="1" dirty="0">
+                          <a:latin typeface="Times New Roman" panose="02020603050405020304" pitchFamily="18" charset="0"/>
+                          <a:cs typeface="Times New Roman" panose="02020603050405020304" pitchFamily="18" charset="0"/>
+                        </a:rPr>
+                        <a:t>)</a:t>
+                      </a:r>
+                      <a:endParaRPr lang="ko-KR" altLang="en-US" b="1" i="1" dirty="0">
+                        <a:latin typeface="Times New Roman" panose="02020603050405020304" pitchFamily="18" charset="0"/>
+                        <a:cs typeface="Times New Roman" panose="02020603050405020304" pitchFamily="18" charset="0"/>
+                      </a:endParaRPr>
+                    </a:p>
+                  </a:txBody>
+                  <a:tcPr/>
+                </a:tc>
+                <a:tc>
+                  <a:txBody>
+                    <a:bodyPr/>
+                    <a:lstStyle/>
+                    <a:p>
+                      <a:pPr algn="ctr" latinLnBrk="1"/>
+                      <a:endParaRPr lang="ko-KR" altLang="en-US" dirty="0">
+                        <a:latin typeface="Times New Roman" panose="02020603050405020304" pitchFamily="18" charset="0"/>
+                        <a:cs typeface="Times New Roman" panose="02020603050405020304" pitchFamily="18" charset="0"/>
+                      </a:endParaRPr>
+                    </a:p>
+                  </a:txBody>
+                  <a:tcPr/>
+                </a:tc>
+                <a:tc>
+                  <a:txBody>
+                    <a:bodyPr/>
+                    <a:lstStyle/>
+                    <a:p>
+                      <a:pPr algn="ctr" latinLnBrk="1"/>
+                      <a:endParaRPr lang="ko-KR" altLang="en-US" dirty="0">
+                        <a:latin typeface="Times New Roman" panose="02020603050405020304" pitchFamily="18" charset="0"/>
+                        <a:cs typeface="Times New Roman" panose="02020603050405020304" pitchFamily="18" charset="0"/>
+                      </a:endParaRPr>
+                    </a:p>
+                  </a:txBody>
+                  <a:tcPr/>
+                </a:tc>
+                <a:tc>
+                  <a:txBody>
+                    <a:bodyPr/>
+                    <a:lstStyle/>
+                    <a:p>
+                      <a:pPr algn="ctr" latinLnBrk="1"/>
+                      <a:endParaRPr lang="ko-KR" altLang="en-US" dirty="0">
+                        <a:latin typeface="Times New Roman" panose="02020603050405020304" pitchFamily="18" charset="0"/>
+                        <a:cs typeface="Times New Roman" panose="02020603050405020304" pitchFamily="18" charset="0"/>
+                      </a:endParaRPr>
+                    </a:p>
+                  </a:txBody>
+                  <a:tcPr/>
+                </a:tc>
+                <a:tc>
+                  <a:txBody>
+                    <a:bodyPr/>
+                    <a:lstStyle/>
+                    <a:p>
+                      <a:pPr algn="ctr" latinLnBrk="1"/>
+                      <a:endParaRPr lang="ko-KR" altLang="en-US">
+                        <a:latin typeface="Times New Roman" panose="02020603050405020304" pitchFamily="18" charset="0"/>
+                        <a:cs typeface="Times New Roman" panose="02020603050405020304" pitchFamily="18" charset="0"/>
+                      </a:endParaRPr>
+                    </a:p>
+                  </a:txBody>
+                  <a:tcPr/>
+                </a:tc>
+                <a:tc>
+                  <a:txBody>
+                    <a:bodyPr/>
+                    <a:lstStyle/>
+                    <a:p>
+                      <a:pPr algn="ctr" latinLnBrk="1"/>
+                      <a:endParaRPr lang="ko-KR" altLang="en-US" dirty="0">
+                        <a:latin typeface="Times New Roman" panose="02020603050405020304" pitchFamily="18" charset="0"/>
+                        <a:cs typeface="Times New Roman" panose="02020603050405020304" pitchFamily="18" charset="0"/>
+                      </a:endParaRPr>
+                    </a:p>
+                  </a:txBody>
+                  <a:tcPr/>
+                </a:tc>
+                <a:tc>
+                  <a:txBody>
+                    <a:bodyPr/>
+                    <a:lstStyle/>
+                    <a:p>
+                      <a:pPr algn="ctr" latinLnBrk="1"/>
+                      <a:endParaRPr lang="ko-KR" altLang="en-US" dirty="0">
+                        <a:latin typeface="Times New Roman" panose="02020603050405020304" pitchFamily="18" charset="0"/>
+                        <a:cs typeface="Times New Roman" panose="02020603050405020304" pitchFamily="18" charset="0"/>
+                      </a:endParaRPr>
+                    </a:p>
+                  </a:txBody>
+                  <a:tcPr/>
+                </a:tc>
+                <a:extLst>
+                  <a:ext uri="{0D108BD9-81ED-4DB2-BD59-A6C34878D82A}">
+                    <a16:rowId xmlns:a16="http://schemas.microsoft.com/office/drawing/2014/main" val="915100308"/>
+                  </a:ext>
+                </a:extLst>
+              </a:tr>
+              <a:tr h="370840">
+                <a:tc>
+                  <a:txBody>
+                    <a:bodyPr/>
+                    <a:lstStyle/>
+                    <a:p>
+                      <a:pPr algn="ctr" latinLnBrk="1"/>
+                      <a:r>
+                        <a:rPr lang="en-US" altLang="ko-KR" b="1" i="1" dirty="0">
+                          <a:latin typeface="Times New Roman" panose="02020603050405020304" pitchFamily="18" charset="0"/>
+                          <a:cs typeface="Times New Roman" panose="02020603050405020304" pitchFamily="18" charset="0"/>
+                        </a:rPr>
+                        <a:t>SR</a:t>
+                      </a:r>
+                      <a:endParaRPr lang="ko-KR" altLang="en-US" b="1" i="1" dirty="0">
+                        <a:latin typeface="Times New Roman" panose="02020603050405020304" pitchFamily="18" charset="0"/>
+                        <a:cs typeface="Times New Roman" panose="02020603050405020304" pitchFamily="18" charset="0"/>
+                      </a:endParaRPr>
+                    </a:p>
+                  </a:txBody>
+                  <a:tcPr/>
+                </a:tc>
+                <a:tc>
+                  <a:txBody>
+                    <a:bodyPr/>
+                    <a:lstStyle/>
+                    <a:p>
+                      <a:pPr algn="ctr" latinLnBrk="1"/>
+                      <a:endParaRPr lang="ko-KR" altLang="en-US" dirty="0">
+                        <a:latin typeface="Times New Roman" panose="02020603050405020304" pitchFamily="18" charset="0"/>
+                        <a:cs typeface="Times New Roman" panose="02020603050405020304" pitchFamily="18" charset="0"/>
+                      </a:endParaRPr>
+                    </a:p>
+                  </a:txBody>
+                  <a:tcPr/>
+                </a:tc>
+                <a:tc>
+                  <a:txBody>
+                    <a:bodyPr/>
+                    <a:lstStyle/>
+                    <a:p>
+                      <a:pPr algn="ctr" latinLnBrk="1"/>
+                      <a:endParaRPr lang="ko-KR" altLang="en-US" dirty="0">
+                        <a:latin typeface="Times New Roman" panose="02020603050405020304" pitchFamily="18" charset="0"/>
+                        <a:cs typeface="Times New Roman" panose="02020603050405020304" pitchFamily="18" charset="0"/>
+                      </a:endParaRPr>
+                    </a:p>
+                  </a:txBody>
+                  <a:tcPr/>
+                </a:tc>
+                <a:tc>
+                  <a:txBody>
+                    <a:bodyPr/>
+                    <a:lstStyle/>
+                    <a:p>
+                      <a:pPr algn="ctr" latinLnBrk="1"/>
+                      <a:endParaRPr lang="ko-KR" altLang="en-US" dirty="0">
+                        <a:latin typeface="Times New Roman" panose="02020603050405020304" pitchFamily="18" charset="0"/>
+                        <a:cs typeface="Times New Roman" panose="02020603050405020304" pitchFamily="18" charset="0"/>
+                      </a:endParaRPr>
+                    </a:p>
+                  </a:txBody>
+                  <a:tcPr/>
+                </a:tc>
+                <a:tc>
+                  <a:txBody>
+                    <a:bodyPr/>
+                    <a:lstStyle/>
+                    <a:p>
+                      <a:pPr algn="ctr" latinLnBrk="1"/>
+                      <a:endParaRPr lang="ko-KR" altLang="en-US" dirty="0">
+                        <a:latin typeface="Times New Roman" panose="02020603050405020304" pitchFamily="18" charset="0"/>
+                        <a:cs typeface="Times New Roman" panose="02020603050405020304" pitchFamily="18" charset="0"/>
+                      </a:endParaRPr>
+                    </a:p>
+                  </a:txBody>
+                  <a:tcPr/>
+                </a:tc>
+                <a:tc>
+                  <a:txBody>
+                    <a:bodyPr/>
+                    <a:lstStyle/>
+                    <a:p>
+                      <a:pPr algn="ctr" latinLnBrk="1"/>
+                      <a:endParaRPr lang="ko-KR" altLang="en-US" dirty="0">
+                        <a:latin typeface="Times New Roman" panose="02020603050405020304" pitchFamily="18" charset="0"/>
+                        <a:cs typeface="Times New Roman" panose="02020603050405020304" pitchFamily="18" charset="0"/>
+                      </a:endParaRPr>
+                    </a:p>
+                  </a:txBody>
+                  <a:tcPr/>
+                </a:tc>
+                <a:tc>
+                  <a:txBody>
+                    <a:bodyPr/>
+                    <a:lstStyle/>
+                    <a:p>
+                      <a:pPr algn="ctr" latinLnBrk="1"/>
+                      <a:endParaRPr lang="ko-KR" altLang="en-US" dirty="0">
+                        <a:latin typeface="Times New Roman" panose="02020603050405020304" pitchFamily="18" charset="0"/>
+                        <a:cs typeface="Times New Roman" panose="02020603050405020304" pitchFamily="18" charset="0"/>
+                      </a:endParaRPr>
+                    </a:p>
+                  </a:txBody>
+                  <a:tcPr/>
+                </a:tc>
+                <a:extLst>
+                  <a:ext uri="{0D108BD9-81ED-4DB2-BD59-A6C34878D82A}">
+                    <a16:rowId xmlns:a16="http://schemas.microsoft.com/office/drawing/2014/main" val="3338720211"/>
+                  </a:ext>
+                </a:extLst>
+              </a:tr>
+              <a:tr h="370840">
+                <a:tc>
+                  <a:txBody>
+                    <a:bodyPr/>
+                    <a:lstStyle/>
+                    <a:p>
+                      <a:pPr algn="ctr" latinLnBrk="1"/>
+                      <a:r>
+                        <a:rPr lang="en-US" altLang="ko-KR" b="1" i="1" dirty="0">
+                          <a:latin typeface="Times New Roman" panose="02020603050405020304" pitchFamily="18" charset="0"/>
+                          <a:cs typeface="Times New Roman" panose="02020603050405020304" pitchFamily="18" charset="0"/>
+                        </a:rPr>
+                        <a:t>RI</a:t>
+                      </a:r>
+                      <a:endParaRPr lang="ko-KR" altLang="en-US" b="1" i="1" dirty="0">
+                        <a:latin typeface="Times New Roman" panose="02020603050405020304" pitchFamily="18" charset="0"/>
+                        <a:cs typeface="Times New Roman" panose="02020603050405020304" pitchFamily="18" charset="0"/>
+                      </a:endParaRPr>
+                    </a:p>
+                  </a:txBody>
+                  <a:tcPr/>
+                </a:tc>
+                <a:tc>
+                  <a:txBody>
+                    <a:bodyPr/>
+                    <a:lstStyle/>
+                    <a:p>
+                      <a:pPr algn="ctr" latinLnBrk="1"/>
+                      <a:endParaRPr lang="ko-KR" altLang="en-US">
+                        <a:latin typeface="Times New Roman" panose="02020603050405020304" pitchFamily="18" charset="0"/>
+                        <a:cs typeface="Times New Roman" panose="02020603050405020304" pitchFamily="18" charset="0"/>
+                      </a:endParaRPr>
+                    </a:p>
+                  </a:txBody>
+                  <a:tcPr/>
+                </a:tc>
+                <a:tc>
+                  <a:txBody>
+                    <a:bodyPr/>
+                    <a:lstStyle/>
+                    <a:p>
+                      <a:pPr algn="ctr" latinLnBrk="1"/>
+                      <a:endParaRPr lang="ko-KR" altLang="en-US" dirty="0">
+                        <a:latin typeface="Times New Roman" panose="02020603050405020304" pitchFamily="18" charset="0"/>
+                        <a:cs typeface="Times New Roman" panose="02020603050405020304" pitchFamily="18" charset="0"/>
+                      </a:endParaRPr>
+                    </a:p>
+                  </a:txBody>
+                  <a:tcPr/>
+                </a:tc>
+                <a:tc>
+                  <a:txBody>
+                    <a:bodyPr/>
+                    <a:lstStyle/>
+                    <a:p>
+                      <a:pPr algn="ctr" latinLnBrk="1"/>
+                      <a:endParaRPr lang="ko-KR" altLang="en-US">
+                        <a:latin typeface="Times New Roman" panose="02020603050405020304" pitchFamily="18" charset="0"/>
+                        <a:cs typeface="Times New Roman" panose="02020603050405020304" pitchFamily="18" charset="0"/>
+                      </a:endParaRPr>
+                    </a:p>
+                  </a:txBody>
+                  <a:tcPr/>
+                </a:tc>
+                <a:tc>
+                  <a:txBody>
+                    <a:bodyPr/>
+                    <a:lstStyle/>
+                    <a:p>
+                      <a:pPr algn="ctr" latinLnBrk="1"/>
+                      <a:endParaRPr lang="ko-KR" altLang="en-US">
+                        <a:latin typeface="Times New Roman" panose="02020603050405020304" pitchFamily="18" charset="0"/>
+                        <a:cs typeface="Times New Roman" panose="02020603050405020304" pitchFamily="18" charset="0"/>
+                      </a:endParaRPr>
+                    </a:p>
+                  </a:txBody>
+                  <a:tcPr/>
+                </a:tc>
+                <a:tc>
+                  <a:txBody>
+                    <a:bodyPr/>
+                    <a:lstStyle/>
+                    <a:p>
+                      <a:pPr algn="ctr" latinLnBrk="1"/>
+                      <a:endParaRPr lang="ko-KR" altLang="en-US" dirty="0">
+                        <a:latin typeface="Times New Roman" panose="02020603050405020304" pitchFamily="18" charset="0"/>
+                        <a:cs typeface="Times New Roman" panose="02020603050405020304" pitchFamily="18" charset="0"/>
+                      </a:endParaRPr>
+                    </a:p>
+                  </a:txBody>
+                  <a:tcPr/>
+                </a:tc>
+                <a:tc>
+                  <a:txBody>
+                    <a:bodyPr/>
+                    <a:lstStyle/>
+                    <a:p>
+                      <a:pPr algn="ctr" latinLnBrk="1"/>
+                      <a:endParaRPr lang="ko-KR" altLang="en-US" dirty="0">
+                        <a:latin typeface="Times New Roman" panose="02020603050405020304" pitchFamily="18" charset="0"/>
+                        <a:cs typeface="Times New Roman" panose="02020603050405020304" pitchFamily="18" charset="0"/>
+                      </a:endParaRPr>
+                    </a:p>
+                  </a:txBody>
+                  <a:tcPr/>
+                </a:tc>
+                <a:extLst>
+                  <a:ext uri="{0D108BD9-81ED-4DB2-BD59-A6C34878D82A}">
+                    <a16:rowId xmlns:a16="http://schemas.microsoft.com/office/drawing/2014/main" val="2301365062"/>
+                  </a:ext>
+                </a:extLst>
+              </a:tr>
+              <a:tr h="370840">
+                <a:tc>
+                  <a:txBody>
+                    <a:bodyPr/>
+                    <a:lstStyle/>
+                    <a:p>
+                      <a:pPr algn="ctr" latinLnBrk="1"/>
+                      <a:r>
+                        <a:rPr lang="en-US" altLang="ko-KR" b="1" i="1" dirty="0">
+                          <a:latin typeface="Times New Roman" panose="02020603050405020304" pitchFamily="18" charset="0"/>
+                          <a:cs typeface="Times New Roman" panose="02020603050405020304" pitchFamily="18" charset="0"/>
+                        </a:rPr>
+                        <a:t>RS</a:t>
+                      </a:r>
+                      <a:endParaRPr lang="ko-KR" altLang="en-US" b="1" i="1" dirty="0">
+                        <a:latin typeface="Times New Roman" panose="02020603050405020304" pitchFamily="18" charset="0"/>
+                        <a:cs typeface="Times New Roman" panose="02020603050405020304" pitchFamily="18" charset="0"/>
+                      </a:endParaRPr>
+                    </a:p>
+                  </a:txBody>
+                  <a:tcPr/>
+                </a:tc>
+                <a:tc>
+                  <a:txBody>
+                    <a:bodyPr/>
+                    <a:lstStyle/>
+                    <a:p>
+                      <a:pPr algn="ctr" latinLnBrk="1"/>
+                      <a:endParaRPr lang="ko-KR" altLang="en-US">
+                        <a:latin typeface="Times New Roman" panose="02020603050405020304" pitchFamily="18" charset="0"/>
+                        <a:cs typeface="Times New Roman" panose="02020603050405020304" pitchFamily="18" charset="0"/>
+                      </a:endParaRPr>
+                    </a:p>
+                  </a:txBody>
+                  <a:tcPr/>
+                </a:tc>
+                <a:tc>
+                  <a:txBody>
+                    <a:bodyPr/>
+                    <a:lstStyle/>
+                    <a:p>
+                      <a:pPr algn="ctr" latinLnBrk="1"/>
+                      <a:endParaRPr lang="ko-KR" altLang="en-US" dirty="0">
+                        <a:latin typeface="Times New Roman" panose="02020603050405020304" pitchFamily="18" charset="0"/>
+                        <a:cs typeface="Times New Roman" panose="02020603050405020304" pitchFamily="18" charset="0"/>
+                      </a:endParaRPr>
+                    </a:p>
+                  </a:txBody>
+                  <a:tcPr/>
+                </a:tc>
+                <a:tc>
+                  <a:txBody>
+                    <a:bodyPr/>
+                    <a:lstStyle/>
+                    <a:p>
+                      <a:pPr algn="ctr" latinLnBrk="1"/>
+                      <a:endParaRPr lang="ko-KR" altLang="en-US" dirty="0">
+                        <a:latin typeface="Times New Roman" panose="02020603050405020304" pitchFamily="18" charset="0"/>
+                        <a:cs typeface="Times New Roman" panose="02020603050405020304" pitchFamily="18" charset="0"/>
+                      </a:endParaRPr>
+                    </a:p>
+                  </a:txBody>
+                  <a:tcPr/>
+                </a:tc>
+                <a:tc>
+                  <a:txBody>
+                    <a:bodyPr/>
+                    <a:lstStyle/>
+                    <a:p>
+                      <a:pPr algn="ctr" latinLnBrk="1"/>
+                      <a:endParaRPr lang="ko-KR" altLang="en-US" dirty="0">
+                        <a:latin typeface="Times New Roman" panose="02020603050405020304" pitchFamily="18" charset="0"/>
+                        <a:cs typeface="Times New Roman" panose="02020603050405020304" pitchFamily="18" charset="0"/>
+                      </a:endParaRPr>
+                    </a:p>
+                  </a:txBody>
+                  <a:tcPr/>
+                </a:tc>
+                <a:tc>
+                  <a:txBody>
+                    <a:bodyPr/>
+                    <a:lstStyle/>
+                    <a:p>
+                      <a:pPr algn="ctr" latinLnBrk="1"/>
+                      <a:endParaRPr lang="ko-KR" altLang="en-US" dirty="0">
+                        <a:latin typeface="Times New Roman" panose="02020603050405020304" pitchFamily="18" charset="0"/>
+                        <a:cs typeface="Times New Roman" panose="02020603050405020304" pitchFamily="18" charset="0"/>
+                      </a:endParaRPr>
+                    </a:p>
+                  </a:txBody>
+                  <a:tcPr/>
+                </a:tc>
+                <a:tc>
+                  <a:txBody>
+                    <a:bodyPr/>
+                    <a:lstStyle/>
+                    <a:p>
+                      <a:pPr algn="ctr" latinLnBrk="1"/>
+                      <a:endParaRPr lang="ko-KR" altLang="en-US" dirty="0">
+                        <a:latin typeface="Times New Roman" panose="02020603050405020304" pitchFamily="18" charset="0"/>
+                        <a:cs typeface="Times New Roman" panose="02020603050405020304" pitchFamily="18" charset="0"/>
+                      </a:endParaRPr>
+                    </a:p>
+                  </a:txBody>
+                  <a:tcPr/>
+                </a:tc>
+                <a:extLst>
+                  <a:ext uri="{0D108BD9-81ED-4DB2-BD59-A6C34878D82A}">
+                    <a16:rowId xmlns:a16="http://schemas.microsoft.com/office/drawing/2014/main" val="124352940"/>
+                  </a:ext>
+                </a:extLst>
+              </a:tr>
+              <a:tr h="370840">
+                <a:tc>
+                  <a:txBody>
+                    <a:bodyPr/>
+                    <a:lstStyle/>
+                    <a:p>
+                      <a:pPr algn="ctr" latinLnBrk="1"/>
+                      <a:r>
+                        <a:rPr lang="en-US" altLang="ko-KR" b="1" i="1" dirty="0">
+                          <a:latin typeface="Times New Roman" panose="02020603050405020304" pitchFamily="18" charset="0"/>
+                          <a:cs typeface="Times New Roman" panose="02020603050405020304" pitchFamily="18" charset="0"/>
+                        </a:rPr>
+                        <a:t>RD</a:t>
+                      </a:r>
+                      <a:endParaRPr lang="ko-KR" altLang="en-US" b="1" i="1" dirty="0">
+                        <a:latin typeface="Times New Roman" panose="02020603050405020304" pitchFamily="18" charset="0"/>
+                        <a:cs typeface="Times New Roman" panose="02020603050405020304" pitchFamily="18" charset="0"/>
+                      </a:endParaRPr>
+                    </a:p>
+                  </a:txBody>
+                  <a:tcPr/>
+                </a:tc>
+                <a:tc>
+                  <a:txBody>
+                    <a:bodyPr/>
+                    <a:lstStyle/>
+                    <a:p>
+                      <a:pPr algn="ctr" latinLnBrk="1"/>
+                      <a:endParaRPr lang="ko-KR" altLang="en-US">
+                        <a:latin typeface="Times New Roman" panose="02020603050405020304" pitchFamily="18" charset="0"/>
+                        <a:cs typeface="Times New Roman" panose="02020603050405020304" pitchFamily="18" charset="0"/>
+                      </a:endParaRPr>
+                    </a:p>
+                  </a:txBody>
+                  <a:tcPr/>
+                </a:tc>
+                <a:tc>
+                  <a:txBody>
+                    <a:bodyPr/>
+                    <a:lstStyle/>
+                    <a:p>
+                      <a:pPr algn="ctr" latinLnBrk="1"/>
+                      <a:endParaRPr lang="ko-KR" altLang="en-US">
+                        <a:latin typeface="Times New Roman" panose="02020603050405020304" pitchFamily="18" charset="0"/>
+                        <a:cs typeface="Times New Roman" panose="02020603050405020304" pitchFamily="18" charset="0"/>
+                      </a:endParaRPr>
+                    </a:p>
+                  </a:txBody>
+                  <a:tcPr/>
+                </a:tc>
+                <a:tc>
+                  <a:txBody>
+                    <a:bodyPr/>
+                    <a:lstStyle/>
+                    <a:p>
+                      <a:pPr algn="ctr" latinLnBrk="1"/>
+                      <a:endParaRPr lang="ko-KR" altLang="en-US" dirty="0">
+                        <a:latin typeface="Times New Roman" panose="02020603050405020304" pitchFamily="18" charset="0"/>
+                        <a:cs typeface="Times New Roman" panose="02020603050405020304" pitchFamily="18" charset="0"/>
+                      </a:endParaRPr>
+                    </a:p>
+                  </a:txBody>
+                  <a:tcPr/>
+                </a:tc>
+                <a:tc>
+                  <a:txBody>
+                    <a:bodyPr/>
+                    <a:lstStyle/>
+                    <a:p>
+                      <a:pPr algn="ctr" latinLnBrk="1"/>
+                      <a:endParaRPr lang="ko-KR" altLang="en-US" dirty="0">
+                        <a:latin typeface="Times New Roman" panose="02020603050405020304" pitchFamily="18" charset="0"/>
+                        <a:cs typeface="Times New Roman" panose="02020603050405020304" pitchFamily="18" charset="0"/>
+                      </a:endParaRPr>
+                    </a:p>
+                  </a:txBody>
+                  <a:tcPr/>
+                </a:tc>
+                <a:tc>
+                  <a:txBody>
+                    <a:bodyPr/>
+                    <a:lstStyle/>
+                    <a:p>
+                      <a:pPr algn="ctr" latinLnBrk="1"/>
+                      <a:endParaRPr lang="ko-KR" altLang="en-US" dirty="0">
+                        <a:latin typeface="Times New Roman" panose="02020603050405020304" pitchFamily="18" charset="0"/>
+                        <a:cs typeface="Times New Roman" panose="02020603050405020304" pitchFamily="18" charset="0"/>
+                      </a:endParaRPr>
+                    </a:p>
+                  </a:txBody>
+                  <a:tcPr/>
+                </a:tc>
+                <a:tc>
+                  <a:txBody>
+                    <a:bodyPr/>
+                    <a:lstStyle/>
+                    <a:p>
+                      <a:pPr algn="ctr" latinLnBrk="1"/>
+                      <a:endParaRPr lang="ko-KR" altLang="en-US" dirty="0">
+                        <a:latin typeface="Times New Roman" panose="02020603050405020304" pitchFamily="18" charset="0"/>
+                        <a:cs typeface="Times New Roman" panose="02020603050405020304" pitchFamily="18" charset="0"/>
+                      </a:endParaRPr>
+                    </a:p>
+                  </a:txBody>
+                  <a:tcPr/>
+                </a:tc>
+                <a:extLst>
+                  <a:ext uri="{0D108BD9-81ED-4DB2-BD59-A6C34878D82A}">
+                    <a16:rowId xmlns:a16="http://schemas.microsoft.com/office/drawing/2014/main" val="1621145085"/>
+                  </a:ext>
+                </a:extLst>
+              </a:tr>
+            </a:tbl>
+          </a:graphicData>
+        </a:graphic>
+      </p:graphicFrame>
+    </p:spTree>
+    <p:extLst>
+      <p:ext uri="{BB962C8B-B14F-4D97-AF65-F5344CB8AC3E}">
+        <p14:creationId xmlns:p14="http://schemas.microsoft.com/office/powerpoint/2010/main" val="3826101297"/>
+      </p:ext>
+    </p:extLst>
+  </p:cSld>
+  <p:clrMapOvr>
+    <a:masterClrMapping/>
+  </p:clrMapOvr>
+</p:sld>
+</file>
+
+<file path=ppt/slides/slide4.xml><?xml version="1.0" encoding="utf-8"?>
+<p:sld xmlns:a="http://schemas.openxmlformats.org/drawingml/2006/main" xmlns:r="http://schemas.openxmlformats.org/officeDocument/2006/relationships" xmlns:p="http://schemas.openxmlformats.org/presentationml/2006/main">
+  <p:cSld>
+    <p:spTree>
+      <p:nvGrpSpPr>
+        <p:cNvPr id="1" name=""/>
+        <p:cNvGrpSpPr/>
+        <p:nvPr/>
+      </p:nvGrpSpPr>
+      <p:grpSpPr>
+        <a:xfrm>
+          <a:off x="0" y="0"/>
+          <a:ext cx="0" cy="0"/>
+          <a:chOff x="0" y="0"/>
+          <a:chExt cx="0" cy="0"/>
+        </a:xfrm>
+      </p:grpSpPr>
+      <p:sp>
+        <p:nvSpPr>
+          <p:cNvPr id="11" name="TextBox 10">
+            <a:extLst>
+              <a:ext uri="{FF2B5EF4-FFF2-40B4-BE49-F238E27FC236}">
+                <a16:creationId xmlns:a16="http://schemas.microsoft.com/office/drawing/2014/main" id="{F597FB5B-C26C-9EF8-B3DC-4E6EF1BD8B67}"/>
+              </a:ext>
+            </a:extLst>
+          </p:cNvPr>
+          <p:cNvSpPr txBox="1"/>
+          <p:nvPr/>
+        </p:nvSpPr>
+        <p:spPr>
+          <a:xfrm>
+            <a:off x="422956" y="398901"/>
+            <a:ext cx="575799" cy="477054"/>
+          </a:xfrm>
+          <a:prstGeom prst="rect">
+            <a:avLst/>
+          </a:prstGeom>
+          <a:noFill/>
+        </p:spPr>
+        <p:txBody>
+          <a:bodyPr wrap="none" rtlCol="0">
+            <a:spAutoFit/>
+          </a:bodyPr>
+          <a:lstStyle/>
+          <a:p>
+            <a:r>
+              <a:rPr lang="en-US" altLang="ko-KR" sz="2500" dirty="0">
+                <a:latin typeface="Times New Roman" panose="02020603050405020304" pitchFamily="18" charset="0"/>
+                <a:cs typeface="Times New Roman" panose="02020603050405020304" pitchFamily="18" charset="0"/>
+              </a:rPr>
+              <a:t>RF</a:t>
+            </a:r>
+          </a:p>
+        </p:txBody>
+      </p:sp>
+      <p:sp>
+        <p:nvSpPr>
+          <p:cNvPr id="2" name="TextBox 1">
+            <a:extLst>
+              <a:ext uri="{FF2B5EF4-FFF2-40B4-BE49-F238E27FC236}">
+                <a16:creationId xmlns:a16="http://schemas.microsoft.com/office/drawing/2014/main" id="{F3F5CF70-089D-4C58-BF3D-2ACD458EE94B}"/>
+              </a:ext>
+            </a:extLst>
+          </p:cNvPr>
+          <p:cNvSpPr txBox="1"/>
+          <p:nvPr/>
+        </p:nvSpPr>
+        <p:spPr>
+          <a:xfrm>
+            <a:off x="2297624" y="5246339"/>
+            <a:ext cx="7055138" cy="369332"/>
+          </a:xfrm>
+          <a:prstGeom prst="rect">
+            <a:avLst/>
+          </a:prstGeom>
+          <a:noFill/>
+        </p:spPr>
+        <p:txBody>
+          <a:bodyPr wrap="none" rtlCol="0">
+            <a:spAutoFit/>
+          </a:bodyPr>
+          <a:lstStyle/>
+          <a:p>
+            <a:pPr algn="ctr"/>
+            <a:r>
+              <a:rPr lang="en-US" altLang="ko-KR" dirty="0">
+                <a:latin typeface="Times New Roman" panose="02020603050405020304" pitchFamily="18" charset="0"/>
+                <a:cs typeface="Times New Roman" panose="02020603050405020304" pitchFamily="18" charset="0"/>
+              </a:rPr>
+              <a:t>Table2. Performance of Easy Data Augmentation according to each </a:t>
+            </a:r>
+            <a:r>
+              <a:rPr lang="en-US" altLang="ko-KR" dirty="0" err="1">
+                <a:latin typeface="Times New Roman" panose="02020603050405020304" pitchFamily="18" charset="0"/>
+                <a:cs typeface="Times New Roman" panose="02020603050405020304" pitchFamily="18" charset="0"/>
+              </a:rPr>
+              <a:t>KFold</a:t>
+            </a:r>
+            <a:endParaRPr lang="en-US" altLang="ko-KR" dirty="0">
+              <a:latin typeface="Times New Roman" panose="02020603050405020304" pitchFamily="18" charset="0"/>
+              <a:cs typeface="Times New Roman" panose="02020603050405020304" pitchFamily="18" charset="0"/>
+            </a:endParaRPr>
+          </a:p>
+        </p:txBody>
+      </p:sp>
+      <p:graphicFrame>
+        <p:nvGraphicFramePr>
+          <p:cNvPr id="4" name="표 3">
+            <a:extLst>
+              <a:ext uri="{FF2B5EF4-FFF2-40B4-BE49-F238E27FC236}">
+                <a16:creationId xmlns:a16="http://schemas.microsoft.com/office/drawing/2014/main" id="{FD740244-CE9A-41D9-041A-AF137853DCD7}"/>
+              </a:ext>
+            </a:extLst>
+          </p:cNvPr>
+          <p:cNvGraphicFramePr>
+            <a:graphicFrameLocks noGrp="1"/>
+          </p:cNvGraphicFramePr>
+          <p:nvPr>
+            <p:extLst>
+              <p:ext uri="{D42A27DB-BD31-4B8C-83A1-F6EECF244321}">
+                <p14:modId xmlns:p14="http://schemas.microsoft.com/office/powerpoint/2010/main" val="2952972894"/>
+              </p:ext>
+            </p:extLst>
+          </p:nvPr>
+        </p:nvGraphicFramePr>
+        <p:xfrm>
+          <a:off x="1155756" y="1347648"/>
+          <a:ext cx="9338875" cy="3876040"/>
+        </p:xfrm>
+        <a:graphic>
+          <a:graphicData uri="http://schemas.openxmlformats.org/drawingml/2006/table">
+            <a:tbl>
+              <a:tblPr firstRow="1" bandRow="1">
+                <a:tableStyleId>{5940675A-B579-460E-94D1-54222C63F5DA}</a:tableStyleId>
+              </a:tblPr>
+              <a:tblGrid>
+                <a:gridCol w="1334125">
+                  <a:extLst>
+                    <a:ext uri="{9D8B030D-6E8A-4147-A177-3AD203B41FA5}">
+                      <a16:colId xmlns:a16="http://schemas.microsoft.com/office/drawing/2014/main" val="3879856640"/>
+                    </a:ext>
+                  </a:extLst>
+                </a:gridCol>
+                <a:gridCol w="1334125">
+                  <a:extLst>
+                    <a:ext uri="{9D8B030D-6E8A-4147-A177-3AD203B41FA5}">
+                      <a16:colId xmlns:a16="http://schemas.microsoft.com/office/drawing/2014/main" val="4094721889"/>
+                    </a:ext>
+                  </a:extLst>
+                </a:gridCol>
+                <a:gridCol w="1334125">
+                  <a:extLst>
+                    <a:ext uri="{9D8B030D-6E8A-4147-A177-3AD203B41FA5}">
+                      <a16:colId xmlns:a16="http://schemas.microsoft.com/office/drawing/2014/main" val="1083152101"/>
+                    </a:ext>
+                  </a:extLst>
+                </a:gridCol>
+                <a:gridCol w="1334125">
+                  <a:extLst>
+                    <a:ext uri="{9D8B030D-6E8A-4147-A177-3AD203B41FA5}">
+                      <a16:colId xmlns:a16="http://schemas.microsoft.com/office/drawing/2014/main" val="1701947921"/>
+                    </a:ext>
+                  </a:extLst>
+                </a:gridCol>
+                <a:gridCol w="1334125">
+                  <a:extLst>
+                    <a:ext uri="{9D8B030D-6E8A-4147-A177-3AD203B41FA5}">
+                      <a16:colId xmlns:a16="http://schemas.microsoft.com/office/drawing/2014/main" val="3766362005"/>
+                    </a:ext>
+                  </a:extLst>
+                </a:gridCol>
+                <a:gridCol w="1334125">
+                  <a:extLst>
+                    <a:ext uri="{9D8B030D-6E8A-4147-A177-3AD203B41FA5}">
+                      <a16:colId xmlns:a16="http://schemas.microsoft.com/office/drawing/2014/main" val="3423723277"/>
+                    </a:ext>
+                  </a:extLst>
+                </a:gridCol>
+                <a:gridCol w="1334125">
+                  <a:extLst>
+                    <a:ext uri="{9D8B030D-6E8A-4147-A177-3AD203B41FA5}">
+                      <a16:colId xmlns:a16="http://schemas.microsoft.com/office/drawing/2014/main" val="3541592749"/>
+                    </a:ext>
+                  </a:extLst>
+                </a:gridCol>
+              </a:tblGrid>
+              <a:tr h="370840">
+                <a:tc>
+                  <a:txBody>
+                    <a:bodyPr/>
+                    <a:lstStyle/>
+                    <a:p>
+                      <a:pPr algn="ctr" latinLnBrk="1"/>
+                      <a:endParaRPr lang="ko-KR" altLang="en-US" dirty="0">
+                        <a:latin typeface="Times New Roman" panose="02020603050405020304" pitchFamily="18" charset="0"/>
+                        <a:cs typeface="Times New Roman" panose="02020603050405020304" pitchFamily="18" charset="0"/>
+                      </a:endParaRPr>
+                    </a:p>
+                  </a:txBody>
+                  <a:tcPr/>
+                </a:tc>
+                <a:tc>
+                  <a:txBody>
+                    <a:bodyPr/>
+                    <a:lstStyle/>
+                    <a:p>
+                      <a:pPr algn="ctr" latinLnBrk="1"/>
+                      <a:r>
+                        <a:rPr lang="en-US" altLang="ko-KR" b="1" i="1" dirty="0">
+                          <a:latin typeface="Times New Roman" panose="02020603050405020304" pitchFamily="18" charset="0"/>
+                          <a:cs typeface="Times New Roman" panose="02020603050405020304" pitchFamily="18" charset="0"/>
+                        </a:rPr>
+                        <a:t>1</a:t>
+                      </a:r>
+                      <a:endParaRPr lang="ko-KR" altLang="en-US" b="1" i="1" dirty="0">
+                        <a:latin typeface="Times New Roman" panose="02020603050405020304" pitchFamily="18" charset="0"/>
+                        <a:cs typeface="Times New Roman" panose="02020603050405020304" pitchFamily="18" charset="0"/>
+                      </a:endParaRPr>
+                    </a:p>
+                  </a:txBody>
+                  <a:tcPr/>
+                </a:tc>
+                <a:tc>
+                  <a:txBody>
+                    <a:bodyPr/>
+                    <a:lstStyle/>
+                    <a:p>
+                      <a:pPr algn="ctr" latinLnBrk="1"/>
+                      <a:r>
+                        <a:rPr lang="en-US" altLang="ko-KR" b="1" i="1" dirty="0">
+                          <a:latin typeface="Times New Roman" panose="02020603050405020304" pitchFamily="18" charset="0"/>
+                          <a:cs typeface="Times New Roman" panose="02020603050405020304" pitchFamily="18" charset="0"/>
+                        </a:rPr>
+                        <a:t>2</a:t>
+                      </a:r>
+                      <a:endParaRPr lang="ko-KR" altLang="en-US" b="1" i="1" dirty="0">
+                        <a:latin typeface="Times New Roman" panose="02020603050405020304" pitchFamily="18" charset="0"/>
+                        <a:cs typeface="Times New Roman" panose="02020603050405020304" pitchFamily="18" charset="0"/>
+                      </a:endParaRPr>
+                    </a:p>
+                  </a:txBody>
+                  <a:tcPr/>
+                </a:tc>
+                <a:tc>
+                  <a:txBody>
+                    <a:bodyPr/>
+                    <a:lstStyle/>
+                    <a:p>
+                      <a:pPr algn="ctr" latinLnBrk="1"/>
+                      <a:r>
+                        <a:rPr lang="en-US" altLang="ko-KR" b="1" i="1" dirty="0">
+                          <a:latin typeface="Times New Roman" panose="02020603050405020304" pitchFamily="18" charset="0"/>
+                          <a:cs typeface="Times New Roman" panose="02020603050405020304" pitchFamily="18" charset="0"/>
+                        </a:rPr>
+                        <a:t>3</a:t>
+                      </a:r>
+                      <a:endParaRPr lang="ko-KR" altLang="en-US" b="1" i="1" dirty="0">
+                        <a:latin typeface="Times New Roman" panose="02020603050405020304" pitchFamily="18" charset="0"/>
+                        <a:cs typeface="Times New Roman" panose="02020603050405020304" pitchFamily="18" charset="0"/>
+                      </a:endParaRPr>
+                    </a:p>
+                  </a:txBody>
+                  <a:tcPr/>
+                </a:tc>
+                <a:tc>
+                  <a:txBody>
+                    <a:bodyPr/>
+                    <a:lstStyle/>
+                    <a:p>
+                      <a:pPr algn="ctr" latinLnBrk="1"/>
+                      <a:r>
+                        <a:rPr lang="en-US" altLang="ko-KR" b="1" i="1" dirty="0">
+                          <a:latin typeface="Times New Roman" panose="02020603050405020304" pitchFamily="18" charset="0"/>
+                          <a:cs typeface="Times New Roman" panose="02020603050405020304" pitchFamily="18" charset="0"/>
+                        </a:rPr>
+                        <a:t>4</a:t>
+                      </a:r>
+                      <a:endParaRPr lang="ko-KR" altLang="en-US" b="1" i="1" dirty="0">
+                        <a:latin typeface="Times New Roman" panose="02020603050405020304" pitchFamily="18" charset="0"/>
+                        <a:cs typeface="Times New Roman" panose="02020603050405020304" pitchFamily="18" charset="0"/>
+                      </a:endParaRPr>
+                    </a:p>
+                  </a:txBody>
+                  <a:tcPr/>
+                </a:tc>
+                <a:tc>
+                  <a:txBody>
+                    <a:bodyPr/>
+                    <a:lstStyle/>
+                    <a:p>
+                      <a:pPr algn="ctr" latinLnBrk="1"/>
+                      <a:r>
+                        <a:rPr lang="en-US" altLang="ko-KR" b="1" i="1" dirty="0">
+                          <a:latin typeface="Times New Roman" panose="02020603050405020304" pitchFamily="18" charset="0"/>
+                          <a:cs typeface="Times New Roman" panose="02020603050405020304" pitchFamily="18" charset="0"/>
+                        </a:rPr>
+                        <a:t>5</a:t>
+                      </a:r>
+                      <a:endParaRPr lang="ko-KR" altLang="en-US" b="1" i="1" dirty="0">
+                        <a:latin typeface="Times New Roman" panose="02020603050405020304" pitchFamily="18" charset="0"/>
+                        <a:cs typeface="Times New Roman" panose="02020603050405020304" pitchFamily="18" charset="0"/>
+                      </a:endParaRPr>
+                    </a:p>
+                  </a:txBody>
+                  <a:tcPr/>
+                </a:tc>
+                <a:tc>
+                  <a:txBody>
+                    <a:bodyPr/>
+                    <a:lstStyle/>
+                    <a:p>
+                      <a:pPr algn="ctr" latinLnBrk="1"/>
+                      <a:r>
+                        <a:rPr lang="en-US" altLang="ko-KR" b="1" i="1" dirty="0">
+                          <a:latin typeface="Times New Roman" panose="02020603050405020304" pitchFamily="18" charset="0"/>
+                          <a:cs typeface="Times New Roman" panose="02020603050405020304" pitchFamily="18" charset="0"/>
+                        </a:rPr>
+                        <a:t>AVG</a:t>
+                      </a:r>
+                      <a:endParaRPr lang="ko-KR" altLang="en-US" b="1" i="1" dirty="0">
+                        <a:latin typeface="Times New Roman" panose="02020603050405020304" pitchFamily="18" charset="0"/>
+                        <a:cs typeface="Times New Roman" panose="02020603050405020304" pitchFamily="18" charset="0"/>
+                      </a:endParaRPr>
+                    </a:p>
+                  </a:txBody>
+                  <a:tcPr/>
+                </a:tc>
+                <a:extLst>
+                  <a:ext uri="{0D108BD9-81ED-4DB2-BD59-A6C34878D82A}">
+                    <a16:rowId xmlns:a16="http://schemas.microsoft.com/office/drawing/2014/main" val="1668803168"/>
+                  </a:ext>
+                </a:extLst>
+              </a:tr>
+              <a:tr h="370840">
+                <a:tc>
+                  <a:txBody>
+                    <a:bodyPr/>
+                    <a:lstStyle/>
+                    <a:p>
+                      <a:pPr algn="ctr" latinLnBrk="1"/>
+                      <a:r>
+                        <a:rPr lang="en-US" altLang="ko-KR" b="1" i="1" dirty="0">
+                          <a:latin typeface="Times New Roman" panose="02020603050405020304" pitchFamily="18" charset="0"/>
+                          <a:cs typeface="Times New Roman" panose="02020603050405020304" pitchFamily="18" charset="0"/>
+                        </a:rPr>
+                        <a:t>None</a:t>
+                      </a:r>
+                      <a:endParaRPr lang="ko-KR" altLang="en-US" b="1" i="1" dirty="0">
+                        <a:latin typeface="Times New Roman" panose="02020603050405020304" pitchFamily="18" charset="0"/>
+                        <a:cs typeface="Times New Roman" panose="02020603050405020304" pitchFamily="18" charset="0"/>
+                      </a:endParaRPr>
+                    </a:p>
+                  </a:txBody>
+                  <a:tcPr/>
+                </a:tc>
+                <a:tc>
+                  <a:txBody>
+                    <a:bodyPr/>
+                    <a:lstStyle/>
+                    <a:p>
+                      <a:pPr algn="ctr" latinLnBrk="1"/>
+                      <a:r>
+                        <a:rPr lang="en-US" altLang="ko-KR" dirty="0">
+                          <a:latin typeface="Times New Roman" panose="02020603050405020304" pitchFamily="18" charset="0"/>
+                          <a:cs typeface="Times New Roman" panose="02020603050405020304" pitchFamily="18" charset="0"/>
+                        </a:rPr>
+                        <a:t>0. /</a:t>
+                      </a:r>
+                    </a:p>
+                    <a:p>
+                      <a:pPr algn="ctr" latinLnBrk="1"/>
+                      <a:r>
+                        <a:rPr lang="en-US" altLang="ko-KR" dirty="0">
+                          <a:latin typeface="Times New Roman" panose="02020603050405020304" pitchFamily="18" charset="0"/>
+                          <a:cs typeface="Times New Roman" panose="02020603050405020304" pitchFamily="18" charset="0"/>
+                        </a:rPr>
+                        <a:t>0.</a:t>
+                      </a:r>
+                      <a:endParaRPr lang="ko-KR" altLang="en-US" dirty="0">
+                        <a:latin typeface="Times New Roman" panose="02020603050405020304" pitchFamily="18" charset="0"/>
+                        <a:cs typeface="Times New Roman" panose="02020603050405020304" pitchFamily="18" charset="0"/>
+                      </a:endParaRPr>
+                    </a:p>
+                  </a:txBody>
+                  <a:tcPr/>
+                </a:tc>
+                <a:tc>
+                  <a:txBody>
+                    <a:bodyPr/>
+                    <a:lstStyle/>
+                    <a:p>
+                      <a:pPr algn="ctr" latinLnBrk="1"/>
+                      <a:r>
+                        <a:rPr lang="en-US" altLang="ko-KR" dirty="0">
+                          <a:latin typeface="Times New Roman" panose="02020603050405020304" pitchFamily="18" charset="0"/>
+                          <a:cs typeface="Times New Roman" panose="02020603050405020304" pitchFamily="18" charset="0"/>
+                        </a:rPr>
+                        <a:t>0. /</a:t>
+                      </a:r>
+                    </a:p>
+                    <a:p>
+                      <a:pPr algn="ctr" latinLnBrk="1"/>
+                      <a:r>
+                        <a:rPr lang="en-US" altLang="ko-KR" dirty="0">
+                          <a:latin typeface="Times New Roman" panose="02020603050405020304" pitchFamily="18" charset="0"/>
+                          <a:cs typeface="Times New Roman" panose="02020603050405020304" pitchFamily="18" charset="0"/>
+                        </a:rPr>
+                        <a:t>0.</a:t>
+                      </a:r>
+                      <a:endParaRPr lang="ko-KR" altLang="en-US" dirty="0">
+                        <a:latin typeface="Times New Roman" panose="02020603050405020304" pitchFamily="18" charset="0"/>
+                        <a:cs typeface="Times New Roman" panose="02020603050405020304" pitchFamily="18" charset="0"/>
+                      </a:endParaRPr>
+                    </a:p>
+                  </a:txBody>
+                  <a:tcPr/>
+                </a:tc>
+                <a:tc>
+                  <a:txBody>
+                    <a:bodyPr/>
+                    <a:lstStyle/>
+                    <a:p>
+                      <a:pPr algn="ctr" latinLnBrk="1"/>
+                      <a:endParaRPr lang="ko-KR" altLang="en-US" dirty="0">
+                        <a:latin typeface="Times New Roman" panose="02020603050405020304" pitchFamily="18" charset="0"/>
+                        <a:cs typeface="Times New Roman" panose="02020603050405020304" pitchFamily="18" charset="0"/>
+                      </a:endParaRPr>
+                    </a:p>
+                  </a:txBody>
+                  <a:tcPr/>
+                </a:tc>
+                <a:tc>
+                  <a:txBody>
+                    <a:bodyPr/>
+                    <a:lstStyle/>
+                    <a:p>
+                      <a:pPr algn="ctr" latinLnBrk="1"/>
+                      <a:endParaRPr lang="ko-KR" altLang="en-US" dirty="0">
+                        <a:latin typeface="Times New Roman" panose="02020603050405020304" pitchFamily="18" charset="0"/>
+                        <a:cs typeface="Times New Roman" panose="02020603050405020304" pitchFamily="18" charset="0"/>
+                      </a:endParaRPr>
+                    </a:p>
+                  </a:txBody>
+                  <a:tcPr/>
+                </a:tc>
+                <a:tc>
+                  <a:txBody>
+                    <a:bodyPr/>
+                    <a:lstStyle/>
+                    <a:p>
+                      <a:pPr algn="ctr" latinLnBrk="1"/>
+                      <a:endParaRPr lang="ko-KR" altLang="en-US" dirty="0">
+                        <a:latin typeface="Times New Roman" panose="02020603050405020304" pitchFamily="18" charset="0"/>
+                        <a:cs typeface="Times New Roman" panose="02020603050405020304" pitchFamily="18" charset="0"/>
+                      </a:endParaRPr>
+                    </a:p>
+                  </a:txBody>
+                  <a:tcPr/>
+                </a:tc>
+                <a:tc>
+                  <a:txBody>
+                    <a:bodyPr/>
+                    <a:lstStyle/>
+                    <a:p>
+                      <a:pPr algn="ctr" latinLnBrk="1"/>
+                      <a:endParaRPr lang="ko-KR" altLang="en-US" dirty="0">
+                        <a:latin typeface="Times New Roman" panose="02020603050405020304" pitchFamily="18" charset="0"/>
+                        <a:cs typeface="Times New Roman" panose="02020603050405020304" pitchFamily="18" charset="0"/>
+                      </a:endParaRPr>
+                    </a:p>
+                  </a:txBody>
+                  <a:tcPr/>
+                </a:tc>
+                <a:extLst>
+                  <a:ext uri="{0D108BD9-81ED-4DB2-BD59-A6C34878D82A}">
+                    <a16:rowId xmlns:a16="http://schemas.microsoft.com/office/drawing/2014/main" val="633390355"/>
+                  </a:ext>
+                </a:extLst>
+              </a:tr>
+              <a:tr h="370840">
+                <a:tc>
+                  <a:txBody>
+                    <a:bodyPr/>
+                    <a:lstStyle/>
+                    <a:p>
+                      <a:pPr algn="ctr" latinLnBrk="1"/>
+                      <a:r>
+                        <a:rPr lang="en-US" altLang="ko-KR" b="1" i="1" dirty="0">
+                          <a:latin typeface="Times New Roman" panose="02020603050405020304" pitchFamily="18" charset="0"/>
+                          <a:cs typeface="Times New Roman" panose="02020603050405020304" pitchFamily="18" charset="0"/>
+                        </a:rPr>
+                        <a:t>BT (</a:t>
+                      </a:r>
+                      <a:r>
+                        <a:rPr lang="en-US" altLang="ko-KR" b="1" i="1" dirty="0" err="1">
+                          <a:latin typeface="Times New Roman" panose="02020603050405020304" pitchFamily="18" charset="0"/>
+                          <a:cs typeface="Times New Roman" panose="02020603050405020304" pitchFamily="18" charset="0"/>
+                        </a:rPr>
+                        <a:t>en</a:t>
+                      </a:r>
+                      <a:r>
+                        <a:rPr lang="en-US" altLang="ko-KR" b="1" i="1" dirty="0">
+                          <a:latin typeface="Times New Roman" panose="02020603050405020304" pitchFamily="18" charset="0"/>
+                          <a:cs typeface="Times New Roman" panose="02020603050405020304" pitchFamily="18" charset="0"/>
+                        </a:rPr>
+                        <a:t>)</a:t>
+                      </a:r>
+                      <a:endParaRPr lang="ko-KR" altLang="en-US" b="1" i="1" dirty="0">
+                        <a:latin typeface="Times New Roman" panose="02020603050405020304" pitchFamily="18" charset="0"/>
+                        <a:cs typeface="Times New Roman" panose="02020603050405020304" pitchFamily="18" charset="0"/>
+                      </a:endParaRPr>
+                    </a:p>
+                  </a:txBody>
+                  <a:tcPr/>
+                </a:tc>
+                <a:tc>
+                  <a:txBody>
+                    <a:bodyPr/>
+                    <a:lstStyle/>
+                    <a:p>
+                      <a:pPr marL="0" marR="0" lvl="0" indent="0" algn="ctr" defTabSz="914400" rtl="0" eaLnBrk="1" fontAlgn="auto" latinLnBrk="1" hangingPunct="1">
+                        <a:lnSpc>
+                          <a:spcPct val="100000"/>
+                        </a:lnSpc>
+                        <a:spcBef>
+                          <a:spcPts val="0"/>
+                        </a:spcBef>
+                        <a:spcAft>
+                          <a:spcPts val="0"/>
+                        </a:spcAft>
+                        <a:buClrTx/>
+                        <a:buSzTx/>
+                        <a:buFontTx/>
+                        <a:buNone/>
+                        <a:tabLst/>
+                        <a:defRPr/>
+                      </a:pPr>
+                      <a:r>
+                        <a:rPr lang="en-US" altLang="ko-KR" dirty="0">
+                          <a:latin typeface="Times New Roman" panose="02020603050405020304" pitchFamily="18" charset="0"/>
+                          <a:cs typeface="Times New Roman" panose="02020603050405020304" pitchFamily="18" charset="0"/>
+                        </a:rPr>
+                        <a:t>0. /</a:t>
+                      </a:r>
+                    </a:p>
+                    <a:p>
+                      <a:pPr marL="0" marR="0" lvl="0" indent="0" algn="ctr" defTabSz="914400" rtl="0" eaLnBrk="1" fontAlgn="auto" latinLnBrk="1" hangingPunct="1">
+                        <a:lnSpc>
+                          <a:spcPct val="100000"/>
+                        </a:lnSpc>
+                        <a:spcBef>
+                          <a:spcPts val="0"/>
+                        </a:spcBef>
+                        <a:spcAft>
+                          <a:spcPts val="0"/>
+                        </a:spcAft>
+                        <a:buClrTx/>
+                        <a:buSzTx/>
+                        <a:buFontTx/>
+                        <a:buNone/>
+                        <a:tabLst/>
+                        <a:defRPr/>
+                      </a:pPr>
+                      <a:r>
+                        <a:rPr lang="en-US" altLang="ko-KR" dirty="0">
+                          <a:latin typeface="Times New Roman" panose="02020603050405020304" pitchFamily="18" charset="0"/>
+                          <a:cs typeface="Times New Roman" panose="02020603050405020304" pitchFamily="18" charset="0"/>
+                        </a:rPr>
+                        <a:t>0.</a:t>
+                      </a:r>
+                      <a:endParaRPr lang="ko-KR" altLang="en-US" dirty="0">
+                        <a:latin typeface="Times New Roman" panose="02020603050405020304" pitchFamily="18" charset="0"/>
+                        <a:cs typeface="Times New Roman" panose="02020603050405020304" pitchFamily="18" charset="0"/>
+                      </a:endParaRPr>
+                    </a:p>
+                  </a:txBody>
+                  <a:tcPr/>
+                </a:tc>
+                <a:tc>
+                  <a:txBody>
+                    <a:bodyPr/>
+                    <a:lstStyle/>
+                    <a:p>
+                      <a:pPr algn="ctr" latinLnBrk="1"/>
+                      <a:r>
+                        <a:rPr lang="en-US" altLang="ko-KR" dirty="0">
+                          <a:latin typeface="Times New Roman" panose="02020603050405020304" pitchFamily="18" charset="0"/>
+                          <a:cs typeface="Times New Roman" panose="02020603050405020304" pitchFamily="18" charset="0"/>
+                        </a:rPr>
+                        <a:t>0. /</a:t>
+                      </a:r>
+                    </a:p>
+                    <a:p>
+                      <a:pPr algn="ctr" latinLnBrk="1"/>
+                      <a:r>
+                        <a:rPr lang="en-US" altLang="ko-KR" dirty="0">
+                          <a:latin typeface="Times New Roman" panose="02020603050405020304" pitchFamily="18" charset="0"/>
+                          <a:cs typeface="Times New Roman" panose="02020603050405020304" pitchFamily="18" charset="0"/>
+                        </a:rPr>
+                        <a:t>0.</a:t>
+                      </a:r>
+                      <a:endParaRPr lang="ko-KR" altLang="en-US" dirty="0">
+                        <a:latin typeface="Times New Roman" panose="02020603050405020304" pitchFamily="18" charset="0"/>
+                        <a:cs typeface="Times New Roman" panose="02020603050405020304" pitchFamily="18" charset="0"/>
+                      </a:endParaRPr>
+                    </a:p>
+                  </a:txBody>
+                  <a:tcPr/>
+                </a:tc>
+                <a:tc>
+                  <a:txBody>
+                    <a:bodyPr/>
+                    <a:lstStyle/>
+                    <a:p>
+                      <a:pPr algn="ctr" latinLnBrk="1"/>
+                      <a:endParaRPr lang="ko-KR" altLang="en-US" dirty="0">
+                        <a:latin typeface="Times New Roman" panose="02020603050405020304" pitchFamily="18" charset="0"/>
+                        <a:cs typeface="Times New Roman" panose="02020603050405020304" pitchFamily="18" charset="0"/>
+                      </a:endParaRPr>
+                    </a:p>
+                  </a:txBody>
+                  <a:tcPr/>
+                </a:tc>
+                <a:tc>
+                  <a:txBody>
+                    <a:bodyPr/>
+                    <a:lstStyle/>
+                    <a:p>
+                      <a:pPr algn="ctr" latinLnBrk="1"/>
+                      <a:endParaRPr lang="ko-KR" altLang="en-US" dirty="0">
+                        <a:latin typeface="Times New Roman" panose="02020603050405020304" pitchFamily="18" charset="0"/>
+                        <a:cs typeface="Times New Roman" panose="02020603050405020304" pitchFamily="18" charset="0"/>
+                      </a:endParaRPr>
+                    </a:p>
+                  </a:txBody>
+                  <a:tcPr/>
+                </a:tc>
+                <a:tc>
+                  <a:txBody>
+                    <a:bodyPr/>
+                    <a:lstStyle/>
+                    <a:p>
+                      <a:pPr algn="ctr" latinLnBrk="1"/>
+                      <a:endParaRPr lang="ko-KR" altLang="en-US" dirty="0">
+                        <a:latin typeface="Times New Roman" panose="02020603050405020304" pitchFamily="18" charset="0"/>
+                        <a:cs typeface="Times New Roman" panose="02020603050405020304" pitchFamily="18" charset="0"/>
+                      </a:endParaRPr>
+                    </a:p>
+                  </a:txBody>
+                  <a:tcPr/>
+                </a:tc>
+                <a:tc>
+                  <a:txBody>
+                    <a:bodyPr/>
+                    <a:lstStyle/>
+                    <a:p>
+                      <a:pPr algn="ctr" latinLnBrk="1"/>
+                      <a:endParaRPr lang="ko-KR" altLang="en-US" dirty="0">
+                        <a:latin typeface="Times New Roman" panose="02020603050405020304" pitchFamily="18" charset="0"/>
+                        <a:cs typeface="Times New Roman" panose="02020603050405020304" pitchFamily="18" charset="0"/>
+                      </a:endParaRPr>
+                    </a:p>
+                  </a:txBody>
+                  <a:tcPr/>
+                </a:tc>
+                <a:extLst>
+                  <a:ext uri="{0D108BD9-81ED-4DB2-BD59-A6C34878D82A}">
+                    <a16:rowId xmlns:a16="http://schemas.microsoft.com/office/drawing/2014/main" val="419997669"/>
+                  </a:ext>
+                </a:extLst>
+              </a:tr>
+              <a:tr h="370840">
+                <a:tc>
+                  <a:txBody>
+                    <a:bodyPr/>
+                    <a:lstStyle/>
+                    <a:p>
+                      <a:pPr algn="ctr" latinLnBrk="1"/>
+                      <a:r>
+                        <a:rPr lang="en-US" altLang="ko-KR" b="1" i="1" dirty="0">
+                          <a:latin typeface="Times New Roman" panose="02020603050405020304" pitchFamily="18" charset="0"/>
+                          <a:cs typeface="Times New Roman" panose="02020603050405020304" pitchFamily="18" charset="0"/>
+                        </a:rPr>
+                        <a:t>BT (</a:t>
+                      </a:r>
+                      <a:r>
+                        <a:rPr lang="en-US" altLang="ko-KR" b="1" i="1" dirty="0" err="1">
+                          <a:latin typeface="Times New Roman" panose="02020603050405020304" pitchFamily="18" charset="0"/>
+                          <a:cs typeface="Times New Roman" panose="02020603050405020304" pitchFamily="18" charset="0"/>
+                        </a:rPr>
+                        <a:t>jp</a:t>
+                      </a:r>
+                      <a:r>
+                        <a:rPr lang="en-US" altLang="ko-KR" b="1" i="1" dirty="0">
+                          <a:latin typeface="Times New Roman" panose="02020603050405020304" pitchFamily="18" charset="0"/>
+                          <a:cs typeface="Times New Roman" panose="02020603050405020304" pitchFamily="18" charset="0"/>
+                        </a:rPr>
+                        <a:t>)</a:t>
+                      </a:r>
+                      <a:endParaRPr lang="ko-KR" altLang="en-US" b="1" i="1" dirty="0">
+                        <a:latin typeface="Times New Roman" panose="02020603050405020304" pitchFamily="18" charset="0"/>
+                        <a:cs typeface="Times New Roman" panose="02020603050405020304" pitchFamily="18" charset="0"/>
+                      </a:endParaRPr>
+                    </a:p>
+                  </a:txBody>
+                  <a:tcPr/>
+                </a:tc>
+                <a:tc>
+                  <a:txBody>
+                    <a:bodyPr/>
+                    <a:lstStyle/>
+                    <a:p>
+                      <a:pPr algn="ctr" latinLnBrk="1"/>
+                      <a:endParaRPr lang="ko-KR" altLang="en-US" dirty="0">
+                        <a:latin typeface="Times New Roman" panose="02020603050405020304" pitchFamily="18" charset="0"/>
+                        <a:cs typeface="Times New Roman" panose="02020603050405020304" pitchFamily="18" charset="0"/>
+                      </a:endParaRPr>
+                    </a:p>
+                  </a:txBody>
+                  <a:tcPr/>
+                </a:tc>
+                <a:tc>
+                  <a:txBody>
+                    <a:bodyPr/>
+                    <a:lstStyle/>
+                    <a:p>
+                      <a:pPr algn="ctr" latinLnBrk="1"/>
+                      <a:endParaRPr lang="ko-KR" altLang="en-US" dirty="0">
+                        <a:latin typeface="Times New Roman" panose="02020603050405020304" pitchFamily="18" charset="0"/>
+                        <a:cs typeface="Times New Roman" panose="02020603050405020304" pitchFamily="18" charset="0"/>
+                      </a:endParaRPr>
+                    </a:p>
+                  </a:txBody>
+                  <a:tcPr/>
+                </a:tc>
+                <a:tc>
+                  <a:txBody>
+                    <a:bodyPr/>
+                    <a:lstStyle/>
+                    <a:p>
+                      <a:pPr algn="ctr" latinLnBrk="1"/>
+                      <a:endParaRPr lang="ko-KR" altLang="en-US" dirty="0">
+                        <a:latin typeface="Times New Roman" panose="02020603050405020304" pitchFamily="18" charset="0"/>
+                        <a:cs typeface="Times New Roman" panose="02020603050405020304" pitchFamily="18" charset="0"/>
+                      </a:endParaRPr>
+                    </a:p>
+                  </a:txBody>
+                  <a:tcPr/>
+                </a:tc>
+                <a:tc>
+                  <a:txBody>
+                    <a:bodyPr/>
+                    <a:lstStyle/>
+                    <a:p>
+                      <a:pPr algn="ctr" latinLnBrk="1"/>
+                      <a:endParaRPr lang="ko-KR" altLang="en-US">
+                        <a:latin typeface="Times New Roman" panose="02020603050405020304" pitchFamily="18" charset="0"/>
+                        <a:cs typeface="Times New Roman" panose="02020603050405020304" pitchFamily="18" charset="0"/>
+                      </a:endParaRPr>
+                    </a:p>
+                  </a:txBody>
+                  <a:tcPr/>
+                </a:tc>
+                <a:tc>
+                  <a:txBody>
+                    <a:bodyPr/>
+                    <a:lstStyle/>
+                    <a:p>
+                      <a:pPr algn="ctr" latinLnBrk="1"/>
+                      <a:endParaRPr lang="ko-KR" altLang="en-US">
+                        <a:latin typeface="Times New Roman" panose="02020603050405020304" pitchFamily="18" charset="0"/>
+                        <a:cs typeface="Times New Roman" panose="02020603050405020304" pitchFamily="18" charset="0"/>
+                      </a:endParaRPr>
+                    </a:p>
+                  </a:txBody>
+                  <a:tcPr/>
+                </a:tc>
+                <a:tc>
+                  <a:txBody>
+                    <a:bodyPr/>
+                    <a:lstStyle/>
+                    <a:p>
+                      <a:pPr algn="ctr" latinLnBrk="1"/>
+                      <a:endParaRPr lang="ko-KR" altLang="en-US">
+                        <a:latin typeface="Times New Roman" panose="02020603050405020304" pitchFamily="18" charset="0"/>
+                        <a:cs typeface="Times New Roman" panose="02020603050405020304" pitchFamily="18" charset="0"/>
+                      </a:endParaRPr>
+                    </a:p>
+                  </a:txBody>
+                  <a:tcPr/>
+                </a:tc>
+                <a:extLst>
+                  <a:ext uri="{0D108BD9-81ED-4DB2-BD59-A6C34878D82A}">
+                    <a16:rowId xmlns:a16="http://schemas.microsoft.com/office/drawing/2014/main" val="3574362841"/>
+                  </a:ext>
+                </a:extLst>
+              </a:tr>
+              <a:tr h="370840">
+                <a:tc>
+                  <a:txBody>
+                    <a:bodyPr/>
+                    <a:lstStyle/>
+                    <a:p>
+                      <a:pPr algn="ctr" latinLnBrk="1"/>
+                      <a:r>
+                        <a:rPr lang="en-US" altLang="ko-KR" b="1" i="1" dirty="0">
+                          <a:latin typeface="Times New Roman" panose="02020603050405020304" pitchFamily="18" charset="0"/>
+                          <a:cs typeface="Times New Roman" panose="02020603050405020304" pitchFamily="18" charset="0"/>
+                        </a:rPr>
+                        <a:t>BT (</a:t>
+                      </a:r>
+                      <a:r>
+                        <a:rPr lang="en-US" altLang="ko-KR" b="1" i="1" dirty="0" err="1">
+                          <a:latin typeface="Times New Roman" panose="02020603050405020304" pitchFamily="18" charset="0"/>
+                          <a:cs typeface="Times New Roman" panose="02020603050405020304" pitchFamily="18" charset="0"/>
+                        </a:rPr>
+                        <a:t>en</a:t>
+                      </a:r>
+                      <a:r>
+                        <a:rPr lang="en-US" altLang="ko-KR" b="1" i="1" dirty="0">
+                          <a:latin typeface="Times New Roman" panose="02020603050405020304" pitchFamily="18" charset="0"/>
+                          <a:cs typeface="Times New Roman" panose="02020603050405020304" pitchFamily="18" charset="0"/>
+                        </a:rPr>
+                        <a:t>, </a:t>
+                      </a:r>
+                      <a:r>
+                        <a:rPr lang="en-US" altLang="ko-KR" b="1" i="1" dirty="0" err="1">
+                          <a:latin typeface="Times New Roman" panose="02020603050405020304" pitchFamily="18" charset="0"/>
+                          <a:cs typeface="Times New Roman" panose="02020603050405020304" pitchFamily="18" charset="0"/>
+                        </a:rPr>
+                        <a:t>jp</a:t>
+                      </a:r>
+                      <a:r>
+                        <a:rPr lang="en-US" altLang="ko-KR" b="1" i="1" dirty="0">
+                          <a:latin typeface="Times New Roman" panose="02020603050405020304" pitchFamily="18" charset="0"/>
+                          <a:cs typeface="Times New Roman" panose="02020603050405020304" pitchFamily="18" charset="0"/>
+                        </a:rPr>
+                        <a:t>)</a:t>
+                      </a:r>
+                      <a:endParaRPr lang="ko-KR" altLang="en-US" b="1" i="1" dirty="0">
+                        <a:latin typeface="Times New Roman" panose="02020603050405020304" pitchFamily="18" charset="0"/>
+                        <a:cs typeface="Times New Roman" panose="02020603050405020304" pitchFamily="18" charset="0"/>
+                      </a:endParaRPr>
+                    </a:p>
+                  </a:txBody>
+                  <a:tcPr/>
+                </a:tc>
+                <a:tc>
+                  <a:txBody>
+                    <a:bodyPr/>
+                    <a:lstStyle/>
+                    <a:p>
+                      <a:pPr algn="ctr" latinLnBrk="1"/>
+                      <a:endParaRPr lang="ko-KR" altLang="en-US" dirty="0">
+                        <a:latin typeface="Times New Roman" panose="02020603050405020304" pitchFamily="18" charset="0"/>
+                        <a:cs typeface="Times New Roman" panose="02020603050405020304" pitchFamily="18" charset="0"/>
+                      </a:endParaRPr>
+                    </a:p>
+                  </a:txBody>
+                  <a:tcPr/>
+                </a:tc>
+                <a:tc>
+                  <a:txBody>
+                    <a:bodyPr/>
+                    <a:lstStyle/>
+                    <a:p>
+                      <a:pPr algn="ctr" latinLnBrk="1"/>
+                      <a:endParaRPr lang="ko-KR" altLang="en-US" dirty="0">
+                        <a:latin typeface="Times New Roman" panose="02020603050405020304" pitchFamily="18" charset="0"/>
+                        <a:cs typeface="Times New Roman" panose="02020603050405020304" pitchFamily="18" charset="0"/>
+                      </a:endParaRPr>
+                    </a:p>
+                  </a:txBody>
+                  <a:tcPr/>
+                </a:tc>
+                <a:tc>
+                  <a:txBody>
+                    <a:bodyPr/>
+                    <a:lstStyle/>
+                    <a:p>
+                      <a:pPr algn="ctr" latinLnBrk="1"/>
+                      <a:endParaRPr lang="ko-KR" altLang="en-US" dirty="0">
+                        <a:latin typeface="Times New Roman" panose="02020603050405020304" pitchFamily="18" charset="0"/>
+                        <a:cs typeface="Times New Roman" panose="02020603050405020304" pitchFamily="18" charset="0"/>
+                      </a:endParaRPr>
+                    </a:p>
+                  </a:txBody>
+                  <a:tcPr/>
+                </a:tc>
+                <a:tc>
+                  <a:txBody>
+                    <a:bodyPr/>
+                    <a:lstStyle/>
+                    <a:p>
+                      <a:pPr algn="ctr" latinLnBrk="1"/>
+                      <a:endParaRPr lang="ko-KR" altLang="en-US">
+                        <a:latin typeface="Times New Roman" panose="02020603050405020304" pitchFamily="18" charset="0"/>
+                        <a:cs typeface="Times New Roman" panose="02020603050405020304" pitchFamily="18" charset="0"/>
+                      </a:endParaRPr>
+                    </a:p>
+                  </a:txBody>
+                  <a:tcPr/>
+                </a:tc>
+                <a:tc>
+                  <a:txBody>
+                    <a:bodyPr/>
+                    <a:lstStyle/>
+                    <a:p>
+                      <a:pPr algn="ctr" latinLnBrk="1"/>
+                      <a:endParaRPr lang="ko-KR" altLang="en-US" dirty="0">
+                        <a:latin typeface="Times New Roman" panose="02020603050405020304" pitchFamily="18" charset="0"/>
+                        <a:cs typeface="Times New Roman" panose="02020603050405020304" pitchFamily="18" charset="0"/>
+                      </a:endParaRPr>
+                    </a:p>
+                  </a:txBody>
+                  <a:tcPr/>
+                </a:tc>
+                <a:tc>
+                  <a:txBody>
+                    <a:bodyPr/>
+                    <a:lstStyle/>
+                    <a:p>
+                      <a:pPr algn="ctr" latinLnBrk="1"/>
+                      <a:endParaRPr lang="ko-KR" altLang="en-US" dirty="0">
+                        <a:latin typeface="Times New Roman" panose="02020603050405020304" pitchFamily="18" charset="0"/>
+                        <a:cs typeface="Times New Roman" panose="02020603050405020304" pitchFamily="18" charset="0"/>
+                      </a:endParaRPr>
+                    </a:p>
+                  </a:txBody>
+                  <a:tcPr/>
+                </a:tc>
+                <a:extLst>
+                  <a:ext uri="{0D108BD9-81ED-4DB2-BD59-A6C34878D82A}">
+                    <a16:rowId xmlns:a16="http://schemas.microsoft.com/office/drawing/2014/main" val="915100308"/>
+                  </a:ext>
+                </a:extLst>
+              </a:tr>
+              <a:tr h="370840">
+                <a:tc>
+                  <a:txBody>
+                    <a:bodyPr/>
+                    <a:lstStyle/>
+                    <a:p>
+                      <a:pPr algn="ctr" latinLnBrk="1"/>
+                      <a:r>
+                        <a:rPr lang="en-US" altLang="ko-KR" b="1" i="1" dirty="0">
+                          <a:latin typeface="Times New Roman" panose="02020603050405020304" pitchFamily="18" charset="0"/>
+                          <a:cs typeface="Times New Roman" panose="02020603050405020304" pitchFamily="18" charset="0"/>
+                        </a:rPr>
+                        <a:t>SR</a:t>
+                      </a:r>
+                      <a:endParaRPr lang="ko-KR" altLang="en-US" b="1" i="1" dirty="0">
+                        <a:latin typeface="Times New Roman" panose="02020603050405020304" pitchFamily="18" charset="0"/>
+                        <a:cs typeface="Times New Roman" panose="02020603050405020304" pitchFamily="18" charset="0"/>
+                      </a:endParaRPr>
+                    </a:p>
+                  </a:txBody>
+                  <a:tcPr/>
+                </a:tc>
+                <a:tc>
+                  <a:txBody>
+                    <a:bodyPr/>
+                    <a:lstStyle/>
+                    <a:p>
+                      <a:pPr algn="ctr" latinLnBrk="1"/>
+                      <a:endParaRPr lang="ko-KR" altLang="en-US" dirty="0">
+                        <a:latin typeface="Times New Roman" panose="02020603050405020304" pitchFamily="18" charset="0"/>
+                        <a:cs typeface="Times New Roman" panose="02020603050405020304" pitchFamily="18" charset="0"/>
+                      </a:endParaRPr>
+                    </a:p>
+                  </a:txBody>
+                  <a:tcPr/>
+                </a:tc>
+                <a:tc>
+                  <a:txBody>
+                    <a:bodyPr/>
+                    <a:lstStyle/>
+                    <a:p>
+                      <a:pPr algn="ctr" latinLnBrk="1"/>
+                      <a:endParaRPr lang="ko-KR" altLang="en-US" dirty="0">
+                        <a:latin typeface="Times New Roman" panose="02020603050405020304" pitchFamily="18" charset="0"/>
+                        <a:cs typeface="Times New Roman" panose="02020603050405020304" pitchFamily="18" charset="0"/>
+                      </a:endParaRPr>
+                    </a:p>
+                  </a:txBody>
+                  <a:tcPr/>
+                </a:tc>
+                <a:tc>
+                  <a:txBody>
+                    <a:bodyPr/>
+                    <a:lstStyle/>
+                    <a:p>
+                      <a:pPr algn="ctr" latinLnBrk="1"/>
+                      <a:endParaRPr lang="ko-KR" altLang="en-US" dirty="0">
+                        <a:latin typeface="Times New Roman" panose="02020603050405020304" pitchFamily="18" charset="0"/>
+                        <a:cs typeface="Times New Roman" panose="02020603050405020304" pitchFamily="18" charset="0"/>
+                      </a:endParaRPr>
+                    </a:p>
+                  </a:txBody>
+                  <a:tcPr/>
+                </a:tc>
+                <a:tc>
+                  <a:txBody>
+                    <a:bodyPr/>
+                    <a:lstStyle/>
+                    <a:p>
+                      <a:pPr algn="ctr" latinLnBrk="1"/>
+                      <a:endParaRPr lang="ko-KR" altLang="en-US" dirty="0">
+                        <a:latin typeface="Times New Roman" panose="02020603050405020304" pitchFamily="18" charset="0"/>
+                        <a:cs typeface="Times New Roman" panose="02020603050405020304" pitchFamily="18" charset="0"/>
+                      </a:endParaRPr>
+                    </a:p>
+                  </a:txBody>
+                  <a:tcPr/>
+                </a:tc>
+                <a:tc>
+                  <a:txBody>
+                    <a:bodyPr/>
+                    <a:lstStyle/>
+                    <a:p>
+                      <a:pPr algn="ctr" latinLnBrk="1"/>
+                      <a:endParaRPr lang="ko-KR" altLang="en-US" dirty="0">
+                        <a:latin typeface="Times New Roman" panose="02020603050405020304" pitchFamily="18" charset="0"/>
+                        <a:cs typeface="Times New Roman" panose="02020603050405020304" pitchFamily="18" charset="0"/>
+                      </a:endParaRPr>
+                    </a:p>
+                  </a:txBody>
+                  <a:tcPr/>
+                </a:tc>
+                <a:tc>
+                  <a:txBody>
+                    <a:bodyPr/>
+                    <a:lstStyle/>
+                    <a:p>
+                      <a:pPr algn="ctr" latinLnBrk="1"/>
+                      <a:endParaRPr lang="ko-KR" altLang="en-US" dirty="0">
+                        <a:latin typeface="Times New Roman" panose="02020603050405020304" pitchFamily="18" charset="0"/>
+                        <a:cs typeface="Times New Roman" panose="02020603050405020304" pitchFamily="18" charset="0"/>
+                      </a:endParaRPr>
+                    </a:p>
+                  </a:txBody>
+                  <a:tcPr/>
+                </a:tc>
+                <a:extLst>
+                  <a:ext uri="{0D108BD9-81ED-4DB2-BD59-A6C34878D82A}">
+                    <a16:rowId xmlns:a16="http://schemas.microsoft.com/office/drawing/2014/main" val="3338720211"/>
+                  </a:ext>
+                </a:extLst>
+              </a:tr>
+              <a:tr h="370840">
+                <a:tc>
+                  <a:txBody>
+                    <a:bodyPr/>
+                    <a:lstStyle/>
+                    <a:p>
+                      <a:pPr algn="ctr" latinLnBrk="1"/>
+                      <a:r>
+                        <a:rPr lang="en-US" altLang="ko-KR" b="1" i="1" dirty="0">
+                          <a:latin typeface="Times New Roman" panose="02020603050405020304" pitchFamily="18" charset="0"/>
+                          <a:cs typeface="Times New Roman" panose="02020603050405020304" pitchFamily="18" charset="0"/>
+                        </a:rPr>
+                        <a:t>RI</a:t>
+                      </a:r>
+                      <a:endParaRPr lang="ko-KR" altLang="en-US" b="1" i="1" dirty="0">
+                        <a:latin typeface="Times New Roman" panose="02020603050405020304" pitchFamily="18" charset="0"/>
+                        <a:cs typeface="Times New Roman" panose="02020603050405020304" pitchFamily="18" charset="0"/>
+                      </a:endParaRPr>
+                    </a:p>
+                  </a:txBody>
+                  <a:tcPr/>
+                </a:tc>
+                <a:tc>
+                  <a:txBody>
+                    <a:bodyPr/>
+                    <a:lstStyle/>
+                    <a:p>
+                      <a:pPr algn="ctr" latinLnBrk="1"/>
+                      <a:endParaRPr lang="ko-KR" altLang="en-US">
+                        <a:latin typeface="Times New Roman" panose="02020603050405020304" pitchFamily="18" charset="0"/>
+                        <a:cs typeface="Times New Roman" panose="02020603050405020304" pitchFamily="18" charset="0"/>
+                      </a:endParaRPr>
+                    </a:p>
+                  </a:txBody>
+                  <a:tcPr/>
+                </a:tc>
+                <a:tc>
+                  <a:txBody>
+                    <a:bodyPr/>
+                    <a:lstStyle/>
+                    <a:p>
+                      <a:pPr algn="ctr" latinLnBrk="1"/>
+                      <a:endParaRPr lang="ko-KR" altLang="en-US" dirty="0">
+                        <a:latin typeface="Times New Roman" panose="02020603050405020304" pitchFamily="18" charset="0"/>
+                        <a:cs typeface="Times New Roman" panose="02020603050405020304" pitchFamily="18" charset="0"/>
+                      </a:endParaRPr>
+                    </a:p>
+                  </a:txBody>
+                  <a:tcPr/>
+                </a:tc>
+                <a:tc>
+                  <a:txBody>
+                    <a:bodyPr/>
+                    <a:lstStyle/>
+                    <a:p>
+                      <a:pPr algn="ctr" latinLnBrk="1"/>
+                      <a:endParaRPr lang="ko-KR" altLang="en-US">
+                        <a:latin typeface="Times New Roman" panose="02020603050405020304" pitchFamily="18" charset="0"/>
+                        <a:cs typeface="Times New Roman" panose="02020603050405020304" pitchFamily="18" charset="0"/>
+                      </a:endParaRPr>
+                    </a:p>
+                  </a:txBody>
+                  <a:tcPr/>
+                </a:tc>
+                <a:tc>
+                  <a:txBody>
+                    <a:bodyPr/>
+                    <a:lstStyle/>
+                    <a:p>
+                      <a:pPr algn="ctr" latinLnBrk="1"/>
+                      <a:endParaRPr lang="ko-KR" altLang="en-US">
+                        <a:latin typeface="Times New Roman" panose="02020603050405020304" pitchFamily="18" charset="0"/>
+                        <a:cs typeface="Times New Roman" panose="02020603050405020304" pitchFamily="18" charset="0"/>
+                      </a:endParaRPr>
+                    </a:p>
+                  </a:txBody>
+                  <a:tcPr/>
+                </a:tc>
+                <a:tc>
+                  <a:txBody>
+                    <a:bodyPr/>
+                    <a:lstStyle/>
+                    <a:p>
+                      <a:pPr algn="ctr" latinLnBrk="1"/>
+                      <a:endParaRPr lang="ko-KR" altLang="en-US" dirty="0">
+                        <a:latin typeface="Times New Roman" panose="02020603050405020304" pitchFamily="18" charset="0"/>
+                        <a:cs typeface="Times New Roman" panose="02020603050405020304" pitchFamily="18" charset="0"/>
+                      </a:endParaRPr>
+                    </a:p>
+                  </a:txBody>
+                  <a:tcPr/>
+                </a:tc>
+                <a:tc>
+                  <a:txBody>
+                    <a:bodyPr/>
+                    <a:lstStyle/>
+                    <a:p>
+                      <a:pPr algn="ctr" latinLnBrk="1"/>
+                      <a:endParaRPr lang="ko-KR" altLang="en-US" dirty="0">
+                        <a:latin typeface="Times New Roman" panose="02020603050405020304" pitchFamily="18" charset="0"/>
+                        <a:cs typeface="Times New Roman" panose="02020603050405020304" pitchFamily="18" charset="0"/>
+                      </a:endParaRPr>
+                    </a:p>
+                  </a:txBody>
+                  <a:tcPr/>
+                </a:tc>
+                <a:extLst>
+                  <a:ext uri="{0D108BD9-81ED-4DB2-BD59-A6C34878D82A}">
+                    <a16:rowId xmlns:a16="http://schemas.microsoft.com/office/drawing/2014/main" val="2301365062"/>
+                  </a:ext>
+                </a:extLst>
+              </a:tr>
+              <a:tr h="370840">
+                <a:tc>
+                  <a:txBody>
+                    <a:bodyPr/>
+                    <a:lstStyle/>
+                    <a:p>
+                      <a:pPr algn="ctr" latinLnBrk="1"/>
+                      <a:r>
+                        <a:rPr lang="en-US" altLang="ko-KR" b="1" i="1" dirty="0">
+                          <a:latin typeface="Times New Roman" panose="02020603050405020304" pitchFamily="18" charset="0"/>
+                          <a:cs typeface="Times New Roman" panose="02020603050405020304" pitchFamily="18" charset="0"/>
+                        </a:rPr>
+                        <a:t>RS</a:t>
+                      </a:r>
+                      <a:endParaRPr lang="ko-KR" altLang="en-US" b="1" i="1" dirty="0">
+                        <a:latin typeface="Times New Roman" panose="02020603050405020304" pitchFamily="18" charset="0"/>
+                        <a:cs typeface="Times New Roman" panose="02020603050405020304" pitchFamily="18" charset="0"/>
+                      </a:endParaRPr>
+                    </a:p>
+                  </a:txBody>
+                  <a:tcPr/>
+                </a:tc>
+                <a:tc>
+                  <a:txBody>
+                    <a:bodyPr/>
+                    <a:lstStyle/>
+                    <a:p>
+                      <a:pPr algn="ctr" latinLnBrk="1"/>
+                      <a:endParaRPr lang="ko-KR" altLang="en-US">
+                        <a:latin typeface="Times New Roman" panose="02020603050405020304" pitchFamily="18" charset="0"/>
+                        <a:cs typeface="Times New Roman" panose="02020603050405020304" pitchFamily="18" charset="0"/>
+                      </a:endParaRPr>
+                    </a:p>
+                  </a:txBody>
+                  <a:tcPr/>
+                </a:tc>
+                <a:tc>
+                  <a:txBody>
+                    <a:bodyPr/>
+                    <a:lstStyle/>
+                    <a:p>
+                      <a:pPr algn="ctr" latinLnBrk="1"/>
+                      <a:endParaRPr lang="ko-KR" altLang="en-US" dirty="0">
+                        <a:latin typeface="Times New Roman" panose="02020603050405020304" pitchFamily="18" charset="0"/>
+                        <a:cs typeface="Times New Roman" panose="02020603050405020304" pitchFamily="18" charset="0"/>
+                      </a:endParaRPr>
+                    </a:p>
+                  </a:txBody>
+                  <a:tcPr/>
+                </a:tc>
+                <a:tc>
+                  <a:txBody>
+                    <a:bodyPr/>
+                    <a:lstStyle/>
+                    <a:p>
+                      <a:pPr algn="ctr" latinLnBrk="1"/>
+                      <a:endParaRPr lang="ko-KR" altLang="en-US" dirty="0">
+                        <a:latin typeface="Times New Roman" panose="02020603050405020304" pitchFamily="18" charset="0"/>
+                        <a:cs typeface="Times New Roman" panose="02020603050405020304" pitchFamily="18" charset="0"/>
+                      </a:endParaRPr>
+                    </a:p>
+                  </a:txBody>
+                  <a:tcPr/>
+                </a:tc>
+                <a:tc>
+                  <a:txBody>
+                    <a:bodyPr/>
+                    <a:lstStyle/>
+                    <a:p>
+                      <a:pPr algn="ctr" latinLnBrk="1"/>
+                      <a:endParaRPr lang="ko-KR" altLang="en-US" dirty="0">
+                        <a:latin typeface="Times New Roman" panose="02020603050405020304" pitchFamily="18" charset="0"/>
+                        <a:cs typeface="Times New Roman" panose="02020603050405020304" pitchFamily="18" charset="0"/>
+                      </a:endParaRPr>
+                    </a:p>
+                  </a:txBody>
+                  <a:tcPr/>
+                </a:tc>
+                <a:tc>
+                  <a:txBody>
+                    <a:bodyPr/>
+                    <a:lstStyle/>
+                    <a:p>
+                      <a:pPr algn="ctr" latinLnBrk="1"/>
+                      <a:endParaRPr lang="ko-KR" altLang="en-US" dirty="0">
+                        <a:latin typeface="Times New Roman" panose="02020603050405020304" pitchFamily="18" charset="0"/>
+                        <a:cs typeface="Times New Roman" panose="02020603050405020304" pitchFamily="18" charset="0"/>
+                      </a:endParaRPr>
+                    </a:p>
+                  </a:txBody>
+                  <a:tcPr/>
+                </a:tc>
+                <a:tc>
+                  <a:txBody>
+                    <a:bodyPr/>
+                    <a:lstStyle/>
+                    <a:p>
+                      <a:pPr algn="ctr" latinLnBrk="1"/>
+                      <a:endParaRPr lang="ko-KR" altLang="en-US" dirty="0">
+                        <a:latin typeface="Times New Roman" panose="02020603050405020304" pitchFamily="18" charset="0"/>
+                        <a:cs typeface="Times New Roman" panose="02020603050405020304" pitchFamily="18" charset="0"/>
+                      </a:endParaRPr>
+                    </a:p>
+                  </a:txBody>
+                  <a:tcPr/>
+                </a:tc>
+                <a:extLst>
+                  <a:ext uri="{0D108BD9-81ED-4DB2-BD59-A6C34878D82A}">
+                    <a16:rowId xmlns:a16="http://schemas.microsoft.com/office/drawing/2014/main" val="124352940"/>
+                  </a:ext>
+                </a:extLst>
+              </a:tr>
+              <a:tr h="370840">
+                <a:tc>
+                  <a:txBody>
+                    <a:bodyPr/>
+                    <a:lstStyle/>
+                    <a:p>
+                      <a:pPr algn="ctr" latinLnBrk="1"/>
+                      <a:r>
+                        <a:rPr lang="en-US" altLang="ko-KR" b="1" i="1" dirty="0">
+                          <a:latin typeface="Times New Roman" panose="02020603050405020304" pitchFamily="18" charset="0"/>
+                          <a:cs typeface="Times New Roman" panose="02020603050405020304" pitchFamily="18" charset="0"/>
+                        </a:rPr>
+                        <a:t>RD</a:t>
+                      </a:r>
+                      <a:endParaRPr lang="ko-KR" altLang="en-US" b="1" i="1" dirty="0">
+                        <a:latin typeface="Times New Roman" panose="02020603050405020304" pitchFamily="18" charset="0"/>
+                        <a:cs typeface="Times New Roman" panose="02020603050405020304" pitchFamily="18" charset="0"/>
+                      </a:endParaRPr>
+                    </a:p>
+                  </a:txBody>
+                  <a:tcPr/>
+                </a:tc>
+                <a:tc>
+                  <a:txBody>
+                    <a:bodyPr/>
+                    <a:lstStyle/>
+                    <a:p>
+                      <a:pPr algn="ctr" latinLnBrk="1"/>
+                      <a:endParaRPr lang="ko-KR" altLang="en-US">
+                        <a:latin typeface="Times New Roman" panose="02020603050405020304" pitchFamily="18" charset="0"/>
+                        <a:cs typeface="Times New Roman" panose="02020603050405020304" pitchFamily="18" charset="0"/>
+                      </a:endParaRPr>
+                    </a:p>
+                  </a:txBody>
+                  <a:tcPr/>
+                </a:tc>
+                <a:tc>
+                  <a:txBody>
+                    <a:bodyPr/>
+                    <a:lstStyle/>
+                    <a:p>
+                      <a:pPr algn="ctr" latinLnBrk="1"/>
+                      <a:endParaRPr lang="ko-KR" altLang="en-US">
+                        <a:latin typeface="Times New Roman" panose="02020603050405020304" pitchFamily="18" charset="0"/>
+                        <a:cs typeface="Times New Roman" panose="02020603050405020304" pitchFamily="18" charset="0"/>
+                      </a:endParaRPr>
+                    </a:p>
+                  </a:txBody>
+                  <a:tcPr/>
+                </a:tc>
+                <a:tc>
+                  <a:txBody>
+                    <a:bodyPr/>
+                    <a:lstStyle/>
+                    <a:p>
+                      <a:pPr algn="ctr" latinLnBrk="1"/>
+                      <a:endParaRPr lang="ko-KR" altLang="en-US" dirty="0">
+                        <a:latin typeface="Times New Roman" panose="02020603050405020304" pitchFamily="18" charset="0"/>
+                        <a:cs typeface="Times New Roman" panose="02020603050405020304" pitchFamily="18" charset="0"/>
+                      </a:endParaRPr>
+                    </a:p>
+                  </a:txBody>
+                  <a:tcPr/>
+                </a:tc>
+                <a:tc>
+                  <a:txBody>
+                    <a:bodyPr/>
+                    <a:lstStyle/>
+                    <a:p>
+                      <a:pPr algn="ctr" latinLnBrk="1"/>
+                      <a:endParaRPr lang="ko-KR" altLang="en-US" dirty="0">
+                        <a:latin typeface="Times New Roman" panose="02020603050405020304" pitchFamily="18" charset="0"/>
+                        <a:cs typeface="Times New Roman" panose="02020603050405020304" pitchFamily="18" charset="0"/>
+                      </a:endParaRPr>
+                    </a:p>
+                  </a:txBody>
+                  <a:tcPr/>
+                </a:tc>
+                <a:tc>
+                  <a:txBody>
+                    <a:bodyPr/>
+                    <a:lstStyle/>
+                    <a:p>
+                      <a:pPr algn="ctr" latinLnBrk="1"/>
+                      <a:endParaRPr lang="ko-KR" altLang="en-US" dirty="0">
+                        <a:latin typeface="Times New Roman" panose="02020603050405020304" pitchFamily="18" charset="0"/>
+                        <a:cs typeface="Times New Roman" panose="02020603050405020304" pitchFamily="18" charset="0"/>
+                      </a:endParaRPr>
+                    </a:p>
+                  </a:txBody>
+                  <a:tcPr/>
+                </a:tc>
+                <a:tc>
+                  <a:txBody>
+                    <a:bodyPr/>
+                    <a:lstStyle/>
+                    <a:p>
+                      <a:pPr algn="ctr" latinLnBrk="1"/>
+                      <a:endParaRPr lang="ko-KR" altLang="en-US" dirty="0">
+                        <a:latin typeface="Times New Roman" panose="02020603050405020304" pitchFamily="18" charset="0"/>
+                        <a:cs typeface="Times New Roman" panose="02020603050405020304" pitchFamily="18" charset="0"/>
+                      </a:endParaRPr>
+                    </a:p>
+                  </a:txBody>
+                  <a:tcPr/>
+                </a:tc>
+                <a:extLst>
+                  <a:ext uri="{0D108BD9-81ED-4DB2-BD59-A6C34878D82A}">
+                    <a16:rowId xmlns:a16="http://schemas.microsoft.com/office/drawing/2014/main" val="1621145085"/>
+                  </a:ext>
+                </a:extLst>
+              </a:tr>
+            </a:tbl>
+          </a:graphicData>
+        </a:graphic>
+      </p:graphicFrame>
+    </p:spTree>
+    <p:extLst>
+      <p:ext uri="{BB962C8B-B14F-4D97-AF65-F5344CB8AC3E}">
+        <p14:creationId xmlns:p14="http://schemas.microsoft.com/office/powerpoint/2010/main" val="4279980843"/>
       </p:ext>
     </p:extLst>
   </p:cSld>

</xml_diff>

<commit_message>
add lgbm kfold results
</commit_message>
<xml_diff>
--- a/result/diagram.pptx
+++ b/result/diagram.pptx
@@ -3344,7 +3344,7 @@
           <p:nvPr>
             <p:extLst>
               <p:ext uri="{D42A27DB-BD31-4B8C-83A1-F6EECF244321}">
-                <p14:modId xmlns:p14="http://schemas.microsoft.com/office/powerpoint/2010/main" val="2126972609"/>
+                <p14:modId xmlns:p14="http://schemas.microsoft.com/office/powerpoint/2010/main" val="1654500066"/>
               </p:ext>
             </p:extLst>
           </p:nvPr>
@@ -3522,11 +3522,11 @@
                     <a:p>
                       <a:pPr algn="ctr" latinLnBrk="1"/>
                       <a:r>
-                        <a:rPr lang="en-US" altLang="ko-KR" dirty="0">
-                          <a:latin typeface="Times New Roman" panose="02020603050405020304" pitchFamily="18" charset="0"/>
-                          <a:cs typeface="Times New Roman" panose="02020603050405020304" pitchFamily="18" charset="0"/>
-                        </a:rPr>
-                        <a:t>0.</a:t>
+                        <a:rPr lang="en-US" altLang="ko-KR">
+                          <a:latin typeface="Times New Roman" panose="02020603050405020304" pitchFamily="18" charset="0"/>
+                          <a:cs typeface="Times New Roman" panose="02020603050405020304" pitchFamily="18" charset="0"/>
+                        </a:rPr>
+                        <a:t>0.833376</a:t>
                       </a:r>
                       <a:endParaRPr lang="ko-KR" altLang="en-US" dirty="0">
                         <a:latin typeface="Times New Roman" panose="02020603050405020304" pitchFamily="18" charset="0"/>
@@ -4317,7 +4317,7 @@
           <p:nvPr>
             <p:extLst>
               <p:ext uri="{D42A27DB-BD31-4B8C-83A1-F6EECF244321}">
-                <p14:modId xmlns:p14="http://schemas.microsoft.com/office/powerpoint/2010/main" val="4225117129"/>
+                <p14:modId xmlns:p14="http://schemas.microsoft.com/office/powerpoint/2010/main" val="4121677465"/>
               </p:ext>
             </p:extLst>
           </p:nvPr>
@@ -4614,20 +4614,9 @@
                           <a:latin typeface="Times New Roman" panose="02020603050405020304" pitchFamily="18" charset="0"/>
                           <a:cs typeface="Times New Roman" panose="02020603050405020304" pitchFamily="18" charset="0"/>
                         </a:rPr>
-                        <a:t>0.9488</a:t>
-                      </a:r>
-                      <a:endParaRPr lang="ko-KR" altLang="en-US" dirty="0">
-                        <a:latin typeface="Times New Roman" panose="02020603050405020304" pitchFamily="18" charset="0"/>
-                        <a:cs typeface="Times New Roman" panose="02020603050405020304" pitchFamily="18" charset="0"/>
-                      </a:endParaRPr>
-                    </a:p>
-                  </a:txBody>
-                  <a:tcPr/>
-                </a:tc>
-                <a:tc>
-                  <a:txBody>
-                    <a:bodyPr/>
-                    <a:lstStyle/>
+                        <a:t>0.9488 /</a:t>
+                      </a:r>
+                    </a:p>
                     <a:p>
                       <a:pPr algn="ctr" latinLnBrk="1"/>
                       <a:r>
@@ -4635,6 +4624,27 @@
                           <a:latin typeface="Times New Roman" panose="02020603050405020304" pitchFamily="18" charset="0"/>
                           <a:cs typeface="Times New Roman" panose="02020603050405020304" pitchFamily="18" charset="0"/>
                         </a:rPr>
+                        <a:t>0.82301</a:t>
+                      </a:r>
+                      <a:endParaRPr lang="ko-KR" altLang="en-US" dirty="0">
+                        <a:latin typeface="Times New Roman" panose="02020603050405020304" pitchFamily="18" charset="0"/>
+                        <a:cs typeface="Times New Roman" panose="02020603050405020304" pitchFamily="18" charset="0"/>
+                      </a:endParaRPr>
+                    </a:p>
+                  </a:txBody>
+                  <a:tcPr/>
+                </a:tc>
+                <a:tc>
+                  <a:txBody>
+                    <a:bodyPr/>
+                    <a:lstStyle/>
+                    <a:p>
+                      <a:pPr algn="ctr" latinLnBrk="1"/>
+                      <a:r>
+                        <a:rPr lang="en-US" altLang="ko-KR" dirty="0">
+                          <a:latin typeface="Times New Roman" panose="02020603050405020304" pitchFamily="18" charset="0"/>
+                          <a:cs typeface="Times New Roman" panose="02020603050405020304" pitchFamily="18" charset="0"/>
+                        </a:rPr>
                         <a:t>0.99884 /</a:t>
                       </a:r>
                     </a:p>
@@ -4645,20 +4655,9 @@
                           <a:latin typeface="Times New Roman" panose="02020603050405020304" pitchFamily="18" charset="0"/>
                           <a:cs typeface="Times New Roman" panose="02020603050405020304" pitchFamily="18" charset="0"/>
                         </a:rPr>
-                        <a:t>0.96919</a:t>
-                      </a:r>
-                      <a:endParaRPr lang="ko-KR" altLang="en-US" dirty="0">
-                        <a:latin typeface="Times New Roman" panose="02020603050405020304" pitchFamily="18" charset="0"/>
-                        <a:cs typeface="Times New Roman" panose="02020603050405020304" pitchFamily="18" charset="0"/>
-                      </a:endParaRPr>
-                    </a:p>
-                  </a:txBody>
-                  <a:tcPr/>
-                </a:tc>
-                <a:tc>
-                  <a:txBody>
-                    <a:bodyPr/>
-                    <a:lstStyle/>
+                        <a:t>0.96919 /</a:t>
+                      </a:r>
+                    </a:p>
                     <a:p>
                       <a:pPr algn="ctr" latinLnBrk="1"/>
                       <a:r>
@@ -4666,6 +4665,27 @@
                           <a:latin typeface="Times New Roman" panose="02020603050405020304" pitchFamily="18" charset="0"/>
                           <a:cs typeface="Times New Roman" panose="02020603050405020304" pitchFamily="18" charset="0"/>
                         </a:rPr>
+                        <a:t>0.88496</a:t>
+                      </a:r>
+                      <a:endParaRPr lang="ko-KR" altLang="en-US" dirty="0">
+                        <a:latin typeface="Times New Roman" panose="02020603050405020304" pitchFamily="18" charset="0"/>
+                        <a:cs typeface="Times New Roman" panose="02020603050405020304" pitchFamily="18" charset="0"/>
+                      </a:endParaRPr>
+                    </a:p>
+                  </a:txBody>
+                  <a:tcPr/>
+                </a:tc>
+                <a:tc>
+                  <a:txBody>
+                    <a:bodyPr/>
+                    <a:lstStyle/>
+                    <a:p>
+                      <a:pPr algn="ctr" latinLnBrk="1"/>
+                      <a:r>
+                        <a:rPr lang="en-US" altLang="ko-KR" dirty="0">
+                          <a:latin typeface="Times New Roman" panose="02020603050405020304" pitchFamily="18" charset="0"/>
+                          <a:cs typeface="Times New Roman" panose="02020603050405020304" pitchFamily="18" charset="0"/>
+                        </a:rPr>
                         <a:t>0.99758 /</a:t>
                       </a:r>
                     </a:p>
@@ -4676,20 +4696,9 @@
                           <a:latin typeface="Times New Roman" panose="02020603050405020304" pitchFamily="18" charset="0"/>
                           <a:cs typeface="Times New Roman" panose="02020603050405020304" pitchFamily="18" charset="0"/>
                         </a:rPr>
-                        <a:t>0.93223</a:t>
-                      </a:r>
-                      <a:endParaRPr lang="ko-KR" altLang="en-US" dirty="0">
-                        <a:latin typeface="Times New Roman" panose="02020603050405020304" pitchFamily="18" charset="0"/>
-                        <a:cs typeface="Times New Roman" panose="02020603050405020304" pitchFamily="18" charset="0"/>
-                      </a:endParaRPr>
-                    </a:p>
-                  </a:txBody>
-                  <a:tcPr/>
-                </a:tc>
-                <a:tc>
-                  <a:txBody>
-                    <a:bodyPr/>
-                    <a:lstStyle/>
+                        <a:t>0.93223 /</a:t>
+                      </a:r>
+                    </a:p>
                     <a:p>
                       <a:pPr algn="ctr" latinLnBrk="1"/>
                       <a:r>
@@ -4697,6 +4706,27 @@
                           <a:latin typeface="Times New Roman" panose="02020603050405020304" pitchFamily="18" charset="0"/>
                           <a:cs typeface="Times New Roman" panose="02020603050405020304" pitchFamily="18" charset="0"/>
                         </a:rPr>
+                        <a:t>0.76991</a:t>
+                      </a:r>
+                      <a:endParaRPr lang="ko-KR" altLang="en-US" dirty="0">
+                        <a:latin typeface="Times New Roman" panose="02020603050405020304" pitchFamily="18" charset="0"/>
+                        <a:cs typeface="Times New Roman" panose="02020603050405020304" pitchFamily="18" charset="0"/>
+                      </a:endParaRPr>
+                    </a:p>
+                  </a:txBody>
+                  <a:tcPr/>
+                </a:tc>
+                <a:tc>
+                  <a:txBody>
+                    <a:bodyPr/>
+                    <a:lstStyle/>
+                    <a:p>
+                      <a:pPr algn="ctr" latinLnBrk="1"/>
+                      <a:r>
+                        <a:rPr lang="en-US" altLang="ko-KR" dirty="0">
+                          <a:latin typeface="Times New Roman" panose="02020603050405020304" pitchFamily="18" charset="0"/>
+                          <a:cs typeface="Times New Roman" panose="02020603050405020304" pitchFamily="18" charset="0"/>
+                        </a:rPr>
                         <a:t>0.99848 /</a:t>
                       </a:r>
                     </a:p>
@@ -4707,20 +4737,9 @@
                           <a:latin typeface="Times New Roman" panose="02020603050405020304" pitchFamily="18" charset="0"/>
                           <a:cs typeface="Times New Roman" panose="02020603050405020304" pitchFamily="18" charset="0"/>
                         </a:rPr>
-                        <a:t>0.95895</a:t>
-                      </a:r>
-                      <a:endParaRPr lang="ko-KR" altLang="en-US" dirty="0">
-                        <a:latin typeface="Times New Roman" panose="02020603050405020304" pitchFamily="18" charset="0"/>
-                        <a:cs typeface="Times New Roman" panose="02020603050405020304" pitchFamily="18" charset="0"/>
-                      </a:endParaRPr>
-                    </a:p>
-                  </a:txBody>
-                  <a:tcPr/>
-                </a:tc>
-                <a:tc>
-                  <a:txBody>
-                    <a:bodyPr/>
-                    <a:lstStyle/>
+                        <a:t>0.95895 /</a:t>
+                      </a:r>
+                    </a:p>
                     <a:p>
                       <a:pPr algn="ctr" latinLnBrk="1"/>
                       <a:r>
@@ -4728,6 +4747,27 @@
                           <a:latin typeface="Times New Roman" panose="02020603050405020304" pitchFamily="18" charset="0"/>
                           <a:cs typeface="Times New Roman" panose="02020603050405020304" pitchFamily="18" charset="0"/>
                         </a:rPr>
+                        <a:t>0.85714</a:t>
+                      </a:r>
+                      <a:endParaRPr lang="ko-KR" altLang="en-US" dirty="0">
+                        <a:latin typeface="Times New Roman" panose="02020603050405020304" pitchFamily="18" charset="0"/>
+                        <a:cs typeface="Times New Roman" panose="02020603050405020304" pitchFamily="18" charset="0"/>
+                      </a:endParaRPr>
+                    </a:p>
+                  </a:txBody>
+                  <a:tcPr/>
+                </a:tc>
+                <a:tc>
+                  <a:txBody>
+                    <a:bodyPr/>
+                    <a:lstStyle/>
+                    <a:p>
+                      <a:pPr algn="ctr" latinLnBrk="1"/>
+                      <a:r>
+                        <a:rPr lang="en-US" altLang="ko-KR" dirty="0">
+                          <a:latin typeface="Times New Roman" panose="02020603050405020304" pitchFamily="18" charset="0"/>
+                          <a:cs typeface="Times New Roman" panose="02020603050405020304" pitchFamily="18" charset="0"/>
+                        </a:rPr>
                         <a:t>0.998246 /</a:t>
                       </a:r>
                     </a:p>
@@ -4738,7 +4778,17 @@
                           <a:latin typeface="Times New Roman" panose="02020603050405020304" pitchFamily="18" charset="0"/>
                           <a:cs typeface="Times New Roman" panose="02020603050405020304" pitchFamily="18" charset="0"/>
                         </a:rPr>
-                        <a:t>0.952128</a:t>
+                        <a:t>0.952128 /</a:t>
+                      </a:r>
+                    </a:p>
+                    <a:p>
+                      <a:pPr algn="ctr" latinLnBrk="1"/>
+                      <a:r>
+                        <a:rPr lang="en-US" altLang="ko-KR" dirty="0">
+                          <a:latin typeface="Times New Roman" panose="02020603050405020304" pitchFamily="18" charset="0"/>
+                          <a:cs typeface="Times New Roman" panose="02020603050405020304" pitchFamily="18" charset="0"/>
+                        </a:rPr>
+                        <a:t>0.833376</a:t>
                       </a:r>
                       <a:endParaRPr lang="ko-KR" altLang="en-US" dirty="0">
                         <a:latin typeface="Times New Roman" panose="02020603050405020304" pitchFamily="18" charset="0"/>

</xml_diff>